<commit_message>
Made changes in Report. Deleted one slide from presentation
</commit_message>
<xml_diff>
--- a/Categorizing YouTube Videos.pptx
+++ b/Categorizing YouTube Videos.pptx
@@ -4,6 +4,9 @@
   <p:sldMasterIdLst>
     <p:sldMasterId id="2147483760" r:id="rId1"/>
   </p:sldMasterIdLst>
+  <p:notesMasterIdLst>
+    <p:notesMasterId r:id="rId11"/>
+  </p:notesMasterIdLst>
   <p:sldIdLst>
     <p:sldId id="256" r:id="rId2"/>
     <p:sldId id="257" r:id="rId3"/>
@@ -12,8 +15,8 @@
     <p:sldId id="258" r:id="rId6"/>
     <p:sldId id="264" r:id="rId7"/>
     <p:sldId id="259" r:id="rId8"/>
-    <p:sldId id="263" r:id="rId9"/>
-    <p:sldId id="260" r:id="rId10"/>
+    <p:sldId id="260" r:id="rId9"/>
+    <p:sldId id="266" r:id="rId10"/>
   </p:sldIdLst>
   <p:sldSz cx="12192000" cy="6858000"/>
   <p:notesSz cx="6858000" cy="9144000"/>
@@ -112,7 +115,495 @@
       </a:defRPr>
     </a:lvl9pPr>
   </p:defaultTextStyle>
+  <p:extLst>
+    <p:ext uri="{EFAFB233-063F-42B5-8137-9DF3F51BA10A}">
+      <p15:sldGuideLst xmlns:p15="http://schemas.microsoft.com/office/powerpoint/2012/main"/>
+    </p:ext>
+  </p:extLst>
 </p:presentation>
+</file>
+
+<file path=ppt/notesMasters/notesMaster1.xml><?xml version="1.0" encoding="utf-8"?>
+<p:notesMaster xmlns:a="http://schemas.openxmlformats.org/drawingml/2006/main" xmlns:r="http://schemas.openxmlformats.org/officeDocument/2006/relationships" xmlns:p="http://schemas.openxmlformats.org/presentationml/2006/main">
+  <p:cSld>
+    <p:bg>
+      <p:bgRef idx="1001">
+        <a:schemeClr val="bg1"/>
+      </p:bgRef>
+    </p:bg>
+    <p:spTree>
+      <p:nvGrpSpPr>
+        <p:cNvPr id="1" name=""/>
+        <p:cNvGrpSpPr/>
+        <p:nvPr/>
+      </p:nvGrpSpPr>
+      <p:grpSpPr>
+        <a:xfrm>
+          <a:off x="0" y="0"/>
+          <a:ext cx="0" cy="0"/>
+          <a:chOff x="0" y="0"/>
+          <a:chExt cx="0" cy="0"/>
+        </a:xfrm>
+      </p:grpSpPr>
+      <p:sp>
+        <p:nvSpPr>
+          <p:cNvPr id="2" name="Header Placeholder 1"/>
+          <p:cNvSpPr>
+            <a:spLocks noGrp="1"/>
+          </p:cNvSpPr>
+          <p:nvPr>
+            <p:ph type="hdr" sz="quarter"/>
+          </p:nvPr>
+        </p:nvSpPr>
+        <p:spPr>
+          <a:xfrm>
+            <a:off x="0" y="0"/>
+            <a:ext cx="2971800" cy="458788"/>
+          </a:xfrm>
+          <a:prstGeom prst="rect">
+            <a:avLst/>
+          </a:prstGeom>
+        </p:spPr>
+        <p:txBody>
+          <a:bodyPr vert="horz" lIns="91440" tIns="45720" rIns="91440" bIns="45720" rtlCol="0"/>
+          <a:lstStyle>
+            <a:lvl1pPr algn="l">
+              <a:defRPr sz="1200"/>
+            </a:lvl1pPr>
+          </a:lstStyle>
+          <a:p>
+            <a:endParaRPr lang="en-US"/>
+          </a:p>
+        </p:txBody>
+      </p:sp>
+      <p:sp>
+        <p:nvSpPr>
+          <p:cNvPr id="3" name="Date Placeholder 2"/>
+          <p:cNvSpPr>
+            <a:spLocks noGrp="1"/>
+          </p:cNvSpPr>
+          <p:nvPr>
+            <p:ph type="dt" idx="1"/>
+          </p:nvPr>
+        </p:nvSpPr>
+        <p:spPr>
+          <a:xfrm>
+            <a:off x="3884613" y="0"/>
+            <a:ext cx="2971800" cy="458788"/>
+          </a:xfrm>
+          <a:prstGeom prst="rect">
+            <a:avLst/>
+          </a:prstGeom>
+        </p:spPr>
+        <p:txBody>
+          <a:bodyPr vert="horz" lIns="91440" tIns="45720" rIns="91440" bIns="45720" rtlCol="0"/>
+          <a:lstStyle>
+            <a:lvl1pPr algn="r">
+              <a:defRPr sz="1200"/>
+            </a:lvl1pPr>
+          </a:lstStyle>
+          <a:p>
+            <a:fld id="{700893F5-AD44-E543-A245-95F38FF08452}" type="datetimeFigureOut">
+              <a:rPr lang="en-US" smtClean="0"/>
+              <a:t>4/24/2018</a:t>
+            </a:fld>
+            <a:endParaRPr lang="en-US"/>
+          </a:p>
+        </p:txBody>
+      </p:sp>
+      <p:sp>
+        <p:nvSpPr>
+          <p:cNvPr id="4" name="Slide Image Placeholder 3"/>
+          <p:cNvSpPr>
+            <a:spLocks noGrp="1" noRot="1" noChangeAspect="1"/>
+          </p:cNvSpPr>
+          <p:nvPr>
+            <p:ph type="sldImg" idx="2"/>
+          </p:nvPr>
+        </p:nvSpPr>
+        <p:spPr>
+          <a:xfrm>
+            <a:off x="685800" y="1143000"/>
+            <a:ext cx="5486400" cy="3086100"/>
+          </a:xfrm>
+          <a:prstGeom prst="rect">
+            <a:avLst/>
+          </a:prstGeom>
+          <a:noFill/>
+          <a:ln w="12700">
+            <a:solidFill>
+              <a:prstClr val="black"/>
+            </a:solidFill>
+          </a:ln>
+        </p:spPr>
+        <p:txBody>
+          <a:bodyPr vert="horz" lIns="91440" tIns="45720" rIns="91440" bIns="45720" rtlCol="0" anchor="ctr"/>
+          <a:lstStyle/>
+          <a:p>
+            <a:endParaRPr lang="en-US"/>
+          </a:p>
+        </p:txBody>
+      </p:sp>
+      <p:sp>
+        <p:nvSpPr>
+          <p:cNvPr id="5" name="Notes Placeholder 4"/>
+          <p:cNvSpPr>
+            <a:spLocks noGrp="1"/>
+          </p:cNvSpPr>
+          <p:nvPr>
+            <p:ph type="body" sz="quarter" idx="3"/>
+          </p:nvPr>
+        </p:nvSpPr>
+        <p:spPr>
+          <a:xfrm>
+            <a:off x="685800" y="4400550"/>
+            <a:ext cx="5486400" cy="3600450"/>
+          </a:xfrm>
+          <a:prstGeom prst="rect">
+            <a:avLst/>
+          </a:prstGeom>
+        </p:spPr>
+        <p:txBody>
+          <a:bodyPr vert="horz" lIns="91440" tIns="45720" rIns="91440" bIns="45720" rtlCol="0"/>
+          <a:lstStyle/>
+          <a:p>
+            <a:pPr lvl="0"/>
+            <a:r>
+              <a:rPr lang="en-US"/>
+              <a:t>Click to edit Master text styles</a:t>
+            </a:r>
+          </a:p>
+          <a:p>
+            <a:pPr lvl="1"/>
+            <a:r>
+              <a:rPr lang="en-US"/>
+              <a:t>Second level</a:t>
+            </a:r>
+          </a:p>
+          <a:p>
+            <a:pPr lvl="2"/>
+            <a:r>
+              <a:rPr lang="en-US"/>
+              <a:t>Third level</a:t>
+            </a:r>
+          </a:p>
+          <a:p>
+            <a:pPr lvl="3"/>
+            <a:r>
+              <a:rPr lang="en-US"/>
+              <a:t>Fourth level</a:t>
+            </a:r>
+          </a:p>
+          <a:p>
+            <a:pPr lvl="4"/>
+            <a:r>
+              <a:rPr lang="en-US"/>
+              <a:t>Fifth level</a:t>
+            </a:r>
+          </a:p>
+        </p:txBody>
+      </p:sp>
+      <p:sp>
+        <p:nvSpPr>
+          <p:cNvPr id="6" name="Footer Placeholder 5"/>
+          <p:cNvSpPr>
+            <a:spLocks noGrp="1"/>
+          </p:cNvSpPr>
+          <p:nvPr>
+            <p:ph type="ftr" sz="quarter" idx="4"/>
+          </p:nvPr>
+        </p:nvSpPr>
+        <p:spPr>
+          <a:xfrm>
+            <a:off x="0" y="8685213"/>
+            <a:ext cx="2971800" cy="458787"/>
+          </a:xfrm>
+          <a:prstGeom prst="rect">
+            <a:avLst/>
+          </a:prstGeom>
+        </p:spPr>
+        <p:txBody>
+          <a:bodyPr vert="horz" lIns="91440" tIns="45720" rIns="91440" bIns="45720" rtlCol="0" anchor="b"/>
+          <a:lstStyle>
+            <a:lvl1pPr algn="l">
+              <a:defRPr sz="1200"/>
+            </a:lvl1pPr>
+          </a:lstStyle>
+          <a:p>
+            <a:endParaRPr lang="en-US"/>
+          </a:p>
+        </p:txBody>
+      </p:sp>
+      <p:sp>
+        <p:nvSpPr>
+          <p:cNvPr id="7" name="Slide Number Placeholder 6"/>
+          <p:cNvSpPr>
+            <a:spLocks noGrp="1"/>
+          </p:cNvSpPr>
+          <p:nvPr>
+            <p:ph type="sldNum" sz="quarter" idx="5"/>
+          </p:nvPr>
+        </p:nvSpPr>
+        <p:spPr>
+          <a:xfrm>
+            <a:off x="3884613" y="8685213"/>
+            <a:ext cx="2971800" cy="458787"/>
+          </a:xfrm>
+          <a:prstGeom prst="rect">
+            <a:avLst/>
+          </a:prstGeom>
+        </p:spPr>
+        <p:txBody>
+          <a:bodyPr vert="horz" lIns="91440" tIns="45720" rIns="91440" bIns="45720" rtlCol="0" anchor="b"/>
+          <a:lstStyle>
+            <a:lvl1pPr algn="r">
+              <a:defRPr sz="1200"/>
+            </a:lvl1pPr>
+          </a:lstStyle>
+          <a:p>
+            <a:fld id="{82993A4B-6423-FD42-A73A-D4FCA772ABDA}" type="slidenum">
+              <a:rPr lang="en-US" smtClean="0"/>
+              <a:t>‹#›</a:t>
+            </a:fld>
+            <a:endParaRPr lang="en-US"/>
+          </a:p>
+        </p:txBody>
+      </p:sp>
+    </p:spTree>
+    <p:extLst>
+      <p:ext uri="{BB962C8B-B14F-4D97-AF65-F5344CB8AC3E}">
+        <p14:creationId xmlns:p14="http://schemas.microsoft.com/office/powerpoint/2010/main" val="513479331"/>
+      </p:ext>
+    </p:extLst>
+  </p:cSld>
+  <p:clrMap bg1="lt1" tx1="dk1" bg2="lt2" tx2="dk2" accent1="accent1" accent2="accent2" accent3="accent3" accent4="accent4" accent5="accent5" accent6="accent6" hlink="hlink" folHlink="folHlink"/>
+  <p:notesStyle>
+    <a:lvl1pPr marL="0" algn="l" defTabSz="914400" rtl="0" eaLnBrk="1" latinLnBrk="0" hangingPunct="1">
+      <a:defRPr sz="1200" kern="1200">
+        <a:solidFill>
+          <a:schemeClr val="tx1"/>
+        </a:solidFill>
+        <a:latin typeface="+mn-lt"/>
+        <a:ea typeface="+mn-ea"/>
+        <a:cs typeface="+mn-cs"/>
+      </a:defRPr>
+    </a:lvl1pPr>
+    <a:lvl2pPr marL="457200" algn="l" defTabSz="914400" rtl="0" eaLnBrk="1" latinLnBrk="0" hangingPunct="1">
+      <a:defRPr sz="1200" kern="1200">
+        <a:solidFill>
+          <a:schemeClr val="tx1"/>
+        </a:solidFill>
+        <a:latin typeface="+mn-lt"/>
+        <a:ea typeface="+mn-ea"/>
+        <a:cs typeface="+mn-cs"/>
+      </a:defRPr>
+    </a:lvl2pPr>
+    <a:lvl3pPr marL="914400" algn="l" defTabSz="914400" rtl="0" eaLnBrk="1" latinLnBrk="0" hangingPunct="1">
+      <a:defRPr sz="1200" kern="1200">
+        <a:solidFill>
+          <a:schemeClr val="tx1"/>
+        </a:solidFill>
+        <a:latin typeface="+mn-lt"/>
+        <a:ea typeface="+mn-ea"/>
+        <a:cs typeface="+mn-cs"/>
+      </a:defRPr>
+    </a:lvl3pPr>
+    <a:lvl4pPr marL="1371600" algn="l" defTabSz="914400" rtl="0" eaLnBrk="1" latinLnBrk="0" hangingPunct="1">
+      <a:defRPr sz="1200" kern="1200">
+        <a:solidFill>
+          <a:schemeClr val="tx1"/>
+        </a:solidFill>
+        <a:latin typeface="+mn-lt"/>
+        <a:ea typeface="+mn-ea"/>
+        <a:cs typeface="+mn-cs"/>
+      </a:defRPr>
+    </a:lvl4pPr>
+    <a:lvl5pPr marL="1828800" algn="l" defTabSz="914400" rtl="0" eaLnBrk="1" latinLnBrk="0" hangingPunct="1">
+      <a:defRPr sz="1200" kern="1200">
+        <a:solidFill>
+          <a:schemeClr val="tx1"/>
+        </a:solidFill>
+        <a:latin typeface="+mn-lt"/>
+        <a:ea typeface="+mn-ea"/>
+        <a:cs typeface="+mn-cs"/>
+      </a:defRPr>
+    </a:lvl5pPr>
+    <a:lvl6pPr marL="2286000" algn="l" defTabSz="914400" rtl="0" eaLnBrk="1" latinLnBrk="0" hangingPunct="1">
+      <a:defRPr sz="1200" kern="1200">
+        <a:solidFill>
+          <a:schemeClr val="tx1"/>
+        </a:solidFill>
+        <a:latin typeface="+mn-lt"/>
+        <a:ea typeface="+mn-ea"/>
+        <a:cs typeface="+mn-cs"/>
+      </a:defRPr>
+    </a:lvl6pPr>
+    <a:lvl7pPr marL="2743200" algn="l" defTabSz="914400" rtl="0" eaLnBrk="1" latinLnBrk="0" hangingPunct="1">
+      <a:defRPr sz="1200" kern="1200">
+        <a:solidFill>
+          <a:schemeClr val="tx1"/>
+        </a:solidFill>
+        <a:latin typeface="+mn-lt"/>
+        <a:ea typeface="+mn-ea"/>
+        <a:cs typeface="+mn-cs"/>
+      </a:defRPr>
+    </a:lvl7pPr>
+    <a:lvl8pPr marL="3200400" algn="l" defTabSz="914400" rtl="0" eaLnBrk="1" latinLnBrk="0" hangingPunct="1">
+      <a:defRPr sz="1200" kern="1200">
+        <a:solidFill>
+          <a:schemeClr val="tx1"/>
+        </a:solidFill>
+        <a:latin typeface="+mn-lt"/>
+        <a:ea typeface="+mn-ea"/>
+        <a:cs typeface="+mn-cs"/>
+      </a:defRPr>
+    </a:lvl8pPr>
+    <a:lvl9pPr marL="3657600" algn="l" defTabSz="914400" rtl="0" eaLnBrk="1" latinLnBrk="0" hangingPunct="1">
+      <a:defRPr sz="1200" kern="1200">
+        <a:solidFill>
+          <a:schemeClr val="tx1"/>
+        </a:solidFill>
+        <a:latin typeface="+mn-lt"/>
+        <a:ea typeface="+mn-ea"/>
+        <a:cs typeface="+mn-cs"/>
+      </a:defRPr>
+    </a:lvl9pPr>
+  </p:notesStyle>
+</p:notesMaster>
+</file>
+
+<file path=ppt/notesSlides/notesSlide1.xml><?xml version="1.0" encoding="utf-8"?>
+<p:notes xmlns:a="http://schemas.openxmlformats.org/drawingml/2006/main" xmlns:r="http://schemas.openxmlformats.org/officeDocument/2006/relationships" xmlns:p="http://schemas.openxmlformats.org/presentationml/2006/main">
+  <p:cSld>
+    <p:spTree>
+      <p:nvGrpSpPr>
+        <p:cNvPr id="1" name=""/>
+        <p:cNvGrpSpPr/>
+        <p:nvPr/>
+      </p:nvGrpSpPr>
+      <p:grpSpPr>
+        <a:xfrm>
+          <a:off x="0" y="0"/>
+          <a:ext cx="0" cy="0"/>
+          <a:chOff x="0" y="0"/>
+          <a:chExt cx="0" cy="0"/>
+        </a:xfrm>
+      </p:grpSpPr>
+      <p:sp>
+        <p:nvSpPr>
+          <p:cNvPr id="2" name="Slide Image Placeholder 1"/>
+          <p:cNvSpPr>
+            <a:spLocks noGrp="1" noRot="1" noChangeAspect="1"/>
+          </p:cNvSpPr>
+          <p:nvPr>
+            <p:ph type="sldImg"/>
+          </p:nvPr>
+        </p:nvSpPr>
+        <p:spPr/>
+      </p:sp>
+      <p:sp>
+        <p:nvSpPr>
+          <p:cNvPr id="3" name="Notes Placeholder 2"/>
+          <p:cNvSpPr>
+            <a:spLocks noGrp="1"/>
+          </p:cNvSpPr>
+          <p:nvPr>
+            <p:ph type="body" idx="1"/>
+          </p:nvPr>
+        </p:nvSpPr>
+        <p:spPr/>
+        <p:txBody>
+          <a:bodyPr/>
+          <a:lstStyle/>
+          <a:p>
+            <a:r>
+              <a:rPr lang="en-US" sz="1200" b="0" i="0" kern="1200" dirty="0">
+                <a:solidFill>
+                  <a:schemeClr val="tx1"/>
+                </a:solidFill>
+                <a:effectLst/>
+                <a:latin typeface="+mn-lt"/>
+                <a:ea typeface="+mn-ea"/>
+                <a:cs typeface="+mn-cs"/>
+              </a:rPr>
+              <a:t>Greedily form data clusters based on local correlations</a:t>
+            </a:r>
+            <a:r>
+              <a:rPr lang="en-US" sz="1200" b="0" i="0" kern="1200" baseline="0" dirty="0">
+                <a:solidFill>
+                  <a:schemeClr val="tx1"/>
+                </a:solidFill>
+                <a:effectLst/>
+                <a:latin typeface="+mn-lt"/>
+                <a:ea typeface="+mn-ea"/>
+                <a:cs typeface="+mn-cs"/>
+              </a:rPr>
+              <a:t> </a:t>
+            </a:r>
+            <a:r>
+              <a:rPr lang="en-US" sz="1200" b="0" i="0" kern="1200" dirty="0">
+                <a:solidFill>
+                  <a:schemeClr val="tx1"/>
+                </a:solidFill>
+                <a:effectLst/>
+                <a:latin typeface="+mn-lt"/>
+                <a:ea typeface="+mn-ea"/>
+                <a:cs typeface="+mn-cs"/>
+              </a:rPr>
+              <a:t>between the data points.</a:t>
+            </a:r>
+          </a:p>
+          <a:p>
+            <a:r>
+              <a:rPr lang="en-US" sz="1200" b="0" i="0" kern="1200" dirty="0">
+                <a:solidFill>
+                  <a:schemeClr val="tx1"/>
+                </a:solidFill>
+                <a:effectLst/>
+                <a:latin typeface="+mn-lt"/>
+                <a:ea typeface="+mn-ea"/>
+                <a:cs typeface="+mn-cs"/>
+              </a:rPr>
+              <a:t>At each step find the pair of clusters that leads to minimum increase in total within-cluster variance after merging. </a:t>
+            </a:r>
+            <a:endParaRPr lang="en-US" dirty="0"/>
+          </a:p>
+        </p:txBody>
+      </p:sp>
+      <p:sp>
+        <p:nvSpPr>
+          <p:cNvPr id="4" name="Slide Number Placeholder 3"/>
+          <p:cNvSpPr>
+            <a:spLocks noGrp="1"/>
+          </p:cNvSpPr>
+          <p:nvPr>
+            <p:ph type="sldNum" sz="quarter" idx="10"/>
+          </p:nvPr>
+        </p:nvSpPr>
+        <p:spPr/>
+        <p:txBody>
+          <a:bodyPr/>
+          <a:lstStyle/>
+          <a:p>
+            <a:fld id="{82993A4B-6423-FD42-A73A-D4FCA772ABDA}" type="slidenum">
+              <a:rPr lang="en-US" smtClean="0"/>
+              <a:t>7</a:t>
+            </a:fld>
+            <a:endParaRPr lang="en-US"/>
+          </a:p>
+        </p:txBody>
+      </p:sp>
+    </p:spTree>
+    <p:extLst>
+      <p:ext uri="{BB962C8B-B14F-4D97-AF65-F5344CB8AC3E}">
+        <p14:creationId xmlns:p14="http://schemas.microsoft.com/office/powerpoint/2010/main" val="1457822471"/>
+      </p:ext>
+    </p:extLst>
+  </p:cSld>
+  <p:clrMapOvr>
+    <a:masterClrMapping/>
+  </p:clrMapOvr>
+</p:notes>
 </file>
 
 <file path=ppt/slideLayouts/slideLayout1.xml><?xml version="1.0" encoding="utf-8"?>
@@ -286,7 +777,7 @@
           <a:p>
             <a:fld id="{F8F32E06-09F6-479A-86EB-0AE786A442BF}" type="datetimeFigureOut">
               <a:rPr lang="en-US" smtClean="0"/>
-              <a:t>4/22/2018</a:t>
+              <a:t>4/24/2018</a:t>
             </a:fld>
             <a:endParaRPr lang="en-US"/>
           </a:p>
@@ -601,7 +1092,7 @@
           <a:p>
             <a:fld id="{F8F32E06-09F6-479A-86EB-0AE786A442BF}" type="datetimeFigureOut">
               <a:rPr lang="en-US" smtClean="0"/>
-              <a:t>4/22/2018</a:t>
+              <a:t>4/24/2018</a:t>
             </a:fld>
             <a:endParaRPr lang="en-US"/>
           </a:p>
@@ -823,7 +1314,7 @@
           <a:p>
             <a:fld id="{F8F32E06-09F6-479A-86EB-0AE786A442BF}" type="datetimeFigureOut">
               <a:rPr lang="en-US" smtClean="0"/>
-              <a:t>4/22/2018</a:t>
+              <a:t>4/24/2018</a:t>
             </a:fld>
             <a:endParaRPr lang="en-US"/>
           </a:p>
@@ -1114,7 +1605,7 @@
           <a:p>
             <a:fld id="{F8F32E06-09F6-479A-86EB-0AE786A442BF}" type="datetimeFigureOut">
               <a:rPr lang="en-US" smtClean="0"/>
-              <a:t>4/22/2018</a:t>
+              <a:t>4/24/2018</a:t>
             </a:fld>
             <a:endParaRPr lang="en-US"/>
           </a:p>
@@ -1568,7 +2059,7 @@
           <a:p>
             <a:fld id="{F8F32E06-09F6-479A-86EB-0AE786A442BF}" type="datetimeFigureOut">
               <a:rPr lang="en-US" smtClean="0"/>
-              <a:t>4/22/2018</a:t>
+              <a:t>4/24/2018</a:t>
             </a:fld>
             <a:endParaRPr lang="en-US"/>
           </a:p>
@@ -2144,7 +2635,7 @@
           <a:p>
             <a:fld id="{F8F32E06-09F6-479A-86EB-0AE786A442BF}" type="datetimeFigureOut">
               <a:rPr lang="en-US" smtClean="0"/>
-              <a:t>4/22/2018</a:t>
+              <a:t>4/24/2018</a:t>
             </a:fld>
             <a:endParaRPr lang="en-US"/>
           </a:p>
@@ -3005,7 +3496,7 @@
           <a:p>
             <a:fld id="{F8F32E06-09F6-479A-86EB-0AE786A442BF}" type="datetimeFigureOut">
               <a:rPr lang="en-US" smtClean="0"/>
-              <a:t>4/22/2018</a:t>
+              <a:t>4/24/2018</a:t>
             </a:fld>
             <a:endParaRPr lang="en-US"/>
           </a:p>
@@ -3210,7 +3701,7 @@
           <a:p>
             <a:fld id="{F8F32E06-09F6-479A-86EB-0AE786A442BF}" type="datetimeFigureOut">
               <a:rPr lang="en-US" smtClean="0"/>
-              <a:t>4/22/2018</a:t>
+              <a:t>4/24/2018</a:t>
             </a:fld>
             <a:endParaRPr lang="en-US"/>
           </a:p>
@@ -3424,7 +3915,7 @@
           <a:p>
             <a:fld id="{F8F32E06-09F6-479A-86EB-0AE786A442BF}" type="datetimeFigureOut">
               <a:rPr lang="en-US" smtClean="0"/>
-              <a:t>4/22/2018</a:t>
+              <a:t>4/24/2018</a:t>
             </a:fld>
             <a:endParaRPr lang="en-US"/>
           </a:p>
@@ -3629,7 +4120,7 @@
           <a:p>
             <a:fld id="{F8F32E06-09F6-479A-86EB-0AE786A442BF}" type="datetimeFigureOut">
               <a:rPr lang="en-US" smtClean="0"/>
-              <a:t>4/22/2018</a:t>
+              <a:t>4/24/2018</a:t>
             </a:fld>
             <a:endParaRPr lang="en-US"/>
           </a:p>
@@ -3909,7 +4400,7 @@
           <a:p>
             <a:fld id="{F8F32E06-09F6-479A-86EB-0AE786A442BF}" type="datetimeFigureOut">
               <a:rPr lang="en-US" smtClean="0"/>
-              <a:t>4/22/2018</a:t>
+              <a:t>4/24/2018</a:t>
             </a:fld>
             <a:endParaRPr lang="en-US"/>
           </a:p>
@@ -4176,7 +4667,7 @@
           <a:p>
             <a:fld id="{F8F32E06-09F6-479A-86EB-0AE786A442BF}" type="datetimeFigureOut">
               <a:rPr lang="en-US" smtClean="0"/>
-              <a:t>4/22/2018</a:t>
+              <a:t>4/24/2018</a:t>
             </a:fld>
             <a:endParaRPr lang="en-US"/>
           </a:p>
@@ -4591,7 +5082,7 @@
           <a:p>
             <a:fld id="{F8F32E06-09F6-479A-86EB-0AE786A442BF}" type="datetimeFigureOut">
               <a:rPr lang="en-US" smtClean="0"/>
-              <a:t>4/22/2018</a:t>
+              <a:t>4/24/2018</a:t>
             </a:fld>
             <a:endParaRPr lang="en-US"/>
           </a:p>
@@ -4739,7 +5230,7 @@
           <a:p>
             <a:fld id="{F8F32E06-09F6-479A-86EB-0AE786A442BF}" type="datetimeFigureOut">
               <a:rPr lang="en-US" smtClean="0"/>
-              <a:t>4/22/2018</a:t>
+              <a:t>4/24/2018</a:t>
             </a:fld>
             <a:endParaRPr lang="en-US"/>
           </a:p>
@@ -4864,7 +5355,7 @@
           <a:p>
             <a:fld id="{F8F32E06-09F6-479A-86EB-0AE786A442BF}" type="datetimeFigureOut">
               <a:rPr lang="en-US" smtClean="0"/>
-              <a:t>4/22/2018</a:t>
+              <a:t>4/24/2018</a:t>
             </a:fld>
             <a:endParaRPr lang="en-US"/>
           </a:p>
@@ -5143,7 +5634,7 @@
           <a:p>
             <a:fld id="{F8F32E06-09F6-479A-86EB-0AE786A442BF}" type="datetimeFigureOut">
               <a:rPr lang="en-US" smtClean="0"/>
-              <a:t>4/22/2018</a:t>
+              <a:t>4/24/2018</a:t>
             </a:fld>
             <a:endParaRPr lang="en-US"/>
           </a:p>
@@ -5458,7 +5949,7 @@
           <a:p>
             <a:fld id="{F8F32E06-09F6-479A-86EB-0AE786A442BF}" type="datetimeFigureOut">
               <a:rPr lang="en-US" smtClean="0"/>
-              <a:t>4/22/2018</a:t>
+              <a:t>4/24/2018</a:t>
             </a:fld>
             <a:endParaRPr lang="en-US"/>
           </a:p>
@@ -5711,7 +6202,7 @@
           <a:p>
             <a:fld id="{F8F32E06-09F6-479A-86EB-0AE786A442BF}" type="datetimeFigureOut">
               <a:rPr lang="en-US" smtClean="0"/>
-              <a:t>4/22/2018</a:t>
+              <a:t>4/24/2018</a:t>
             </a:fld>
             <a:endParaRPr lang="en-US"/>
           </a:p>
@@ -6738,7 +7229,12 @@
             <p:ph type="title"/>
           </p:nvPr>
         </p:nvSpPr>
-        <p:spPr/>
+        <p:spPr>
+          <a:xfrm>
+            <a:off x="913774" y="562534"/>
+            <a:ext cx="10364451" cy="1596177"/>
+          </a:xfrm>
+        </p:spPr>
         <p:txBody>
           <a:bodyPr/>
           <a:lstStyle/>
@@ -6776,6 +7272,36 @@
               <a:rPr lang="en-US" dirty="0"/>
               <a:t>Centroid based clustering</a:t>
             </a:r>
+          </a:p>
+          <a:p>
+            <a:r>
+              <a:rPr lang="en-US" dirty="0"/>
+              <a:t>Uses Silhouette coefficient to identify correlation between clusters</a:t>
+            </a:r>
+          </a:p>
+          <a:p>
+            <a:pPr lvl="1"/>
+            <a:r>
+              <a:rPr lang="en-US" dirty="0"/>
+              <a:t>+1 : best cluster (Clusters are non overlapping)</a:t>
+            </a:r>
+          </a:p>
+          <a:p>
+            <a:pPr lvl="1"/>
+            <a:r>
+              <a:rPr lang="en-US" dirty="0"/>
+              <a:t>  0 : cluster are overlapping </a:t>
+            </a:r>
+          </a:p>
+          <a:p>
+            <a:pPr lvl="1"/>
+            <a:r>
+              <a:rPr lang="en-US" dirty="0"/>
+              <a:t>-1 : worst clusters (data points are assigned to wrong clusters)</a:t>
+            </a:r>
+          </a:p>
+          <a:p>
+            <a:endParaRPr lang="en-US" dirty="0"/>
           </a:p>
           <a:p>
             <a:endParaRPr lang="en-US" dirty="0"/>
@@ -6828,43 +7354,1301 @@
             <p:ph type="title"/>
           </p:nvPr>
         </p:nvSpPr>
-        <p:spPr/>
-        <p:txBody>
-          <a:bodyPr/>
+        <p:spPr>
+          <a:xfrm>
+            <a:off x="913775" y="618517"/>
+            <a:ext cx="10364451" cy="622454"/>
+          </a:xfrm>
+        </p:spPr>
+        <p:txBody>
+          <a:bodyPr>
+            <a:normAutofit/>
+          </a:bodyPr>
           <a:lstStyle/>
           <a:p>
             <a:r>
-              <a:rPr lang="en-US" dirty="0"/>
+              <a:rPr lang="en-US" sz="3200" dirty="0"/>
               <a:t>Performance Measure</a:t>
             </a:r>
           </a:p>
         </p:txBody>
       </p:sp>
-      <p:sp>
-        <p:nvSpPr>
-          <p:cNvPr id="3" name="Content Placeholder 2">
+      <p:graphicFrame>
+        <p:nvGraphicFramePr>
+          <p:cNvPr id="4" name="Content Placeholder 6">
             <a:extLst>
               <a:ext uri="{FF2B5EF4-FFF2-40B4-BE49-F238E27FC236}">
-                <a16:creationId xmlns:a16="http://schemas.microsoft.com/office/drawing/2014/main" id="{B152A32C-A7A6-4DA0-84CB-82A17373CC7A}"/>
+                <a16:creationId xmlns:a16="http://schemas.microsoft.com/office/drawing/2014/main" id="{3A140616-5BA7-4137-8673-20E7D6F3017D}"/>
               </a:ext>
             </a:extLst>
           </p:cNvPr>
-          <p:cNvSpPr>
-            <a:spLocks noGrp="1"/>
-          </p:cNvSpPr>
+          <p:cNvGraphicFramePr>
+            <a:graphicFrameLocks noGrp="1"/>
+          </p:cNvGraphicFramePr>
           <p:nvPr>
             <p:ph sz="quarter" idx="13"/>
-          </p:nvPr>
-        </p:nvSpPr>
-        <p:spPr/>
-        <p:txBody>
-          <a:bodyPr/>
-          <a:lstStyle/>
-          <a:p>
-            <a:endParaRPr lang="en-US"/>
-          </a:p>
-        </p:txBody>
-      </p:sp>
+            <p:extLst>
+              <p:ext uri="{D42A27DB-BD31-4B8C-83A1-F6EECF244321}">
+                <p14:modId xmlns:p14="http://schemas.microsoft.com/office/powerpoint/2010/main" val="1916119823"/>
+              </p:ext>
+            </p:extLst>
+          </p:nvPr>
+        </p:nvGraphicFramePr>
+        <p:xfrm>
+          <a:off x="913775" y="1443770"/>
+          <a:ext cx="10530879" cy="5090160"/>
+        </p:xfrm>
+        <a:graphic>
+          <a:graphicData uri="http://schemas.openxmlformats.org/drawingml/2006/table">
+            <a:tbl>
+              <a:tblPr firstRow="1" bandRow="1">
+                <a:tableStyleId>{073A0DAA-6AF3-43AB-8588-CEC1D06C72B9}</a:tableStyleId>
+              </a:tblPr>
+              <a:tblGrid>
+                <a:gridCol w="1178794">
+                  <a:extLst>
+                    <a:ext uri="{9D8B030D-6E8A-4147-A177-3AD203B41FA5}">
+                      <a16:colId xmlns:a16="http://schemas.microsoft.com/office/drawing/2014/main" val="338602619"/>
+                    </a:ext>
+                  </a:extLst>
+                </a:gridCol>
+                <a:gridCol w="1995854">
+                  <a:extLst>
+                    <a:ext uri="{9D8B030D-6E8A-4147-A177-3AD203B41FA5}">
+                      <a16:colId xmlns:a16="http://schemas.microsoft.com/office/drawing/2014/main" val="1728608955"/>
+                    </a:ext>
+                  </a:extLst>
+                </a:gridCol>
+                <a:gridCol w="1694692">
+                  <a:extLst>
+                    <a:ext uri="{9D8B030D-6E8A-4147-A177-3AD203B41FA5}">
+                      <a16:colId xmlns:a16="http://schemas.microsoft.com/office/drawing/2014/main" val="611120877"/>
+                    </a:ext>
+                  </a:extLst>
+                </a:gridCol>
+                <a:gridCol w="1161494">
+                  <a:extLst>
+                    <a:ext uri="{9D8B030D-6E8A-4147-A177-3AD203B41FA5}">
+                      <a16:colId xmlns:a16="http://schemas.microsoft.com/office/drawing/2014/main" val="560338395"/>
+                    </a:ext>
+                  </a:extLst>
+                </a:gridCol>
+                <a:gridCol w="2144297">
+                  <a:extLst>
+                    <a:ext uri="{9D8B030D-6E8A-4147-A177-3AD203B41FA5}">
+                      <a16:colId xmlns:a16="http://schemas.microsoft.com/office/drawing/2014/main" val="4010531375"/>
+                    </a:ext>
+                  </a:extLst>
+                </a:gridCol>
+                <a:gridCol w="2355748">
+                  <a:extLst>
+                    <a:ext uri="{9D8B030D-6E8A-4147-A177-3AD203B41FA5}">
+                      <a16:colId xmlns:a16="http://schemas.microsoft.com/office/drawing/2014/main" val="3727696881"/>
+                    </a:ext>
+                  </a:extLst>
+                </a:gridCol>
+              </a:tblGrid>
+              <a:tr h="370840">
+                <a:tc>
+                  <a:txBody>
+                    <a:bodyPr/>
+                    <a:lstStyle/>
+                    <a:p>
+                      <a:pPr algn="ctr"/>
+                      <a:r>
+                        <a:rPr lang="en-US" dirty="0"/>
+                        <a:t>CLUSTERS</a:t>
+                      </a:r>
+                    </a:p>
+                  </a:txBody>
+                  <a:tcPr/>
+                </a:tc>
+                <a:tc>
+                  <a:txBody>
+                    <a:bodyPr/>
+                    <a:lstStyle/>
+                    <a:p>
+                      <a:pPr algn="ctr"/>
+                      <a:r>
+                        <a:rPr lang="en-US" dirty="0"/>
+                        <a:t>SIHOUETTE VALUE</a:t>
+                      </a:r>
+                    </a:p>
+                  </a:txBody>
+                  <a:tcPr/>
+                </a:tc>
+                <a:tc>
+                  <a:txBody>
+                    <a:bodyPr/>
+                    <a:lstStyle/>
+                    <a:p>
+                      <a:pPr algn="ctr"/>
+                      <a:r>
+                        <a:rPr lang="en-US" dirty="0"/>
+                        <a:t>TRAINING TIME</a:t>
+                      </a:r>
+                    </a:p>
+                    <a:p>
+                      <a:pPr algn="ctr"/>
+                      <a:r>
+                        <a:rPr lang="en-US" dirty="0"/>
+                        <a:t>(Sec)</a:t>
+                      </a:r>
+                    </a:p>
+                  </a:txBody>
+                  <a:tcPr/>
+                </a:tc>
+                <a:tc>
+                  <a:txBody>
+                    <a:bodyPr/>
+                    <a:lstStyle/>
+                    <a:p>
+                      <a:pPr algn="ctr"/>
+                      <a:r>
+                        <a:rPr lang="en-US" dirty="0"/>
+                        <a:t>CLUSTERS</a:t>
+                      </a:r>
+                    </a:p>
+                  </a:txBody>
+                  <a:tcPr/>
+                </a:tc>
+                <a:tc>
+                  <a:txBody>
+                    <a:bodyPr/>
+                    <a:lstStyle/>
+                    <a:p>
+                      <a:pPr algn="ctr"/>
+                      <a:r>
+                        <a:rPr lang="en-US" dirty="0"/>
+                        <a:t>SILHOUETTE VALUE</a:t>
+                      </a:r>
+                    </a:p>
+                  </a:txBody>
+                  <a:tcPr/>
+                </a:tc>
+                <a:tc>
+                  <a:txBody>
+                    <a:bodyPr/>
+                    <a:lstStyle/>
+                    <a:p>
+                      <a:pPr algn="ctr"/>
+                      <a:r>
+                        <a:rPr lang="en-US" dirty="0"/>
+                        <a:t>TRAINING TIME</a:t>
+                      </a:r>
+                    </a:p>
+                    <a:p>
+                      <a:pPr algn="ctr"/>
+                      <a:r>
+                        <a:rPr lang="en-US" dirty="0"/>
+                        <a:t>(Sec)</a:t>
+                      </a:r>
+                    </a:p>
+                  </a:txBody>
+                  <a:tcPr/>
+                </a:tc>
+                <a:extLst>
+                  <a:ext uri="{0D108BD9-81ED-4DB2-BD59-A6C34878D82A}">
+                    <a16:rowId xmlns:a16="http://schemas.microsoft.com/office/drawing/2014/main" val="79857652"/>
+                  </a:ext>
+                </a:extLst>
+              </a:tr>
+              <a:tr h="370840">
+                <a:tc>
+                  <a:txBody>
+                    <a:bodyPr/>
+                    <a:lstStyle/>
+                    <a:p>
+                      <a:pPr algn="ctr"/>
+                      <a:r>
+                        <a:rPr lang="en-US" dirty="0"/>
+                        <a:t>2</a:t>
+                      </a:r>
+                    </a:p>
+                  </a:txBody>
+                  <a:tcPr/>
+                </a:tc>
+                <a:tc>
+                  <a:txBody>
+                    <a:bodyPr/>
+                    <a:lstStyle/>
+                    <a:p>
+                      <a:pPr algn="ctr"/>
+                      <a:r>
+                        <a:rPr lang="en-US" dirty="0"/>
+                        <a:t>-0.006</a:t>
+                      </a:r>
+                    </a:p>
+                  </a:txBody>
+                  <a:tcPr/>
+                </a:tc>
+                <a:tc>
+                  <a:txBody>
+                    <a:bodyPr/>
+                    <a:lstStyle/>
+                    <a:p>
+                      <a:pPr algn="ctr"/>
+                      <a:r>
+                        <a:rPr lang="en-US" dirty="0"/>
+                        <a:t>26.17</a:t>
+                      </a:r>
+                    </a:p>
+                  </a:txBody>
+                  <a:tcPr/>
+                </a:tc>
+                <a:tc>
+                  <a:txBody>
+                    <a:bodyPr/>
+                    <a:lstStyle/>
+                    <a:p>
+                      <a:pPr algn="ctr"/>
+                      <a:r>
+                        <a:rPr lang="en-US" dirty="0"/>
+                        <a:t>14</a:t>
+                      </a:r>
+                    </a:p>
+                  </a:txBody>
+                  <a:tcPr/>
+                </a:tc>
+                <a:tc>
+                  <a:txBody>
+                    <a:bodyPr/>
+                    <a:lstStyle/>
+                    <a:p>
+                      <a:pPr algn="ctr"/>
+                      <a:r>
+                        <a:rPr lang="en-US" dirty="0"/>
+                        <a:t>0.017</a:t>
+                      </a:r>
+                    </a:p>
+                  </a:txBody>
+                  <a:tcPr/>
+                </a:tc>
+                <a:tc>
+                  <a:txBody>
+                    <a:bodyPr/>
+                    <a:lstStyle/>
+                    <a:p>
+                      <a:pPr algn="ctr"/>
+                      <a:r>
+                        <a:rPr lang="en-US" dirty="0"/>
+                        <a:t>51.75</a:t>
+                      </a:r>
+                    </a:p>
+                  </a:txBody>
+                  <a:tcPr/>
+                </a:tc>
+                <a:extLst>
+                  <a:ext uri="{0D108BD9-81ED-4DB2-BD59-A6C34878D82A}">
+                    <a16:rowId xmlns:a16="http://schemas.microsoft.com/office/drawing/2014/main" val="838917877"/>
+                  </a:ext>
+                </a:extLst>
+              </a:tr>
+              <a:tr h="370840">
+                <a:tc>
+                  <a:txBody>
+                    <a:bodyPr/>
+                    <a:lstStyle/>
+                    <a:p>
+                      <a:pPr algn="ctr"/>
+                      <a:r>
+                        <a:rPr lang="en-US" dirty="0"/>
+                        <a:t>3</a:t>
+                      </a:r>
+                    </a:p>
+                  </a:txBody>
+                  <a:tcPr/>
+                </a:tc>
+                <a:tc>
+                  <a:txBody>
+                    <a:bodyPr/>
+                    <a:lstStyle/>
+                    <a:p>
+                      <a:pPr algn="ctr"/>
+                      <a:r>
+                        <a:rPr lang="en-US" dirty="0"/>
+                        <a:t>-0.003</a:t>
+                      </a:r>
+                    </a:p>
+                  </a:txBody>
+                  <a:tcPr/>
+                </a:tc>
+                <a:tc>
+                  <a:txBody>
+                    <a:bodyPr/>
+                    <a:lstStyle/>
+                    <a:p>
+                      <a:pPr algn="ctr"/>
+                      <a:r>
+                        <a:rPr lang="en-US" dirty="0"/>
+                        <a:t>28.08</a:t>
+                      </a:r>
+                    </a:p>
+                  </a:txBody>
+                  <a:tcPr/>
+                </a:tc>
+                <a:tc>
+                  <a:txBody>
+                    <a:bodyPr/>
+                    <a:lstStyle/>
+                    <a:p>
+                      <a:pPr algn="ctr"/>
+                      <a:r>
+                        <a:rPr lang="en-US" dirty="0"/>
+                        <a:t>15</a:t>
+                      </a:r>
+                    </a:p>
+                  </a:txBody>
+                  <a:tcPr/>
+                </a:tc>
+                <a:tc>
+                  <a:txBody>
+                    <a:bodyPr/>
+                    <a:lstStyle/>
+                    <a:p>
+                      <a:pPr algn="ctr"/>
+                      <a:r>
+                        <a:rPr lang="en-US" dirty="0"/>
+                        <a:t>0.015</a:t>
+                      </a:r>
+                    </a:p>
+                  </a:txBody>
+                  <a:tcPr/>
+                </a:tc>
+                <a:tc>
+                  <a:txBody>
+                    <a:bodyPr/>
+                    <a:lstStyle/>
+                    <a:p>
+                      <a:pPr algn="ctr"/>
+                      <a:r>
+                        <a:rPr lang="en-US" dirty="0"/>
+                        <a:t>56.36</a:t>
+                      </a:r>
+                    </a:p>
+                  </a:txBody>
+                  <a:tcPr/>
+                </a:tc>
+                <a:extLst>
+                  <a:ext uri="{0D108BD9-81ED-4DB2-BD59-A6C34878D82A}">
+                    <a16:rowId xmlns:a16="http://schemas.microsoft.com/office/drawing/2014/main" val="1733509954"/>
+                  </a:ext>
+                </a:extLst>
+              </a:tr>
+              <a:tr h="370840">
+                <a:tc>
+                  <a:txBody>
+                    <a:bodyPr/>
+                    <a:lstStyle/>
+                    <a:p>
+                      <a:pPr algn="ctr"/>
+                      <a:r>
+                        <a:rPr lang="en-US" dirty="0"/>
+                        <a:t>4</a:t>
+                      </a:r>
+                    </a:p>
+                  </a:txBody>
+                  <a:tcPr/>
+                </a:tc>
+                <a:tc>
+                  <a:txBody>
+                    <a:bodyPr/>
+                    <a:lstStyle/>
+                    <a:p>
+                      <a:pPr algn="ctr"/>
+                      <a:r>
+                        <a:rPr lang="en-US" dirty="0"/>
+                        <a:t>-0.002</a:t>
+                      </a:r>
+                    </a:p>
+                  </a:txBody>
+                  <a:tcPr/>
+                </a:tc>
+                <a:tc>
+                  <a:txBody>
+                    <a:bodyPr/>
+                    <a:lstStyle/>
+                    <a:p>
+                      <a:pPr algn="ctr"/>
+                      <a:r>
+                        <a:rPr lang="en-US" dirty="0"/>
+                        <a:t>28.56</a:t>
+                      </a:r>
+                    </a:p>
+                  </a:txBody>
+                  <a:tcPr/>
+                </a:tc>
+                <a:tc>
+                  <a:txBody>
+                    <a:bodyPr/>
+                    <a:lstStyle/>
+                    <a:p>
+                      <a:pPr algn="ctr"/>
+                      <a:r>
+                        <a:rPr lang="en-US" dirty="0"/>
+                        <a:t>16</a:t>
+                      </a:r>
+                    </a:p>
+                  </a:txBody>
+                  <a:tcPr/>
+                </a:tc>
+                <a:tc>
+                  <a:txBody>
+                    <a:bodyPr/>
+                    <a:lstStyle/>
+                    <a:p>
+                      <a:pPr algn="ctr"/>
+                      <a:r>
+                        <a:rPr lang="en-US" dirty="0"/>
+                        <a:t>0.016</a:t>
+                      </a:r>
+                    </a:p>
+                  </a:txBody>
+                  <a:tcPr/>
+                </a:tc>
+                <a:tc>
+                  <a:txBody>
+                    <a:bodyPr/>
+                    <a:lstStyle/>
+                    <a:p>
+                      <a:pPr algn="ctr"/>
+                      <a:r>
+                        <a:rPr lang="en-US" dirty="0"/>
+                        <a:t>55.47</a:t>
+                      </a:r>
+                    </a:p>
+                  </a:txBody>
+                  <a:tcPr/>
+                </a:tc>
+                <a:extLst>
+                  <a:ext uri="{0D108BD9-81ED-4DB2-BD59-A6C34878D82A}">
+                    <a16:rowId xmlns:a16="http://schemas.microsoft.com/office/drawing/2014/main" val="3609673589"/>
+                  </a:ext>
+                </a:extLst>
+              </a:tr>
+              <a:tr h="370840">
+                <a:tc>
+                  <a:txBody>
+                    <a:bodyPr/>
+                    <a:lstStyle/>
+                    <a:p>
+                      <a:pPr algn="ctr"/>
+                      <a:r>
+                        <a:rPr lang="en-US" dirty="0"/>
+                        <a:t>5</a:t>
+                      </a:r>
+                    </a:p>
+                  </a:txBody>
+                  <a:tcPr/>
+                </a:tc>
+                <a:tc>
+                  <a:txBody>
+                    <a:bodyPr/>
+                    <a:lstStyle/>
+                    <a:p>
+                      <a:pPr algn="ctr"/>
+                      <a:r>
+                        <a:rPr lang="en-US" dirty="0"/>
+                        <a:t>0.002</a:t>
+                      </a:r>
+                    </a:p>
+                  </a:txBody>
+                  <a:tcPr/>
+                </a:tc>
+                <a:tc>
+                  <a:txBody>
+                    <a:bodyPr/>
+                    <a:lstStyle/>
+                    <a:p>
+                      <a:pPr algn="ctr"/>
+                      <a:r>
+                        <a:rPr lang="en-US" dirty="0"/>
+                        <a:t>31.67</a:t>
+                      </a:r>
+                    </a:p>
+                  </a:txBody>
+                  <a:tcPr/>
+                </a:tc>
+                <a:tc>
+                  <a:txBody>
+                    <a:bodyPr/>
+                    <a:lstStyle/>
+                    <a:p>
+                      <a:pPr algn="ctr"/>
+                      <a:r>
+                        <a:rPr lang="en-US" dirty="0"/>
+                        <a:t>17</a:t>
+                      </a:r>
+                    </a:p>
+                  </a:txBody>
+                  <a:tcPr/>
+                </a:tc>
+                <a:tc>
+                  <a:txBody>
+                    <a:bodyPr/>
+                    <a:lstStyle/>
+                    <a:p>
+                      <a:pPr algn="ctr"/>
+                      <a:r>
+                        <a:rPr lang="en-US" dirty="0"/>
+                        <a:t>0.019</a:t>
+                      </a:r>
+                    </a:p>
+                  </a:txBody>
+                  <a:tcPr/>
+                </a:tc>
+                <a:tc>
+                  <a:txBody>
+                    <a:bodyPr/>
+                    <a:lstStyle/>
+                    <a:p>
+                      <a:pPr algn="ctr"/>
+                      <a:r>
+                        <a:rPr lang="en-US" dirty="0"/>
+                        <a:t>65.68</a:t>
+                      </a:r>
+                    </a:p>
+                  </a:txBody>
+                  <a:tcPr/>
+                </a:tc>
+                <a:extLst>
+                  <a:ext uri="{0D108BD9-81ED-4DB2-BD59-A6C34878D82A}">
+                    <a16:rowId xmlns:a16="http://schemas.microsoft.com/office/drawing/2014/main" val="3695141167"/>
+                  </a:ext>
+                </a:extLst>
+              </a:tr>
+              <a:tr h="370840">
+                <a:tc>
+                  <a:txBody>
+                    <a:bodyPr/>
+                    <a:lstStyle/>
+                    <a:p>
+                      <a:pPr algn="ctr"/>
+                      <a:r>
+                        <a:rPr lang="en-US" dirty="0"/>
+                        <a:t>6</a:t>
+                      </a:r>
+                    </a:p>
+                  </a:txBody>
+                  <a:tcPr/>
+                </a:tc>
+                <a:tc>
+                  <a:txBody>
+                    <a:bodyPr/>
+                    <a:lstStyle/>
+                    <a:p>
+                      <a:pPr algn="ctr"/>
+                      <a:r>
+                        <a:rPr lang="en-US" dirty="0"/>
+                        <a:t>0.002</a:t>
+                      </a:r>
+                    </a:p>
+                  </a:txBody>
+                  <a:tcPr/>
+                </a:tc>
+                <a:tc>
+                  <a:txBody>
+                    <a:bodyPr/>
+                    <a:lstStyle/>
+                    <a:p>
+                      <a:pPr algn="ctr"/>
+                      <a:r>
+                        <a:rPr lang="en-US" dirty="0"/>
+                        <a:t>35.15</a:t>
+                      </a:r>
+                    </a:p>
+                  </a:txBody>
+                  <a:tcPr/>
+                </a:tc>
+                <a:tc>
+                  <a:txBody>
+                    <a:bodyPr/>
+                    <a:lstStyle/>
+                    <a:p>
+                      <a:pPr algn="ctr"/>
+                      <a:r>
+                        <a:rPr lang="en-US" dirty="0"/>
+                        <a:t>18</a:t>
+                      </a:r>
+                    </a:p>
+                  </a:txBody>
+                  <a:tcPr/>
+                </a:tc>
+                <a:tc>
+                  <a:txBody>
+                    <a:bodyPr/>
+                    <a:lstStyle/>
+                    <a:p>
+                      <a:pPr algn="ctr"/>
+                      <a:r>
+                        <a:rPr lang="en-US" dirty="0"/>
+                        <a:t>0.020</a:t>
+                      </a:r>
+                    </a:p>
+                  </a:txBody>
+                  <a:tcPr/>
+                </a:tc>
+                <a:tc>
+                  <a:txBody>
+                    <a:bodyPr/>
+                    <a:lstStyle/>
+                    <a:p>
+                      <a:pPr algn="ctr"/>
+                      <a:r>
+                        <a:rPr lang="en-US" dirty="0"/>
+                        <a:t>65.99</a:t>
+                      </a:r>
+                    </a:p>
+                  </a:txBody>
+                  <a:tcPr/>
+                </a:tc>
+                <a:extLst>
+                  <a:ext uri="{0D108BD9-81ED-4DB2-BD59-A6C34878D82A}">
+                    <a16:rowId xmlns:a16="http://schemas.microsoft.com/office/drawing/2014/main" val="3953743527"/>
+                  </a:ext>
+                </a:extLst>
+              </a:tr>
+              <a:tr h="370840">
+                <a:tc>
+                  <a:txBody>
+                    <a:bodyPr/>
+                    <a:lstStyle/>
+                    <a:p>
+                      <a:pPr algn="ctr"/>
+                      <a:r>
+                        <a:rPr lang="en-US" dirty="0"/>
+                        <a:t>7</a:t>
+                      </a:r>
+                    </a:p>
+                  </a:txBody>
+                  <a:tcPr/>
+                </a:tc>
+                <a:tc>
+                  <a:txBody>
+                    <a:bodyPr/>
+                    <a:lstStyle/>
+                    <a:p>
+                      <a:pPr algn="ctr"/>
+                      <a:r>
+                        <a:rPr lang="en-US" dirty="0"/>
+                        <a:t>0.004</a:t>
+                      </a:r>
+                    </a:p>
+                  </a:txBody>
+                  <a:tcPr/>
+                </a:tc>
+                <a:tc>
+                  <a:txBody>
+                    <a:bodyPr/>
+                    <a:lstStyle/>
+                    <a:p>
+                      <a:pPr algn="ctr"/>
+                      <a:r>
+                        <a:rPr lang="en-US" dirty="0"/>
+                        <a:t>36.53</a:t>
+                      </a:r>
+                    </a:p>
+                  </a:txBody>
+                  <a:tcPr/>
+                </a:tc>
+                <a:tc>
+                  <a:txBody>
+                    <a:bodyPr/>
+                    <a:lstStyle/>
+                    <a:p>
+                      <a:pPr algn="ctr"/>
+                      <a:r>
+                        <a:rPr lang="en-US" dirty="0"/>
+                        <a:t>19</a:t>
+                      </a:r>
+                    </a:p>
+                  </a:txBody>
+                  <a:tcPr/>
+                </a:tc>
+                <a:tc>
+                  <a:txBody>
+                    <a:bodyPr/>
+                    <a:lstStyle/>
+                    <a:p>
+                      <a:pPr algn="ctr"/>
+                      <a:r>
+                        <a:rPr lang="en-US" dirty="0"/>
+                        <a:t>0.021</a:t>
+                      </a:r>
+                    </a:p>
+                  </a:txBody>
+                  <a:tcPr/>
+                </a:tc>
+                <a:tc>
+                  <a:txBody>
+                    <a:bodyPr/>
+                    <a:lstStyle/>
+                    <a:p>
+                      <a:pPr algn="ctr"/>
+                      <a:r>
+                        <a:rPr lang="en-US" dirty="0"/>
+                        <a:t>66.00</a:t>
+                      </a:r>
+                    </a:p>
+                  </a:txBody>
+                  <a:tcPr/>
+                </a:tc>
+                <a:extLst>
+                  <a:ext uri="{0D108BD9-81ED-4DB2-BD59-A6C34878D82A}">
+                    <a16:rowId xmlns:a16="http://schemas.microsoft.com/office/drawing/2014/main" val="603067212"/>
+                  </a:ext>
+                </a:extLst>
+              </a:tr>
+              <a:tr h="370840">
+                <a:tc>
+                  <a:txBody>
+                    <a:bodyPr/>
+                    <a:lstStyle/>
+                    <a:p>
+                      <a:pPr algn="ctr"/>
+                      <a:r>
+                        <a:rPr lang="en-US" dirty="0"/>
+                        <a:t>8</a:t>
+                      </a:r>
+                    </a:p>
+                  </a:txBody>
+                  <a:tcPr/>
+                </a:tc>
+                <a:tc>
+                  <a:txBody>
+                    <a:bodyPr/>
+                    <a:lstStyle/>
+                    <a:p>
+                      <a:pPr algn="ctr"/>
+                      <a:r>
+                        <a:rPr lang="en-US" dirty="0"/>
+                        <a:t>0.006</a:t>
+                      </a:r>
+                    </a:p>
+                  </a:txBody>
+                  <a:tcPr/>
+                </a:tc>
+                <a:tc>
+                  <a:txBody>
+                    <a:bodyPr/>
+                    <a:lstStyle/>
+                    <a:p>
+                      <a:pPr algn="ctr"/>
+                      <a:r>
+                        <a:rPr lang="en-US" dirty="0"/>
+                        <a:t>37.03</a:t>
+                      </a:r>
+                    </a:p>
+                  </a:txBody>
+                  <a:tcPr/>
+                </a:tc>
+                <a:tc>
+                  <a:txBody>
+                    <a:bodyPr/>
+                    <a:lstStyle/>
+                    <a:p>
+                      <a:pPr algn="ctr"/>
+                      <a:r>
+                        <a:rPr lang="en-US" dirty="0"/>
+                        <a:t>20</a:t>
+                      </a:r>
+                    </a:p>
+                  </a:txBody>
+                  <a:tcPr/>
+                </a:tc>
+                <a:tc>
+                  <a:txBody>
+                    <a:bodyPr/>
+                    <a:lstStyle/>
+                    <a:p>
+                      <a:pPr algn="ctr"/>
+                      <a:r>
+                        <a:rPr lang="en-US" dirty="0"/>
+                        <a:t>0.022</a:t>
+                      </a:r>
+                    </a:p>
+                  </a:txBody>
+                  <a:tcPr/>
+                </a:tc>
+                <a:tc>
+                  <a:txBody>
+                    <a:bodyPr/>
+                    <a:lstStyle/>
+                    <a:p>
+                      <a:pPr algn="ctr"/>
+                      <a:r>
+                        <a:rPr lang="en-US" dirty="0"/>
+                        <a:t>66.40</a:t>
+                      </a:r>
+                    </a:p>
+                  </a:txBody>
+                  <a:tcPr/>
+                </a:tc>
+                <a:extLst>
+                  <a:ext uri="{0D108BD9-81ED-4DB2-BD59-A6C34878D82A}">
+                    <a16:rowId xmlns:a16="http://schemas.microsoft.com/office/drawing/2014/main" val="1583750956"/>
+                  </a:ext>
+                </a:extLst>
+              </a:tr>
+              <a:tr h="370840">
+                <a:tc>
+                  <a:txBody>
+                    <a:bodyPr/>
+                    <a:lstStyle/>
+                    <a:p>
+                      <a:pPr algn="ctr"/>
+                      <a:r>
+                        <a:rPr lang="en-US" dirty="0"/>
+                        <a:t>9</a:t>
+                      </a:r>
+                    </a:p>
+                  </a:txBody>
+                  <a:tcPr/>
+                </a:tc>
+                <a:tc>
+                  <a:txBody>
+                    <a:bodyPr/>
+                    <a:lstStyle/>
+                    <a:p>
+                      <a:pPr algn="ctr"/>
+                      <a:r>
+                        <a:rPr lang="en-US" dirty="0"/>
+                        <a:t>0.009</a:t>
+                      </a:r>
+                    </a:p>
+                  </a:txBody>
+                  <a:tcPr/>
+                </a:tc>
+                <a:tc>
+                  <a:txBody>
+                    <a:bodyPr/>
+                    <a:lstStyle/>
+                    <a:p>
+                      <a:pPr algn="ctr"/>
+                      <a:r>
+                        <a:rPr lang="en-US" dirty="0"/>
+                        <a:t>42.22</a:t>
+                      </a:r>
+                    </a:p>
+                  </a:txBody>
+                  <a:tcPr/>
+                </a:tc>
+                <a:tc>
+                  <a:txBody>
+                    <a:bodyPr/>
+                    <a:lstStyle/>
+                    <a:p>
+                      <a:pPr algn="ctr"/>
+                      <a:r>
+                        <a:rPr lang="en-US" dirty="0"/>
+                        <a:t>21</a:t>
+                      </a:r>
+                    </a:p>
+                  </a:txBody>
+                  <a:tcPr/>
+                </a:tc>
+                <a:tc>
+                  <a:txBody>
+                    <a:bodyPr/>
+                    <a:lstStyle/>
+                    <a:p>
+                      <a:pPr algn="ctr"/>
+                      <a:r>
+                        <a:rPr lang="en-US" dirty="0"/>
+                        <a:t>0.024</a:t>
+                      </a:r>
+                    </a:p>
+                  </a:txBody>
+                  <a:tcPr/>
+                </a:tc>
+                <a:tc>
+                  <a:txBody>
+                    <a:bodyPr/>
+                    <a:lstStyle/>
+                    <a:p>
+                      <a:pPr algn="ctr"/>
+                      <a:r>
+                        <a:rPr lang="en-US" dirty="0"/>
+                        <a:t>71.24</a:t>
+                      </a:r>
+                    </a:p>
+                  </a:txBody>
+                  <a:tcPr/>
+                </a:tc>
+                <a:extLst>
+                  <a:ext uri="{0D108BD9-81ED-4DB2-BD59-A6C34878D82A}">
+                    <a16:rowId xmlns:a16="http://schemas.microsoft.com/office/drawing/2014/main" val="234767695"/>
+                  </a:ext>
+                </a:extLst>
+              </a:tr>
+              <a:tr h="370840">
+                <a:tc>
+                  <a:txBody>
+                    <a:bodyPr/>
+                    <a:lstStyle/>
+                    <a:p>
+                      <a:pPr algn="ctr"/>
+                      <a:r>
+                        <a:rPr lang="en-US" dirty="0"/>
+                        <a:t>10</a:t>
+                      </a:r>
+                    </a:p>
+                  </a:txBody>
+                  <a:tcPr/>
+                </a:tc>
+                <a:tc>
+                  <a:txBody>
+                    <a:bodyPr/>
+                    <a:lstStyle/>
+                    <a:p>
+                      <a:pPr algn="ctr"/>
+                      <a:r>
+                        <a:rPr lang="en-US" dirty="0"/>
+                        <a:t>0.009</a:t>
+                      </a:r>
+                    </a:p>
+                  </a:txBody>
+                  <a:tcPr/>
+                </a:tc>
+                <a:tc>
+                  <a:txBody>
+                    <a:bodyPr/>
+                    <a:lstStyle/>
+                    <a:p>
+                      <a:pPr algn="ctr"/>
+                      <a:r>
+                        <a:rPr lang="en-US" dirty="0"/>
+                        <a:t>45.15</a:t>
+                      </a:r>
+                    </a:p>
+                  </a:txBody>
+                  <a:tcPr/>
+                </a:tc>
+                <a:tc>
+                  <a:txBody>
+                    <a:bodyPr/>
+                    <a:lstStyle/>
+                    <a:p>
+                      <a:pPr algn="ctr"/>
+                      <a:r>
+                        <a:rPr lang="en-US" dirty="0"/>
+                        <a:t>22</a:t>
+                      </a:r>
+                    </a:p>
+                  </a:txBody>
+                  <a:tcPr/>
+                </a:tc>
+                <a:tc>
+                  <a:txBody>
+                    <a:bodyPr/>
+                    <a:lstStyle/>
+                    <a:p>
+                      <a:pPr algn="ctr"/>
+                      <a:r>
+                        <a:rPr lang="en-US" dirty="0"/>
+                        <a:t>0.024</a:t>
+                      </a:r>
+                    </a:p>
+                  </a:txBody>
+                  <a:tcPr/>
+                </a:tc>
+                <a:tc>
+                  <a:txBody>
+                    <a:bodyPr/>
+                    <a:lstStyle/>
+                    <a:p>
+                      <a:pPr algn="ctr"/>
+                      <a:r>
+                        <a:rPr lang="en-US" dirty="0"/>
+                        <a:t>72.98</a:t>
+                      </a:r>
+                    </a:p>
+                  </a:txBody>
+                  <a:tcPr/>
+                </a:tc>
+                <a:extLst>
+                  <a:ext uri="{0D108BD9-81ED-4DB2-BD59-A6C34878D82A}">
+                    <a16:rowId xmlns:a16="http://schemas.microsoft.com/office/drawing/2014/main" val="3742627564"/>
+                  </a:ext>
+                </a:extLst>
+              </a:tr>
+              <a:tr h="370840">
+                <a:tc>
+                  <a:txBody>
+                    <a:bodyPr/>
+                    <a:lstStyle/>
+                    <a:p>
+                      <a:pPr algn="ctr"/>
+                      <a:r>
+                        <a:rPr lang="en-US" dirty="0"/>
+                        <a:t>11</a:t>
+                      </a:r>
+                    </a:p>
+                  </a:txBody>
+                  <a:tcPr/>
+                </a:tc>
+                <a:tc>
+                  <a:txBody>
+                    <a:bodyPr/>
+                    <a:lstStyle/>
+                    <a:p>
+                      <a:pPr algn="ctr"/>
+                      <a:r>
+                        <a:rPr lang="en-US" dirty="0"/>
+                        <a:t>0.01</a:t>
+                      </a:r>
+                    </a:p>
+                  </a:txBody>
+                  <a:tcPr/>
+                </a:tc>
+                <a:tc>
+                  <a:txBody>
+                    <a:bodyPr/>
+                    <a:lstStyle/>
+                    <a:p>
+                      <a:pPr algn="ctr"/>
+                      <a:r>
+                        <a:rPr lang="en-US" dirty="0"/>
+                        <a:t>42.73</a:t>
+                      </a:r>
+                    </a:p>
+                  </a:txBody>
+                  <a:tcPr/>
+                </a:tc>
+                <a:tc>
+                  <a:txBody>
+                    <a:bodyPr/>
+                    <a:lstStyle/>
+                    <a:p>
+                      <a:pPr algn="ctr"/>
+                      <a:r>
+                        <a:rPr lang="en-US" dirty="0"/>
+                        <a:t>23</a:t>
+                      </a:r>
+                    </a:p>
+                  </a:txBody>
+                  <a:tcPr/>
+                </a:tc>
+                <a:tc>
+                  <a:txBody>
+                    <a:bodyPr/>
+                    <a:lstStyle/>
+                    <a:p>
+                      <a:pPr algn="ctr"/>
+                      <a:r>
+                        <a:rPr lang="en-US" dirty="0"/>
+                        <a:t>0.029</a:t>
+                      </a:r>
+                    </a:p>
+                  </a:txBody>
+                  <a:tcPr/>
+                </a:tc>
+                <a:tc>
+                  <a:txBody>
+                    <a:bodyPr/>
+                    <a:lstStyle/>
+                    <a:p>
+                      <a:pPr algn="ctr"/>
+                      <a:r>
+                        <a:rPr lang="en-US" dirty="0"/>
+                        <a:t>73.82</a:t>
+                      </a:r>
+                    </a:p>
+                  </a:txBody>
+                  <a:tcPr/>
+                </a:tc>
+                <a:extLst>
+                  <a:ext uri="{0D108BD9-81ED-4DB2-BD59-A6C34878D82A}">
+                    <a16:rowId xmlns:a16="http://schemas.microsoft.com/office/drawing/2014/main" val="1851148357"/>
+                  </a:ext>
+                </a:extLst>
+              </a:tr>
+              <a:tr h="370840">
+                <a:tc>
+                  <a:txBody>
+                    <a:bodyPr/>
+                    <a:lstStyle/>
+                    <a:p>
+                      <a:pPr algn="ctr"/>
+                      <a:r>
+                        <a:rPr lang="en-US" dirty="0"/>
+                        <a:t>12</a:t>
+                      </a:r>
+                    </a:p>
+                  </a:txBody>
+                  <a:tcPr/>
+                </a:tc>
+                <a:tc>
+                  <a:txBody>
+                    <a:bodyPr/>
+                    <a:lstStyle/>
+                    <a:p>
+                      <a:pPr algn="ctr"/>
+                      <a:r>
+                        <a:rPr lang="en-US" dirty="0"/>
+                        <a:t>0.007</a:t>
+                      </a:r>
+                    </a:p>
+                  </a:txBody>
+                  <a:tcPr/>
+                </a:tc>
+                <a:tc>
+                  <a:txBody>
+                    <a:bodyPr/>
+                    <a:lstStyle/>
+                    <a:p>
+                      <a:pPr algn="ctr"/>
+                      <a:r>
+                        <a:rPr lang="en-US" dirty="0"/>
+                        <a:t>46.68</a:t>
+                      </a:r>
+                    </a:p>
+                  </a:txBody>
+                  <a:tcPr/>
+                </a:tc>
+                <a:tc>
+                  <a:txBody>
+                    <a:bodyPr/>
+                    <a:lstStyle/>
+                    <a:p>
+                      <a:pPr algn="ctr"/>
+                      <a:r>
+                        <a:rPr lang="en-US" dirty="0"/>
+                        <a:t>24</a:t>
+                      </a:r>
+                    </a:p>
+                  </a:txBody>
+                  <a:tcPr/>
+                </a:tc>
+                <a:tc>
+                  <a:txBody>
+                    <a:bodyPr/>
+                    <a:lstStyle/>
+                    <a:p>
+                      <a:pPr algn="ctr"/>
+                      <a:r>
+                        <a:rPr lang="en-US" dirty="0"/>
+                        <a:t>0.027</a:t>
+                      </a:r>
+                    </a:p>
+                  </a:txBody>
+                  <a:tcPr/>
+                </a:tc>
+                <a:tc>
+                  <a:txBody>
+                    <a:bodyPr/>
+                    <a:lstStyle/>
+                    <a:p>
+                      <a:pPr algn="ctr"/>
+                      <a:r>
+                        <a:rPr lang="en-US" dirty="0"/>
+                        <a:t>72.95</a:t>
+                      </a:r>
+                    </a:p>
+                  </a:txBody>
+                  <a:tcPr/>
+                </a:tc>
+                <a:extLst>
+                  <a:ext uri="{0D108BD9-81ED-4DB2-BD59-A6C34878D82A}">
+                    <a16:rowId xmlns:a16="http://schemas.microsoft.com/office/drawing/2014/main" val="2178244416"/>
+                  </a:ext>
+                </a:extLst>
+              </a:tr>
+              <a:tr h="370840">
+                <a:tc>
+                  <a:txBody>
+                    <a:bodyPr/>
+                    <a:lstStyle/>
+                    <a:p>
+                      <a:pPr algn="ctr"/>
+                      <a:r>
+                        <a:rPr lang="en-US" dirty="0"/>
+                        <a:t>13</a:t>
+                      </a:r>
+                    </a:p>
+                  </a:txBody>
+                  <a:tcPr/>
+                </a:tc>
+                <a:tc>
+                  <a:txBody>
+                    <a:bodyPr/>
+                    <a:lstStyle/>
+                    <a:p>
+                      <a:pPr algn="ctr"/>
+                      <a:r>
+                        <a:rPr lang="en-US" dirty="0"/>
+                        <a:t>0.016</a:t>
+                      </a:r>
+                    </a:p>
+                  </a:txBody>
+                  <a:tcPr/>
+                </a:tc>
+                <a:tc>
+                  <a:txBody>
+                    <a:bodyPr/>
+                    <a:lstStyle/>
+                    <a:p>
+                      <a:pPr algn="ctr"/>
+                      <a:r>
+                        <a:rPr lang="en-US" dirty="0"/>
+                        <a:t>50.25</a:t>
+                      </a:r>
+                    </a:p>
+                  </a:txBody>
+                  <a:tcPr/>
+                </a:tc>
+                <a:tc>
+                  <a:txBody>
+                    <a:bodyPr/>
+                    <a:lstStyle/>
+                    <a:p>
+                      <a:pPr algn="ctr"/>
+                      <a:r>
+                        <a:rPr lang="en-US" dirty="0"/>
+                        <a:t>25</a:t>
+                      </a:r>
+                    </a:p>
+                  </a:txBody>
+                  <a:tcPr/>
+                </a:tc>
+                <a:tc>
+                  <a:txBody>
+                    <a:bodyPr/>
+                    <a:lstStyle/>
+                    <a:p>
+                      <a:pPr algn="ctr"/>
+                      <a:r>
+                        <a:rPr lang="en-US" dirty="0"/>
+                        <a:t>0.031</a:t>
+                      </a:r>
+                    </a:p>
+                  </a:txBody>
+                  <a:tcPr/>
+                </a:tc>
+                <a:tc>
+                  <a:txBody>
+                    <a:bodyPr/>
+                    <a:lstStyle/>
+                    <a:p>
+                      <a:pPr algn="ctr"/>
+                      <a:r>
+                        <a:rPr lang="en-US" dirty="0"/>
+                        <a:t>74.10</a:t>
+                      </a:r>
+                    </a:p>
+                  </a:txBody>
+                  <a:tcPr/>
+                </a:tc>
+                <a:extLst>
+                  <a:ext uri="{0D108BD9-81ED-4DB2-BD59-A6C34878D82A}">
+                    <a16:rowId xmlns:a16="http://schemas.microsoft.com/office/drawing/2014/main" val="1913682942"/>
+                  </a:ext>
+                </a:extLst>
+              </a:tr>
+            </a:tbl>
+          </a:graphicData>
+        </a:graphic>
+      </p:graphicFrame>
     </p:spTree>
     <p:extLst>
       <p:ext uri="{BB962C8B-B14F-4D97-AF65-F5344CB8AC3E}">
@@ -6918,7 +8702,7 @@
           <a:p>
             <a:r>
               <a:rPr lang="en-US" dirty="0"/>
-              <a:t>Agglomerative Hierarchical Clustering</a:t>
+              <a:t>Agglomerative Hierarchical Clustering (AHC)</a:t>
             </a:r>
           </a:p>
         </p:txBody>
@@ -6939,11 +8723,86 @@
             <p:ph sz="quarter" idx="13"/>
           </p:nvPr>
         </p:nvSpPr>
-        <p:spPr/>
-        <p:txBody>
-          <a:bodyPr/>
+        <p:spPr>
+          <a:xfrm>
+            <a:off x="913774" y="2127380"/>
+            <a:ext cx="10363826" cy="4254759"/>
+          </a:xfrm>
+        </p:spPr>
+        <p:txBody>
+          <a:bodyPr>
+            <a:noAutofit/>
+          </a:bodyPr>
           <a:lstStyle/>
           <a:p>
+            <a:r>
+              <a:rPr lang="en-US" sz="1800" dirty="0"/>
+              <a:t>WHY Hierarchical Clustering</a:t>
+            </a:r>
+          </a:p>
+          <a:p>
+            <a:pPr lvl="1"/>
+            <a:r>
+              <a:rPr lang="en-US" dirty="0"/>
+              <a:t>NUMBER OF CLUSTERS NOT KNOWN BEFOREHAND IN SEVERAL DATA ANALYSIS PROBLEM</a:t>
+            </a:r>
+          </a:p>
+          <a:p>
+            <a:r>
+              <a:rPr lang="en-US" sz="1800" dirty="0"/>
+              <a:t>TWO TYPES</a:t>
+            </a:r>
+          </a:p>
+          <a:p>
+            <a:pPr lvl="1"/>
+            <a:r>
+              <a:rPr lang="en-US" dirty="0"/>
+              <a:t>TOP DOWN : START WITH A ONE LARGE CLUSTER</a:t>
+            </a:r>
+          </a:p>
+          <a:p>
+            <a:pPr lvl="1"/>
+            <a:r>
+              <a:rPr lang="en-US" dirty="0"/>
+              <a:t>BOTTOM UP : INITALIZE EACH DATA POINTS AS ITS OWN CLUSTER AND RECURSIVELY MERGE THE CLUSTERS</a:t>
+            </a:r>
+          </a:p>
+          <a:p>
+            <a:r>
+              <a:rPr lang="en-US" sz="1800" dirty="0"/>
+              <a:t>CLUSTER DISTANCE</a:t>
+            </a:r>
+          </a:p>
+          <a:p>
+            <a:pPr lvl="1"/>
+            <a:r>
+              <a:rPr lang="en-US" dirty="0"/>
+              <a:t>SINGLE LINKAGE</a:t>
+            </a:r>
+          </a:p>
+          <a:p>
+            <a:pPr lvl="1"/>
+            <a:r>
+              <a:rPr lang="en-US" dirty="0"/>
+              <a:t>COMPLETE LINKAGE</a:t>
+            </a:r>
+          </a:p>
+          <a:p>
+            <a:pPr lvl="1"/>
+            <a:r>
+              <a:rPr lang="en-US" dirty="0"/>
+              <a:t>AVERAGE LINKAGE</a:t>
+            </a:r>
+          </a:p>
+          <a:p>
+            <a:pPr lvl="1"/>
+            <a:r>
+              <a:rPr lang="en-US" dirty="0"/>
+              <a:t>WARD LINKAGE : minimizes the total within-cluster variance</a:t>
+            </a:r>
+          </a:p>
+          <a:p>
+            <a:pPr lvl="1"/>
             <a:endParaRPr lang="en-US" dirty="0"/>
           </a:p>
         </p:txBody>
@@ -6983,7 +8842,7 @@
           <p:cNvPr id="2" name="Title 1">
             <a:extLst>
               <a:ext uri="{FF2B5EF4-FFF2-40B4-BE49-F238E27FC236}">
-                <a16:creationId xmlns:a16="http://schemas.microsoft.com/office/drawing/2014/main" id="{20762814-E21A-42C6-BAF3-F8CABFB00A57}"/>
+                <a16:creationId xmlns:a16="http://schemas.microsoft.com/office/drawing/2014/main" id="{2C4462EA-787F-402E-80AC-A3061CC0B576}"/>
               </a:ext>
             </a:extLst>
           </p:cNvPr>
@@ -7000,10 +8859,9 @@
           <a:lstStyle/>
           <a:p>
             <a:r>
-              <a:rPr lang="en-US" dirty="0" err="1"/>
-              <a:t>Isomap</a:t>
-            </a:r>
-            <a:endParaRPr lang="en-US" dirty="0"/>
+              <a:rPr lang="en-US" dirty="0"/>
+              <a:t>RESULTS</a:t>
+            </a:r>
           </a:p>
         </p:txBody>
       </p:sp>
@@ -7012,7 +8870,7 @@
           <p:cNvPr id="3" name="Content Placeholder 2">
             <a:extLst>
               <a:ext uri="{FF2B5EF4-FFF2-40B4-BE49-F238E27FC236}">
-                <a16:creationId xmlns:a16="http://schemas.microsoft.com/office/drawing/2014/main" id="{38A0C809-337D-4EF3-868D-1F87E5058E5F}"/>
+                <a16:creationId xmlns:a16="http://schemas.microsoft.com/office/drawing/2014/main" id="{B50468E1-FFE7-42FD-8CB7-9803FF0C88F0}"/>
               </a:ext>
             </a:extLst>
           </p:cNvPr>
@@ -7023,19 +8881,57 @@
             <p:ph sz="quarter" idx="13"/>
           </p:nvPr>
         </p:nvSpPr>
-        <p:spPr/>
+        <p:spPr>
+          <a:xfrm>
+            <a:off x="913774" y="1965876"/>
+            <a:ext cx="10363826" cy="3424107"/>
+          </a:xfrm>
+        </p:spPr>
         <p:txBody>
           <a:bodyPr/>
           <a:lstStyle/>
           <a:p>
-            <a:endParaRPr lang="en-US"/>
-          </a:p>
-        </p:txBody>
-      </p:sp>
+            <a:r>
+              <a:rPr lang="en-US" dirty="0"/>
+              <a:t>AHC</a:t>
+            </a:r>
+          </a:p>
+        </p:txBody>
+      </p:sp>
+      <p:pic>
+        <p:nvPicPr>
+          <p:cNvPr id="4" name="Picture 3"/>
+          <p:cNvPicPr>
+            <a:picLocks noChangeAspect="1"/>
+          </p:cNvPicPr>
+          <p:nvPr/>
+        </p:nvPicPr>
+        <p:blipFill>
+          <a:blip r:embed="rId2">
+            <a:extLst>
+              <a:ext uri="{28A0092B-C50C-407E-A947-70E740481C1C}">
+                <a14:useLocalDpi xmlns:a14="http://schemas.microsoft.com/office/drawing/2010/main" val="0"/>
+              </a:ext>
+            </a:extLst>
+          </a:blip>
+          <a:stretch>
+            <a:fillRect/>
+          </a:stretch>
+        </p:blipFill>
+        <p:spPr>
+          <a:xfrm>
+            <a:off x="1240971" y="2570926"/>
+            <a:ext cx="9658364" cy="3801882"/>
+          </a:xfrm>
+          <a:prstGeom prst="rect">
+            <a:avLst/>
+          </a:prstGeom>
+        </p:spPr>
+      </p:pic>
     </p:spTree>
     <p:extLst>
       <p:ext uri="{BB962C8B-B14F-4D97-AF65-F5344CB8AC3E}">
-        <p14:creationId xmlns:p14="http://schemas.microsoft.com/office/powerpoint/2010/main" val="153062038"/>
+        <p14:creationId xmlns:p14="http://schemas.microsoft.com/office/powerpoint/2010/main" val="3897255410"/>
       </p:ext>
     </p:extLst>
   </p:cSld>
@@ -7064,58 +8960,411 @@
       </p:grpSpPr>
       <p:sp>
         <p:nvSpPr>
-          <p:cNvPr id="2" name="Title 1">
+          <p:cNvPr id="2" name="Title 1"/>
+          <p:cNvSpPr>
+            <a:spLocks noGrp="1"/>
+          </p:cNvSpPr>
+          <p:nvPr>
+            <p:ph type="title"/>
+          </p:nvPr>
+        </p:nvSpPr>
+        <p:spPr>
+          <a:xfrm>
+            <a:off x="997125" y="3604939"/>
+            <a:ext cx="10364451" cy="647651"/>
+          </a:xfrm>
+        </p:spPr>
+        <p:txBody>
+          <a:bodyPr/>
+          <a:lstStyle/>
+          <a:p>
+            <a:r>
+              <a:rPr lang="en-US" dirty="0"/>
+              <a:t>REFERENCES</a:t>
+            </a:r>
+          </a:p>
+        </p:txBody>
+      </p:sp>
+      <p:sp>
+        <p:nvSpPr>
+          <p:cNvPr id="3" name="Content Placeholder 2"/>
+          <p:cNvSpPr>
+            <a:spLocks noGrp="1"/>
+          </p:cNvSpPr>
+          <p:nvPr>
+            <p:ph sz="quarter" idx="13"/>
+          </p:nvPr>
+        </p:nvSpPr>
+        <p:spPr>
+          <a:xfrm>
+            <a:off x="912525" y="4373173"/>
+            <a:ext cx="10363826" cy="2209025"/>
+          </a:xfrm>
+        </p:spPr>
+        <p:txBody>
+          <a:bodyPr>
+            <a:normAutofit/>
+          </a:bodyPr>
+          <a:lstStyle/>
+          <a:p>
+            <a:r>
+              <a:rPr lang="en-US" sz="1800" dirty="0"/>
+              <a:t>LECTURES SLIDES BY DR. CHINMAY HEGDE FOR EE 525X SPRING 2018, ISU</a:t>
+            </a:r>
+          </a:p>
+          <a:p>
+            <a:r>
+              <a:rPr lang="en-US" sz="1800" dirty="0"/>
+              <a:t>https://en.wikipedia.org/wiki/Isomap</a:t>
+            </a:r>
+          </a:p>
+          <a:p>
+            <a:pPr marL="228600" lvl="1">
+              <a:spcBef>
+                <a:spcPts val="1000"/>
+              </a:spcBef>
+            </a:pPr>
+            <a:r>
+              <a:rPr lang="en-US" sz="1600" dirty="0"/>
+              <a:t>https://stats.stackexchange.com/questions/124534/how-to-understand-nonlinear-as-in-nonlinear-dimensionality-reduction</a:t>
+            </a:r>
+          </a:p>
+          <a:p>
+            <a:pPr marL="228600" lvl="1">
+              <a:spcBef>
+                <a:spcPts val="1000"/>
+              </a:spcBef>
+            </a:pPr>
+            <a:r>
+              <a:rPr lang="en-US" sz="1600" dirty="0"/>
+              <a:t>https://en.wikipedia.org/wiki/Hierarchical_clustering</a:t>
+            </a:r>
+          </a:p>
+          <a:p>
+            <a:endParaRPr lang="en-US" sz="1800" dirty="0"/>
+          </a:p>
+        </p:txBody>
+      </p:sp>
+      <p:sp>
+        <p:nvSpPr>
+          <p:cNvPr id="4" name="Title 1">
             <a:extLst>
               <a:ext uri="{FF2B5EF4-FFF2-40B4-BE49-F238E27FC236}">
-                <a16:creationId xmlns:a16="http://schemas.microsoft.com/office/drawing/2014/main" id="{2C4462EA-787F-402E-80AC-A3061CC0B576}"/>
+                <a16:creationId xmlns:a16="http://schemas.microsoft.com/office/drawing/2014/main" id="{596B46F0-0445-4416-8890-1C82388EF8EF}"/>
               </a:ext>
             </a:extLst>
           </p:cNvPr>
-          <p:cNvSpPr>
-            <a:spLocks noGrp="1"/>
-          </p:cNvSpPr>
-          <p:nvPr>
-            <p:ph type="title"/>
-          </p:nvPr>
-        </p:nvSpPr>
-        <p:spPr/>
-        <p:txBody>
-          <a:bodyPr/>
-          <a:lstStyle/>
-          <a:p>
-            <a:endParaRPr lang="en-US"/>
-          </a:p>
-        </p:txBody>
-      </p:sp>
-      <p:sp>
-        <p:nvSpPr>
-          <p:cNvPr id="3" name="Content Placeholder 2">
+          <p:cNvSpPr txBox="1">
+            <a:spLocks/>
+          </p:cNvSpPr>
+          <p:nvPr/>
+        </p:nvSpPr>
+        <p:spPr>
+          <a:xfrm>
+            <a:off x="911900" y="828843"/>
+            <a:ext cx="10364451" cy="557140"/>
+          </a:xfrm>
+          <a:prstGeom prst="rect">
+            <a:avLst/>
+          </a:prstGeom>
+        </p:spPr>
+        <p:txBody>
+          <a:bodyPr vert="horz" lIns="91440" tIns="45720" rIns="91440" bIns="45720" rtlCol="0" anchor="ctr">
+            <a:normAutofit fontScale="97500" lnSpcReduction="10000"/>
+          </a:bodyPr>
+          <a:lstStyle>
+            <a:lvl1pPr algn="ctr" defTabSz="914400" rtl="0" eaLnBrk="1" latinLnBrk="0" hangingPunct="1">
+              <a:lnSpc>
+                <a:spcPct val="90000"/>
+              </a:lnSpc>
+              <a:spcBef>
+                <a:spcPct val="0"/>
+              </a:spcBef>
+              <a:buNone/>
+              <a:defRPr sz="3600" kern="1200" cap="all" baseline="0">
+                <a:solidFill>
+                  <a:schemeClr val="tx1"/>
+                </a:solidFill>
+                <a:effectLst/>
+                <a:latin typeface="+mj-lt"/>
+                <a:ea typeface="+mj-ea"/>
+                <a:cs typeface="+mj-cs"/>
+              </a:defRPr>
+            </a:lvl1pPr>
+          </a:lstStyle>
+          <a:p>
+            <a:r>
+              <a:rPr lang="en-US" dirty="0"/>
+              <a:t>CONCLUSION</a:t>
+            </a:r>
+          </a:p>
+        </p:txBody>
+      </p:sp>
+      <p:sp>
+        <p:nvSpPr>
+          <p:cNvPr id="5" name="Content Placeholder 2">
             <a:extLst>
               <a:ext uri="{FF2B5EF4-FFF2-40B4-BE49-F238E27FC236}">
-                <a16:creationId xmlns:a16="http://schemas.microsoft.com/office/drawing/2014/main" id="{B50468E1-FFE7-42FD-8CB7-9803FF0C88F0}"/>
+                <a16:creationId xmlns:a16="http://schemas.microsoft.com/office/drawing/2014/main" id="{B000EAFA-CD14-4C24-8D19-105C29797065}"/>
               </a:ext>
             </a:extLst>
           </p:cNvPr>
-          <p:cNvSpPr>
-            <a:spLocks noGrp="1"/>
-          </p:cNvSpPr>
-          <p:nvPr>
-            <p:ph sz="quarter" idx="13"/>
-          </p:nvPr>
-        </p:nvSpPr>
-        <p:spPr/>
-        <p:txBody>
-          <a:bodyPr/>
-          <a:lstStyle/>
-          <a:p>
-            <a:endParaRPr lang="en-US"/>
+          <p:cNvSpPr txBox="1">
+            <a:spLocks/>
+          </p:cNvSpPr>
+          <p:nvPr/>
+        </p:nvSpPr>
+        <p:spPr>
+          <a:xfrm>
+            <a:off x="912525" y="1605646"/>
+            <a:ext cx="10363826" cy="1779630"/>
+          </a:xfrm>
+          <a:prstGeom prst="rect">
+            <a:avLst/>
+          </a:prstGeom>
+        </p:spPr>
+        <p:txBody>
+          <a:bodyPr vert="horz" lIns="91440" tIns="45720" rIns="91440" bIns="45720" rtlCol="0">
+            <a:normAutofit/>
+          </a:bodyPr>
+          <a:lstStyle>
+            <a:lvl1pPr marL="228600" indent="-228600" algn="l" defTabSz="914400" rtl="0" eaLnBrk="1" latinLnBrk="0" hangingPunct="1">
+              <a:lnSpc>
+                <a:spcPct val="120000"/>
+              </a:lnSpc>
+              <a:spcBef>
+                <a:spcPts val="1000"/>
+              </a:spcBef>
+              <a:buClr>
+                <a:schemeClr val="tx1"/>
+              </a:buClr>
+              <a:buFont typeface="Arial" panose="020B0604020202020204" pitchFamily="34" charset="0"/>
+              <a:buChar char="•"/>
+              <a:defRPr sz="2000" kern="1200" cap="all" baseline="0">
+                <a:solidFill>
+                  <a:schemeClr val="tx1"/>
+                </a:solidFill>
+                <a:effectLst/>
+                <a:latin typeface="+mn-lt"/>
+                <a:ea typeface="+mn-ea"/>
+                <a:cs typeface="+mn-cs"/>
+              </a:defRPr>
+            </a:lvl1pPr>
+            <a:lvl2pPr marL="685800" indent="-228600" algn="l" defTabSz="914400" rtl="0" eaLnBrk="1" latinLnBrk="0" hangingPunct="1">
+              <a:lnSpc>
+                <a:spcPct val="120000"/>
+              </a:lnSpc>
+              <a:spcBef>
+                <a:spcPts val="500"/>
+              </a:spcBef>
+              <a:buClr>
+                <a:schemeClr val="tx1"/>
+              </a:buClr>
+              <a:buFont typeface="Arial" panose="020B0604020202020204" pitchFamily="34" charset="0"/>
+              <a:buChar char="•"/>
+              <a:defRPr sz="1800" kern="1200" cap="all" baseline="0">
+                <a:solidFill>
+                  <a:schemeClr val="tx1"/>
+                </a:solidFill>
+                <a:effectLst/>
+                <a:latin typeface="+mn-lt"/>
+                <a:ea typeface="+mn-ea"/>
+                <a:cs typeface="+mn-cs"/>
+              </a:defRPr>
+            </a:lvl2pPr>
+            <a:lvl3pPr marL="1143000" indent="-228600" algn="l" defTabSz="914400" rtl="0" eaLnBrk="1" latinLnBrk="0" hangingPunct="1">
+              <a:lnSpc>
+                <a:spcPct val="120000"/>
+              </a:lnSpc>
+              <a:spcBef>
+                <a:spcPts val="500"/>
+              </a:spcBef>
+              <a:buClr>
+                <a:schemeClr val="tx1"/>
+              </a:buClr>
+              <a:buFont typeface="Arial" panose="020B0604020202020204" pitchFamily="34" charset="0"/>
+              <a:buChar char="•"/>
+              <a:defRPr sz="1600" kern="1200" cap="all" baseline="0">
+                <a:solidFill>
+                  <a:schemeClr val="tx1"/>
+                </a:solidFill>
+                <a:effectLst/>
+                <a:latin typeface="+mn-lt"/>
+                <a:ea typeface="+mn-ea"/>
+                <a:cs typeface="+mn-cs"/>
+              </a:defRPr>
+            </a:lvl3pPr>
+            <a:lvl4pPr marL="1600200" indent="-228600" algn="l" defTabSz="914400" rtl="0" eaLnBrk="1" latinLnBrk="0" hangingPunct="1">
+              <a:lnSpc>
+                <a:spcPct val="120000"/>
+              </a:lnSpc>
+              <a:spcBef>
+                <a:spcPts val="500"/>
+              </a:spcBef>
+              <a:buClr>
+                <a:schemeClr val="tx1"/>
+              </a:buClr>
+              <a:buFont typeface="Arial" panose="020B0604020202020204" pitchFamily="34" charset="0"/>
+              <a:buChar char="•"/>
+              <a:defRPr sz="1400" kern="1200" cap="all" baseline="0">
+                <a:solidFill>
+                  <a:schemeClr val="tx1"/>
+                </a:solidFill>
+                <a:effectLst/>
+                <a:latin typeface="+mn-lt"/>
+                <a:ea typeface="+mn-ea"/>
+                <a:cs typeface="+mn-cs"/>
+              </a:defRPr>
+            </a:lvl4pPr>
+            <a:lvl5pPr marL="2057400" indent="-228600" algn="l" defTabSz="914400" rtl="0" eaLnBrk="1" latinLnBrk="0" hangingPunct="1">
+              <a:lnSpc>
+                <a:spcPct val="120000"/>
+              </a:lnSpc>
+              <a:spcBef>
+                <a:spcPts val="500"/>
+              </a:spcBef>
+              <a:buClr>
+                <a:schemeClr val="tx1"/>
+              </a:buClr>
+              <a:buFont typeface="Arial" panose="020B0604020202020204" pitchFamily="34" charset="0"/>
+              <a:buChar char="•"/>
+              <a:defRPr sz="1400" kern="1200" cap="all" baseline="0">
+                <a:solidFill>
+                  <a:schemeClr val="tx1"/>
+                </a:solidFill>
+                <a:effectLst/>
+                <a:latin typeface="+mn-lt"/>
+                <a:ea typeface="+mn-ea"/>
+                <a:cs typeface="+mn-cs"/>
+              </a:defRPr>
+            </a:lvl5pPr>
+            <a:lvl6pPr marL="2514600" indent="-228600" algn="l" defTabSz="914400" rtl="0" eaLnBrk="1" latinLnBrk="0" hangingPunct="1">
+              <a:lnSpc>
+                <a:spcPct val="120000"/>
+              </a:lnSpc>
+              <a:spcBef>
+                <a:spcPts val="500"/>
+              </a:spcBef>
+              <a:buClr>
+                <a:schemeClr val="tx1"/>
+              </a:buClr>
+              <a:buFont typeface="Arial" panose="020B0604020202020204" pitchFamily="34" charset="0"/>
+              <a:buChar char="•"/>
+              <a:defRPr sz="1400" kern="1200" cap="all" baseline="0">
+                <a:solidFill>
+                  <a:schemeClr val="tx1"/>
+                </a:solidFill>
+                <a:effectLst/>
+                <a:latin typeface="+mn-lt"/>
+                <a:ea typeface="+mn-ea"/>
+                <a:cs typeface="+mn-cs"/>
+              </a:defRPr>
+            </a:lvl6pPr>
+            <a:lvl7pPr marL="2971800" indent="-228600" algn="l" defTabSz="914400" rtl="0" eaLnBrk="1" latinLnBrk="0" hangingPunct="1">
+              <a:lnSpc>
+                <a:spcPct val="120000"/>
+              </a:lnSpc>
+              <a:spcBef>
+                <a:spcPts val="500"/>
+              </a:spcBef>
+              <a:buClr>
+                <a:schemeClr val="tx1"/>
+              </a:buClr>
+              <a:buFont typeface="Arial" panose="020B0604020202020204" pitchFamily="34" charset="0"/>
+              <a:buChar char="•"/>
+              <a:defRPr sz="1400" kern="1200" cap="all" baseline="0">
+                <a:solidFill>
+                  <a:schemeClr val="tx1"/>
+                </a:solidFill>
+                <a:effectLst/>
+                <a:latin typeface="+mn-lt"/>
+                <a:ea typeface="+mn-ea"/>
+                <a:cs typeface="+mn-cs"/>
+              </a:defRPr>
+            </a:lvl7pPr>
+            <a:lvl8pPr marL="3429000" indent="-228600" algn="l" defTabSz="914400" rtl="0" eaLnBrk="1" latinLnBrk="0" hangingPunct="1">
+              <a:lnSpc>
+                <a:spcPct val="120000"/>
+              </a:lnSpc>
+              <a:spcBef>
+                <a:spcPts val="500"/>
+              </a:spcBef>
+              <a:buClr>
+                <a:schemeClr val="tx1"/>
+              </a:buClr>
+              <a:buFont typeface="Arial" panose="020B0604020202020204" pitchFamily="34" charset="0"/>
+              <a:buChar char="•"/>
+              <a:defRPr sz="1400" kern="1200" cap="all" baseline="0">
+                <a:solidFill>
+                  <a:schemeClr val="tx1"/>
+                </a:solidFill>
+                <a:effectLst/>
+                <a:latin typeface="+mn-lt"/>
+                <a:ea typeface="+mn-ea"/>
+                <a:cs typeface="+mn-cs"/>
+              </a:defRPr>
+            </a:lvl8pPr>
+            <a:lvl9pPr marL="3886200" indent="-228600" algn="l" defTabSz="914400" rtl="0" eaLnBrk="1" latinLnBrk="0" hangingPunct="1">
+              <a:lnSpc>
+                <a:spcPct val="120000"/>
+              </a:lnSpc>
+              <a:spcBef>
+                <a:spcPts val="500"/>
+              </a:spcBef>
+              <a:buClr>
+                <a:schemeClr val="tx1"/>
+              </a:buClr>
+              <a:buFont typeface="Arial" panose="020B0604020202020204" pitchFamily="34" charset="0"/>
+              <a:buChar char="•"/>
+              <a:defRPr sz="1400" kern="1200" cap="all" baseline="0">
+                <a:solidFill>
+                  <a:schemeClr val="tx1"/>
+                </a:solidFill>
+                <a:effectLst/>
+                <a:latin typeface="+mn-lt"/>
+                <a:ea typeface="+mn-ea"/>
+                <a:cs typeface="+mn-cs"/>
+              </a:defRPr>
+            </a:lvl9pPr>
+          </a:lstStyle>
+          <a:p>
+            <a:r>
+              <a:rPr lang="en-US" dirty="0"/>
+              <a:t>Agglomerative Hierarchical Clustering</a:t>
+            </a:r>
+          </a:p>
+          <a:p>
+            <a:pPr lvl="1"/>
+            <a:r>
+              <a:rPr lang="en-US" dirty="0"/>
+              <a:t>Clusters: 18, linkage : ward, Silhouette Coefficient: 0.023, Training time: 0.67 s</a:t>
+            </a:r>
+          </a:p>
+          <a:p>
+            <a:r>
+              <a:rPr lang="en-US" dirty="0"/>
+              <a:t>KMEANS clustering</a:t>
+            </a:r>
+          </a:p>
+          <a:p>
+            <a:pPr lvl="1"/>
+            <a:r>
+              <a:rPr lang="en-US" dirty="0"/>
+              <a:t>Clusters: 18, N_ITER : 20, Silhouette Coefficient: 0.020, Training time: 65.19 s</a:t>
+            </a:r>
+          </a:p>
+          <a:p>
+            <a:endParaRPr lang="en-US" dirty="0"/>
+          </a:p>
+          <a:p>
+            <a:endParaRPr lang="en-US" dirty="0"/>
           </a:p>
         </p:txBody>
       </p:sp>
     </p:spTree>
     <p:extLst>
       <p:ext uri="{BB962C8B-B14F-4D97-AF65-F5344CB8AC3E}">
-        <p14:creationId xmlns:p14="http://schemas.microsoft.com/office/powerpoint/2010/main" val="3897255410"/>
+        <p14:creationId xmlns:p14="http://schemas.microsoft.com/office/powerpoint/2010/main" val="1093250247"/>
       </p:ext>
     </p:extLst>
   </p:cSld>
@@ -7387,4 +9636,265 @@
     </a:ext>
   </a:extLst>
 </a:theme>
+</file>
+
+<file path=ppt/theme/theme2.xml><?xml version="1.0" encoding="utf-8"?>
+<a:theme xmlns:a="http://schemas.openxmlformats.org/drawingml/2006/main" name="Office Theme">
+  <a:themeElements>
+    <a:clrScheme name="Office">
+      <a:dk1>
+        <a:sysClr val="windowText" lastClr="000000"/>
+      </a:dk1>
+      <a:lt1>
+        <a:sysClr val="window" lastClr="FFFFFF"/>
+      </a:lt1>
+      <a:dk2>
+        <a:srgbClr val="44546A"/>
+      </a:dk2>
+      <a:lt2>
+        <a:srgbClr val="E7E6E6"/>
+      </a:lt2>
+      <a:accent1>
+        <a:srgbClr val="4472C4"/>
+      </a:accent1>
+      <a:accent2>
+        <a:srgbClr val="ED7D31"/>
+      </a:accent2>
+      <a:accent3>
+        <a:srgbClr val="A5A5A5"/>
+      </a:accent3>
+      <a:accent4>
+        <a:srgbClr val="FFC000"/>
+      </a:accent4>
+      <a:accent5>
+        <a:srgbClr val="5B9BD5"/>
+      </a:accent5>
+      <a:accent6>
+        <a:srgbClr val="70AD47"/>
+      </a:accent6>
+      <a:hlink>
+        <a:srgbClr val="0563C1"/>
+      </a:hlink>
+      <a:folHlink>
+        <a:srgbClr val="954F72"/>
+      </a:folHlink>
+    </a:clrScheme>
+    <a:fontScheme name="Office">
+      <a:majorFont>
+        <a:latin typeface="Calibri Light" panose="020F0302020204030204"/>
+        <a:ea typeface=""/>
+        <a:cs typeface=""/>
+        <a:font script="Jpan" typeface="Yu Gothic Light"/>
+        <a:font script="Hang" typeface="맑은 고딕"/>
+        <a:font script="Hans" typeface="DengXian Light"/>
+        <a:font script="Hant" typeface="新細明體"/>
+        <a:font script="Arab" typeface="Times New Roman"/>
+        <a:font script="Hebr" typeface="Times New Roman"/>
+        <a:font script="Thai" typeface="Angsana New"/>
+        <a:font script="Ethi" typeface="Nyala"/>
+        <a:font script="Beng" typeface="Vrinda"/>
+        <a:font script="Gujr" typeface="Shruti"/>
+        <a:font script="Khmr" typeface="MoolBoran"/>
+        <a:font script="Knda" typeface="Tunga"/>
+        <a:font script="Guru" typeface="Raavi"/>
+        <a:font script="Cans" typeface="Euphemia"/>
+        <a:font script="Cher" typeface="Plantagenet Cherokee"/>
+        <a:font script="Yiii" typeface="Microsoft Yi Baiti"/>
+        <a:font script="Tibt" typeface="Microsoft Himalaya"/>
+        <a:font script="Thaa" typeface="MV Boli"/>
+        <a:font script="Deva" typeface="Mangal"/>
+        <a:font script="Telu" typeface="Gautami"/>
+        <a:font script="Taml" typeface="Latha"/>
+        <a:font script="Syrc" typeface="Estrangelo Edessa"/>
+        <a:font script="Orya" typeface="Kalinga"/>
+        <a:font script="Mlym" typeface="Kartika"/>
+        <a:font script="Laoo" typeface="DokChampa"/>
+        <a:font script="Sinh" typeface="Iskoola Pota"/>
+        <a:font script="Mong" typeface="Mongolian Baiti"/>
+        <a:font script="Viet" typeface="Times New Roman"/>
+        <a:font script="Uigh" typeface="Microsoft Uighur"/>
+        <a:font script="Geor" typeface="Sylfaen"/>
+      </a:majorFont>
+      <a:minorFont>
+        <a:latin typeface="Calibri" panose="020F0502020204030204"/>
+        <a:ea typeface=""/>
+        <a:cs typeface=""/>
+        <a:font script="Jpan" typeface="Yu Gothic"/>
+        <a:font script="Hang" typeface="맑은 고딕"/>
+        <a:font script="Hans" typeface="DengXian"/>
+        <a:font script="Hant" typeface="新細明體"/>
+        <a:font script="Arab" typeface="Arial"/>
+        <a:font script="Hebr" typeface="Arial"/>
+        <a:font script="Thai" typeface="Cordia New"/>
+        <a:font script="Ethi" typeface="Nyala"/>
+        <a:font script="Beng" typeface="Vrinda"/>
+        <a:font script="Gujr" typeface="Shruti"/>
+        <a:font script="Khmr" typeface="DaunPenh"/>
+        <a:font script="Knda" typeface="Tunga"/>
+        <a:font script="Guru" typeface="Raavi"/>
+        <a:font script="Cans" typeface="Euphemia"/>
+        <a:font script="Cher" typeface="Plantagenet Cherokee"/>
+        <a:font script="Yiii" typeface="Microsoft Yi Baiti"/>
+        <a:font script="Tibt" typeface="Microsoft Himalaya"/>
+        <a:font script="Thaa" typeface="MV Boli"/>
+        <a:font script="Deva" typeface="Mangal"/>
+        <a:font script="Telu" typeface="Gautami"/>
+        <a:font script="Taml" typeface="Latha"/>
+        <a:font script="Syrc" typeface="Estrangelo Edessa"/>
+        <a:font script="Orya" typeface="Kalinga"/>
+        <a:font script="Mlym" typeface="Kartika"/>
+        <a:font script="Laoo" typeface="DokChampa"/>
+        <a:font script="Sinh" typeface="Iskoola Pota"/>
+        <a:font script="Mong" typeface="Mongolian Baiti"/>
+        <a:font script="Viet" typeface="Arial"/>
+        <a:font script="Uigh" typeface="Microsoft Uighur"/>
+        <a:font script="Geor" typeface="Sylfaen"/>
+      </a:minorFont>
+    </a:fontScheme>
+    <a:fmtScheme name="Office">
+      <a:fillStyleLst>
+        <a:solidFill>
+          <a:schemeClr val="phClr"/>
+        </a:solidFill>
+        <a:gradFill rotWithShape="1">
+          <a:gsLst>
+            <a:gs pos="0">
+              <a:schemeClr val="phClr">
+                <a:lumMod val="110000"/>
+                <a:satMod val="105000"/>
+                <a:tint val="67000"/>
+              </a:schemeClr>
+            </a:gs>
+            <a:gs pos="50000">
+              <a:schemeClr val="phClr">
+                <a:lumMod val="105000"/>
+                <a:satMod val="103000"/>
+                <a:tint val="73000"/>
+              </a:schemeClr>
+            </a:gs>
+            <a:gs pos="100000">
+              <a:schemeClr val="phClr">
+                <a:lumMod val="105000"/>
+                <a:satMod val="109000"/>
+                <a:tint val="81000"/>
+              </a:schemeClr>
+            </a:gs>
+          </a:gsLst>
+          <a:lin ang="5400000" scaled="0"/>
+        </a:gradFill>
+        <a:gradFill rotWithShape="1">
+          <a:gsLst>
+            <a:gs pos="0">
+              <a:schemeClr val="phClr">
+                <a:satMod val="103000"/>
+                <a:lumMod val="102000"/>
+                <a:tint val="94000"/>
+              </a:schemeClr>
+            </a:gs>
+            <a:gs pos="50000">
+              <a:schemeClr val="phClr">
+                <a:satMod val="110000"/>
+                <a:lumMod val="100000"/>
+                <a:shade val="100000"/>
+              </a:schemeClr>
+            </a:gs>
+            <a:gs pos="100000">
+              <a:schemeClr val="phClr">
+                <a:lumMod val="99000"/>
+                <a:satMod val="120000"/>
+                <a:shade val="78000"/>
+              </a:schemeClr>
+            </a:gs>
+          </a:gsLst>
+          <a:lin ang="5400000" scaled="0"/>
+        </a:gradFill>
+      </a:fillStyleLst>
+      <a:lnStyleLst>
+        <a:ln w="6350" cap="flat" cmpd="sng" algn="ctr">
+          <a:solidFill>
+            <a:schemeClr val="phClr"/>
+          </a:solidFill>
+          <a:prstDash val="solid"/>
+          <a:miter lim="800000"/>
+        </a:ln>
+        <a:ln w="12700" cap="flat" cmpd="sng" algn="ctr">
+          <a:solidFill>
+            <a:schemeClr val="phClr"/>
+          </a:solidFill>
+          <a:prstDash val="solid"/>
+          <a:miter lim="800000"/>
+        </a:ln>
+        <a:ln w="19050" cap="flat" cmpd="sng" algn="ctr">
+          <a:solidFill>
+            <a:schemeClr val="phClr"/>
+          </a:solidFill>
+          <a:prstDash val="solid"/>
+          <a:miter lim="800000"/>
+        </a:ln>
+      </a:lnStyleLst>
+      <a:effectStyleLst>
+        <a:effectStyle>
+          <a:effectLst/>
+        </a:effectStyle>
+        <a:effectStyle>
+          <a:effectLst/>
+        </a:effectStyle>
+        <a:effectStyle>
+          <a:effectLst>
+            <a:outerShdw blurRad="57150" dist="19050" dir="5400000" algn="ctr" rotWithShape="0">
+              <a:srgbClr val="000000">
+                <a:alpha val="63000"/>
+              </a:srgbClr>
+            </a:outerShdw>
+          </a:effectLst>
+        </a:effectStyle>
+      </a:effectStyleLst>
+      <a:bgFillStyleLst>
+        <a:solidFill>
+          <a:schemeClr val="phClr"/>
+        </a:solidFill>
+        <a:solidFill>
+          <a:schemeClr val="phClr">
+            <a:tint val="95000"/>
+            <a:satMod val="170000"/>
+          </a:schemeClr>
+        </a:solidFill>
+        <a:gradFill rotWithShape="1">
+          <a:gsLst>
+            <a:gs pos="0">
+              <a:schemeClr val="phClr">
+                <a:tint val="93000"/>
+                <a:satMod val="150000"/>
+                <a:shade val="98000"/>
+                <a:lumMod val="102000"/>
+              </a:schemeClr>
+            </a:gs>
+            <a:gs pos="50000">
+              <a:schemeClr val="phClr">
+                <a:tint val="98000"/>
+                <a:satMod val="130000"/>
+                <a:shade val="90000"/>
+                <a:lumMod val="103000"/>
+              </a:schemeClr>
+            </a:gs>
+            <a:gs pos="100000">
+              <a:schemeClr val="phClr">
+                <a:shade val="63000"/>
+                <a:satMod val="120000"/>
+              </a:schemeClr>
+            </a:gs>
+          </a:gsLst>
+          <a:lin ang="5400000" scaled="0"/>
+        </a:gradFill>
+      </a:bgFillStyleLst>
+    </a:fmtScheme>
+  </a:themeElements>
+  <a:objectDefaults/>
+  <a:extraClrSchemeLst/>
+  <a:extLst>
+    <a:ext uri="{05A4C25C-085E-4340-85A3-A5531E510DB2}">
+      <thm15:themeFamily xmlns:thm15="http://schemas.microsoft.com/office/thememl/2012/main" name="Office Theme" id="{62F939B6-93AF-4DB8-9C6B-D6C7DFDC589F}" vid="{4A3C46E8-61CC-4603-A589-7422A47A8E4A}"/>
+    </a:ext>
+  </a:extLst>
+</a:theme>
 </file>
</xml_diff>

<commit_message>
Removed one slide from ppt
</commit_message>
<xml_diff>
--- a/Categorizing YouTube Videos.pptx
+++ b/Categorizing YouTube Videos.pptx
@@ -5,20 +5,18 @@
     <p:sldMasterId id="2147483760" r:id="rId1"/>
   </p:sldMasterIdLst>
   <p:notesMasterIdLst>
-    <p:notesMasterId r:id="rId13"/>
+    <p:notesMasterId r:id="rId11"/>
   </p:notesMasterIdLst>
   <p:sldIdLst>
     <p:sldId id="256" r:id="rId2"/>
     <p:sldId id="257" r:id="rId3"/>
     <p:sldId id="261" r:id="rId4"/>
-    <p:sldId id="268" r:id="rId5"/>
-    <p:sldId id="262" r:id="rId6"/>
-    <p:sldId id="258" r:id="rId7"/>
-    <p:sldId id="264" r:id="rId8"/>
-    <p:sldId id="259" r:id="rId9"/>
-    <p:sldId id="260" r:id="rId10"/>
-    <p:sldId id="267" r:id="rId11"/>
-    <p:sldId id="266" r:id="rId12"/>
+    <p:sldId id="262" r:id="rId5"/>
+    <p:sldId id="258" r:id="rId6"/>
+    <p:sldId id="264" r:id="rId7"/>
+    <p:sldId id="259" r:id="rId8"/>
+    <p:sldId id="260" r:id="rId9"/>
+    <p:sldId id="266" r:id="rId10"/>
   </p:sldIdLst>
   <p:sldSz cx="12192000" cy="6858000"/>
   <p:notesSz cx="6858000" cy="9144000"/>
@@ -207,7 +205,7 @@
           <a:p>
             <a:fld id="{700893F5-AD44-E543-A245-95F38FF08452}" type="datetimeFigureOut">
               <a:rPr lang="en-US" smtClean="0"/>
-              <a:t>4/23/18</a:t>
+              <a:t>4/26/2018</a:t>
             </a:fld>
             <a:endParaRPr lang="en-US"/>
           </a:p>
@@ -271,38 +269,37 @@
           <a:p>
             <a:pPr lvl="0"/>
             <a:r>
-              <a:rPr lang="en-US" smtClean="0"/>
+              <a:rPr lang="en-US"/>
               <a:t>Click to edit Master text styles</a:t>
             </a:r>
           </a:p>
           <a:p>
             <a:pPr lvl="1"/>
             <a:r>
-              <a:rPr lang="en-US" smtClean="0"/>
+              <a:rPr lang="en-US"/>
               <a:t>Second level</a:t>
             </a:r>
           </a:p>
           <a:p>
             <a:pPr lvl="2"/>
             <a:r>
-              <a:rPr lang="en-US" smtClean="0"/>
+              <a:rPr lang="en-US"/>
               <a:t>Third level</a:t>
             </a:r>
           </a:p>
           <a:p>
             <a:pPr lvl="3"/>
             <a:r>
-              <a:rPr lang="en-US" smtClean="0"/>
+              <a:rPr lang="en-US"/>
               <a:t>Fourth level</a:t>
             </a:r>
           </a:p>
           <a:p>
             <a:pPr lvl="4"/>
             <a:r>
-              <a:rPr lang="en-US" smtClean="0"/>
+              <a:rPr lang="en-US"/>
               <a:t>Fifth level</a:t>
             </a:r>
-            <a:endParaRPr lang="en-US"/>
           </a:p>
         </p:txBody>
       </p:sp>
@@ -520,7 +517,7 @@
           <a:lstStyle/>
           <a:p>
             <a:r>
-              <a:rPr lang="en-US" sz="1200" b="0" i="0" kern="1200" dirty="0" smtClean="0">
+              <a:rPr lang="en-US" sz="1200" b="0" i="0" kern="1200" dirty="0">
                 <a:solidFill>
                   <a:schemeClr val="tx1"/>
                 </a:solidFill>
@@ -532,7 +529,7 @@
               <a:t>Greedily form data clusters based on local correlations</a:t>
             </a:r>
             <a:r>
-              <a:rPr lang="en-US" sz="1200" b="0" i="0" kern="1200" baseline="0" dirty="0" smtClean="0">
+              <a:rPr lang="en-US" sz="1200" b="0" i="0" kern="1200" baseline="0" dirty="0">
                 <a:solidFill>
                   <a:schemeClr val="tx1"/>
                 </a:solidFill>
@@ -544,7 +541,7 @@
               <a:t> </a:t>
             </a:r>
             <a:r>
-              <a:rPr lang="en-US" sz="1200" b="0" i="0" kern="1200" dirty="0" smtClean="0">
+              <a:rPr lang="en-US" sz="1200" b="0" i="0" kern="1200" dirty="0">
                 <a:solidFill>
                   <a:schemeClr val="tx1"/>
                 </a:solidFill>
@@ -558,7 +555,7 @@
           </a:p>
           <a:p>
             <a:r>
-              <a:rPr lang="en-US" sz="1200" b="0" i="0" kern="1200" dirty="0" smtClean="0">
+              <a:rPr lang="en-US" sz="1200" b="0" i="0" kern="1200" dirty="0">
                 <a:solidFill>
                   <a:schemeClr val="tx1"/>
                 </a:solidFill>
@@ -590,7 +587,7 @@
           <a:p>
             <a:fld id="{82993A4B-6423-FD42-A73A-D4FCA772ABDA}" type="slidenum">
               <a:rPr lang="en-US" smtClean="0"/>
-              <a:t>8</a:t>
+              <a:t>7</a:t>
             </a:fld>
             <a:endParaRPr lang="en-US"/>
           </a:p>
@@ -780,7 +777,7 @@
           <a:p>
             <a:fld id="{F8F32E06-09F6-479A-86EB-0AE786A442BF}" type="datetimeFigureOut">
               <a:rPr lang="en-US" smtClean="0"/>
-              <a:t>4/23/18</a:t>
+              <a:t>4/26/2018</a:t>
             </a:fld>
             <a:endParaRPr lang="en-US"/>
           </a:p>
@@ -1095,7 +1092,7 @@
           <a:p>
             <a:fld id="{F8F32E06-09F6-479A-86EB-0AE786A442BF}" type="datetimeFigureOut">
               <a:rPr lang="en-US" smtClean="0"/>
-              <a:t>4/23/18</a:t>
+              <a:t>4/26/2018</a:t>
             </a:fld>
             <a:endParaRPr lang="en-US"/>
           </a:p>
@@ -1317,7 +1314,7 @@
           <a:p>
             <a:fld id="{F8F32E06-09F6-479A-86EB-0AE786A442BF}" type="datetimeFigureOut">
               <a:rPr lang="en-US" smtClean="0"/>
-              <a:t>4/23/18</a:t>
+              <a:t>4/26/2018</a:t>
             </a:fld>
             <a:endParaRPr lang="en-US"/>
           </a:p>
@@ -1608,7 +1605,7 @@
           <a:p>
             <a:fld id="{F8F32E06-09F6-479A-86EB-0AE786A442BF}" type="datetimeFigureOut">
               <a:rPr lang="en-US" smtClean="0"/>
-              <a:t>4/23/18</a:t>
+              <a:t>4/26/2018</a:t>
             </a:fld>
             <a:endParaRPr lang="en-US"/>
           </a:p>
@@ -2062,7 +2059,7 @@
           <a:p>
             <a:fld id="{F8F32E06-09F6-479A-86EB-0AE786A442BF}" type="datetimeFigureOut">
               <a:rPr lang="en-US" smtClean="0"/>
-              <a:t>4/23/18</a:t>
+              <a:t>4/26/2018</a:t>
             </a:fld>
             <a:endParaRPr lang="en-US"/>
           </a:p>
@@ -2638,7 +2635,7 @@
           <a:p>
             <a:fld id="{F8F32E06-09F6-479A-86EB-0AE786A442BF}" type="datetimeFigureOut">
               <a:rPr lang="en-US" smtClean="0"/>
-              <a:t>4/23/18</a:t>
+              <a:t>4/26/2018</a:t>
             </a:fld>
             <a:endParaRPr lang="en-US"/>
           </a:p>
@@ -3499,7 +3496,7 @@
           <a:p>
             <a:fld id="{F8F32E06-09F6-479A-86EB-0AE786A442BF}" type="datetimeFigureOut">
               <a:rPr lang="en-US" smtClean="0"/>
-              <a:t>4/23/18</a:t>
+              <a:t>4/26/2018</a:t>
             </a:fld>
             <a:endParaRPr lang="en-US"/>
           </a:p>
@@ -3704,7 +3701,7 @@
           <a:p>
             <a:fld id="{F8F32E06-09F6-479A-86EB-0AE786A442BF}" type="datetimeFigureOut">
               <a:rPr lang="en-US" smtClean="0"/>
-              <a:t>4/23/18</a:t>
+              <a:t>4/26/2018</a:t>
             </a:fld>
             <a:endParaRPr lang="en-US"/>
           </a:p>
@@ -3918,7 +3915,7 @@
           <a:p>
             <a:fld id="{F8F32E06-09F6-479A-86EB-0AE786A442BF}" type="datetimeFigureOut">
               <a:rPr lang="en-US" smtClean="0"/>
-              <a:t>4/23/18</a:t>
+              <a:t>4/26/2018</a:t>
             </a:fld>
             <a:endParaRPr lang="en-US"/>
           </a:p>
@@ -4123,7 +4120,7 @@
           <a:p>
             <a:fld id="{F8F32E06-09F6-479A-86EB-0AE786A442BF}" type="datetimeFigureOut">
               <a:rPr lang="en-US" smtClean="0"/>
-              <a:t>4/23/18</a:t>
+              <a:t>4/26/2018</a:t>
             </a:fld>
             <a:endParaRPr lang="en-US"/>
           </a:p>
@@ -4403,7 +4400,7 @@
           <a:p>
             <a:fld id="{F8F32E06-09F6-479A-86EB-0AE786A442BF}" type="datetimeFigureOut">
               <a:rPr lang="en-US" smtClean="0"/>
-              <a:t>4/23/18</a:t>
+              <a:t>4/26/2018</a:t>
             </a:fld>
             <a:endParaRPr lang="en-US"/>
           </a:p>
@@ -4670,7 +4667,7 @@
           <a:p>
             <a:fld id="{F8F32E06-09F6-479A-86EB-0AE786A442BF}" type="datetimeFigureOut">
               <a:rPr lang="en-US" smtClean="0"/>
-              <a:t>4/23/18</a:t>
+              <a:t>4/26/2018</a:t>
             </a:fld>
             <a:endParaRPr lang="en-US"/>
           </a:p>
@@ -5085,7 +5082,7 @@
           <a:p>
             <a:fld id="{F8F32E06-09F6-479A-86EB-0AE786A442BF}" type="datetimeFigureOut">
               <a:rPr lang="en-US" smtClean="0"/>
-              <a:t>4/23/18</a:t>
+              <a:t>4/26/2018</a:t>
             </a:fld>
             <a:endParaRPr lang="en-US"/>
           </a:p>
@@ -5233,7 +5230,7 @@
           <a:p>
             <a:fld id="{F8F32E06-09F6-479A-86EB-0AE786A442BF}" type="datetimeFigureOut">
               <a:rPr lang="en-US" smtClean="0"/>
-              <a:t>4/23/18</a:t>
+              <a:t>4/26/2018</a:t>
             </a:fld>
             <a:endParaRPr lang="en-US"/>
           </a:p>
@@ -5358,7 +5355,7 @@
           <a:p>
             <a:fld id="{F8F32E06-09F6-479A-86EB-0AE786A442BF}" type="datetimeFigureOut">
               <a:rPr lang="en-US" smtClean="0"/>
-              <a:t>4/23/18</a:t>
+              <a:t>4/26/2018</a:t>
             </a:fld>
             <a:endParaRPr lang="en-US"/>
           </a:p>
@@ -5637,7 +5634,7 @@
           <a:p>
             <a:fld id="{F8F32E06-09F6-479A-86EB-0AE786A442BF}" type="datetimeFigureOut">
               <a:rPr lang="en-US" smtClean="0"/>
-              <a:t>4/23/18</a:t>
+              <a:t>4/26/2018</a:t>
             </a:fld>
             <a:endParaRPr lang="en-US"/>
           </a:p>
@@ -5952,7 +5949,7 @@
           <a:p>
             <a:fld id="{F8F32E06-09F6-479A-86EB-0AE786A442BF}" type="datetimeFigureOut">
               <a:rPr lang="en-US" smtClean="0"/>
-              <a:t>4/23/18</a:t>
+              <a:t>4/26/2018</a:t>
             </a:fld>
             <a:endParaRPr lang="en-US"/>
           </a:p>
@@ -6205,7 +6202,7 @@
           <a:p>
             <a:fld id="{F8F32E06-09F6-479A-86EB-0AE786A442BF}" type="datetimeFigureOut">
               <a:rPr lang="en-US" smtClean="0"/>
-              <a:t>4/23/18</a:t>
+              <a:t>4/26/2018</a:t>
             </a:fld>
             <a:endParaRPr lang="en-US"/>
           </a:p>
@@ -6654,7 +6651,7 @@
           <p:cNvPr id="2" name="Title 1">
             <a:extLst>
               <a:ext uri="{FF2B5EF4-FFF2-40B4-BE49-F238E27FC236}">
-                <a16:creationId xmlns:a16="http://schemas.microsoft.com/office/drawing/2014/main" xmlns="" id="{28C89AE5-A7F5-4B9F-AD0E-26586DDC9A65}"/>
+                <a16:creationId xmlns:a16="http://schemas.microsoft.com/office/drawing/2014/main" id="{28C89AE5-A7F5-4B9F-AD0E-26586DDC9A65}"/>
               </a:ext>
             </a:extLst>
           </p:cNvPr>
@@ -6687,7 +6684,7 @@
           <p:cNvPr id="3" name="Subtitle 2">
             <a:extLst>
               <a:ext uri="{FF2B5EF4-FFF2-40B4-BE49-F238E27FC236}">
-                <a16:creationId xmlns:a16="http://schemas.microsoft.com/office/drawing/2014/main" xmlns="" id="{21DEBC13-51BD-4453-B4B4-C78B2EB0A947}"/>
+                <a16:creationId xmlns:a16="http://schemas.microsoft.com/office/drawing/2014/main" id="{21DEBC13-51BD-4453-B4B4-C78B2EB0A947}"/>
               </a:ext>
             </a:extLst>
           </p:cNvPr>
@@ -6728,244 +6725,6 @@
     <p:extLst>
       <p:ext uri="{BB962C8B-B14F-4D97-AF65-F5344CB8AC3E}">
         <p14:creationId xmlns:p14="http://schemas.microsoft.com/office/powerpoint/2010/main" val="3784307921"/>
-      </p:ext>
-    </p:extLst>
-  </p:cSld>
-  <p:clrMapOvr>
-    <a:masterClrMapping/>
-  </p:clrMapOvr>
-</p:sld>
-</file>
-
-<file path=ppt/slides/slide10.xml><?xml version="1.0" encoding="utf-8"?>
-<p:sld xmlns:a="http://schemas.openxmlformats.org/drawingml/2006/main" xmlns:r="http://schemas.openxmlformats.org/officeDocument/2006/relationships" xmlns:p="http://schemas.openxmlformats.org/presentationml/2006/main">
-  <p:cSld>
-    <p:spTree>
-      <p:nvGrpSpPr>
-        <p:cNvPr id="1" name=""/>
-        <p:cNvGrpSpPr/>
-        <p:nvPr/>
-      </p:nvGrpSpPr>
-      <p:grpSpPr>
-        <a:xfrm>
-          <a:off x="0" y="0"/>
-          <a:ext cx="0" cy="0"/>
-          <a:chOff x="0" y="0"/>
-          <a:chExt cx="0" cy="0"/>
-        </a:xfrm>
-      </p:grpSpPr>
-      <p:sp>
-        <p:nvSpPr>
-          <p:cNvPr id="2" name="Title 1"/>
-          <p:cNvSpPr>
-            <a:spLocks noGrp="1"/>
-          </p:cNvSpPr>
-          <p:nvPr>
-            <p:ph type="title"/>
-          </p:nvPr>
-        </p:nvSpPr>
-        <p:spPr/>
-        <p:txBody>
-          <a:bodyPr/>
-          <a:lstStyle/>
-          <a:p>
-            <a:r>
-              <a:rPr lang="en-US" dirty="0" smtClean="0"/>
-              <a:t>CONCLUSION</a:t>
-            </a:r>
-            <a:endParaRPr lang="en-US" dirty="0"/>
-          </a:p>
-        </p:txBody>
-      </p:sp>
-      <p:sp>
-        <p:nvSpPr>
-          <p:cNvPr id="3" name="Content Placeholder 2"/>
-          <p:cNvSpPr>
-            <a:spLocks noGrp="1"/>
-          </p:cNvSpPr>
-          <p:nvPr>
-            <p:ph sz="quarter" idx="13"/>
-          </p:nvPr>
-        </p:nvSpPr>
-        <p:spPr/>
-        <p:txBody>
-          <a:bodyPr/>
-          <a:lstStyle/>
-          <a:p>
-            <a:r>
-              <a:rPr lang="en-US" dirty="0" smtClean="0"/>
-              <a:t>AHC</a:t>
-            </a:r>
-          </a:p>
-          <a:p>
-            <a:r>
-              <a:rPr lang="en-US" dirty="0"/>
-              <a:t>Number of Cluster=18, linkage = ward, Silhouette Coefficient: </a:t>
-            </a:r>
-            <a:r>
-              <a:rPr lang="en-US" dirty="0" smtClean="0"/>
-              <a:t>0.023, Training time: 0.67 s</a:t>
-            </a:r>
-            <a:endParaRPr lang="en-US" dirty="0"/>
-          </a:p>
-          <a:p>
-            <a:endParaRPr lang="en-US" dirty="0" smtClean="0"/>
-          </a:p>
-          <a:p>
-            <a:r>
-              <a:rPr lang="en-US" dirty="0" smtClean="0"/>
-              <a:t>K MEANS</a:t>
-            </a:r>
-          </a:p>
-          <a:p>
-            <a:endParaRPr lang="en-US" dirty="0"/>
-          </a:p>
-        </p:txBody>
-      </p:sp>
-    </p:spTree>
-    <p:extLst>
-      <p:ext uri="{BB962C8B-B14F-4D97-AF65-F5344CB8AC3E}">
-        <p14:creationId xmlns:p14="http://schemas.microsoft.com/office/powerpoint/2010/main" val="1805140890"/>
-      </p:ext>
-    </p:extLst>
-  </p:cSld>
-  <p:clrMapOvr>
-    <a:masterClrMapping/>
-  </p:clrMapOvr>
-</p:sld>
-</file>
-
-<file path=ppt/slides/slide11.xml><?xml version="1.0" encoding="utf-8"?>
-<p:sld xmlns:a="http://schemas.openxmlformats.org/drawingml/2006/main" xmlns:r="http://schemas.openxmlformats.org/officeDocument/2006/relationships" xmlns:p="http://schemas.openxmlformats.org/presentationml/2006/main">
-  <p:cSld>
-    <p:spTree>
-      <p:nvGrpSpPr>
-        <p:cNvPr id="1" name=""/>
-        <p:cNvGrpSpPr/>
-        <p:nvPr/>
-      </p:nvGrpSpPr>
-      <p:grpSpPr>
-        <a:xfrm>
-          <a:off x="0" y="0"/>
-          <a:ext cx="0" cy="0"/>
-          <a:chOff x="0" y="0"/>
-          <a:chExt cx="0" cy="0"/>
-        </a:xfrm>
-      </p:grpSpPr>
-      <p:sp>
-        <p:nvSpPr>
-          <p:cNvPr id="2" name="Title 1"/>
-          <p:cNvSpPr>
-            <a:spLocks noGrp="1"/>
-          </p:cNvSpPr>
-          <p:nvPr>
-            <p:ph type="title"/>
-          </p:nvPr>
-        </p:nvSpPr>
-        <p:spPr/>
-        <p:txBody>
-          <a:bodyPr/>
-          <a:lstStyle/>
-          <a:p>
-            <a:r>
-              <a:rPr lang="en-US" dirty="0" smtClean="0"/>
-              <a:t>REFERENCES</a:t>
-            </a:r>
-            <a:endParaRPr lang="en-US" dirty="0"/>
-          </a:p>
-        </p:txBody>
-      </p:sp>
-      <p:sp>
-        <p:nvSpPr>
-          <p:cNvPr id="3" name="Content Placeholder 2"/>
-          <p:cNvSpPr>
-            <a:spLocks noGrp="1"/>
-          </p:cNvSpPr>
-          <p:nvPr>
-            <p:ph sz="quarter" idx="13"/>
-          </p:nvPr>
-        </p:nvSpPr>
-        <p:spPr/>
-        <p:txBody>
-          <a:bodyPr/>
-          <a:lstStyle/>
-          <a:p>
-            <a:r>
-              <a:rPr lang="en-US" dirty="0" smtClean="0"/>
-              <a:t>LECTURES SLIDES BY DR. CHINMAY HEGDE FOR EE 525X SPRING 2018, IOWA STATE UNIVERSITY</a:t>
-            </a:r>
-          </a:p>
-          <a:p>
-            <a:r>
-              <a:rPr lang="en-US" dirty="0">
-                <a:hlinkClick r:id="rId2"/>
-              </a:rPr>
-              <a:t>https://</a:t>
-            </a:r>
-            <a:r>
-              <a:rPr lang="en-US" dirty="0" smtClean="0">
-                <a:hlinkClick r:id="rId2"/>
-              </a:rPr>
-              <a:t>en.wikipedia.org/wiki/Isomap</a:t>
-            </a:r>
-            <a:endParaRPr lang="en-US" dirty="0" smtClean="0"/>
-          </a:p>
-          <a:p>
-            <a:pPr marL="228600" lvl="1">
-              <a:spcBef>
-                <a:spcPts val="1000"/>
-              </a:spcBef>
-            </a:pPr>
-            <a:r>
-              <a:rPr lang="en-US" dirty="0">
-                <a:hlinkClick r:id="rId3"/>
-              </a:rPr>
-              <a:t>https://</a:t>
-            </a:r>
-            <a:r>
-              <a:rPr lang="en-US" dirty="0" smtClean="0">
-                <a:hlinkClick r:id="rId3"/>
-              </a:rPr>
-              <a:t>stats.stackexchange.com/questions/124534/how-to-understand-nonlinear-as-in-nonlinear-dimensionality-reduction</a:t>
-            </a:r>
-            <a:endParaRPr lang="en-US" dirty="0" smtClean="0"/>
-          </a:p>
-          <a:p>
-            <a:pPr marL="228600" lvl="1">
-              <a:spcBef>
-                <a:spcPts val="1000"/>
-              </a:spcBef>
-            </a:pPr>
-            <a:r>
-              <a:rPr lang="en-US" dirty="0"/>
-              <a:t>https://</a:t>
-            </a:r>
-            <a:r>
-              <a:rPr lang="en-US" dirty="0" err="1"/>
-              <a:t>en.wikipedia.org</a:t>
-            </a:r>
-            <a:r>
-              <a:rPr lang="en-US" dirty="0"/>
-              <a:t>/wiki/</a:t>
-            </a:r>
-            <a:r>
-              <a:rPr lang="en-US" dirty="0" err="1"/>
-              <a:t>Hierarchical_clustering</a:t>
-            </a:r>
-            <a:endParaRPr lang="en-US" dirty="0"/>
-          </a:p>
-          <a:p>
-            <a:endParaRPr lang="en-US" dirty="0" smtClean="0"/>
-          </a:p>
-          <a:p>
-            <a:endParaRPr lang="en-US" dirty="0"/>
-          </a:p>
-        </p:txBody>
-      </p:sp>
-    </p:spTree>
-    <p:extLst>
-      <p:ext uri="{BB962C8B-B14F-4D97-AF65-F5344CB8AC3E}">
-        <p14:creationId xmlns:p14="http://schemas.microsoft.com/office/powerpoint/2010/main" val="1093250247"/>
       </p:ext>
     </p:extLst>
   </p:cSld>
@@ -6997,7 +6756,7 @@
           <p:cNvPr id="2" name="Title 1">
             <a:extLst>
               <a:ext uri="{FF2B5EF4-FFF2-40B4-BE49-F238E27FC236}">
-                <a16:creationId xmlns:a16="http://schemas.microsoft.com/office/drawing/2014/main" xmlns="" id="{6A0818EE-A21E-4C03-984C-0F4CAC2D5766}"/>
+                <a16:creationId xmlns:a16="http://schemas.microsoft.com/office/drawing/2014/main" id="{6A0818EE-A21E-4C03-984C-0F4CAC2D5766}"/>
               </a:ext>
             </a:extLst>
           </p:cNvPr>
@@ -7018,16 +6777,12 @@
               <a:t>Why Cluster </a:t>
             </a:r>
             <a:r>
-              <a:rPr lang="en-US" dirty="0" err="1" smtClean="0"/>
+              <a:rPr lang="en-US" dirty="0" err="1"/>
               <a:t>Youtube</a:t>
             </a:r>
             <a:r>
-              <a:rPr lang="en-US" dirty="0" smtClean="0"/>
-              <a:t> </a:t>
-            </a:r>
-            <a:r>
               <a:rPr lang="en-US" dirty="0"/>
-              <a:t>Videos?</a:t>
+              <a:t> Videos?</a:t>
             </a:r>
           </a:p>
         </p:txBody>
@@ -7037,7 +6792,7 @@
           <p:cNvPr id="3" name="Content Placeholder 2">
             <a:extLst>
               <a:ext uri="{FF2B5EF4-FFF2-40B4-BE49-F238E27FC236}">
-                <a16:creationId xmlns:a16="http://schemas.microsoft.com/office/drawing/2014/main" xmlns="" id="{282E05AE-DE14-47DB-9F97-5B76DB17D419}"/>
+                <a16:creationId xmlns:a16="http://schemas.microsoft.com/office/drawing/2014/main" id="{282E05AE-DE14-47DB-9F97-5B76DB17D419}"/>
               </a:ext>
             </a:extLst>
           </p:cNvPr>
@@ -7151,7 +6906,7 @@
           <p:cNvPr id="2" name="Title 1">
             <a:extLst>
               <a:ext uri="{FF2B5EF4-FFF2-40B4-BE49-F238E27FC236}">
-                <a16:creationId xmlns:a16="http://schemas.microsoft.com/office/drawing/2014/main" xmlns="" id="{D796A892-FC62-42DA-8E12-A313AC2267DA}"/>
+                <a16:creationId xmlns:a16="http://schemas.microsoft.com/office/drawing/2014/main" id="{D796A892-FC62-42DA-8E12-A313AC2267DA}"/>
               </a:ext>
             </a:extLst>
           </p:cNvPr>
@@ -7184,7 +6939,7 @@
           <p:cNvPr id="3" name="Content Placeholder 2">
             <a:extLst>
               <a:ext uri="{FF2B5EF4-FFF2-40B4-BE49-F238E27FC236}">
-                <a16:creationId xmlns:a16="http://schemas.microsoft.com/office/drawing/2014/main" xmlns="" id="{0E796DB0-6D05-46B7-B95B-340207189CBA}"/>
+                <a16:creationId xmlns:a16="http://schemas.microsoft.com/office/drawing/2014/main" id="{0E796DB0-6D05-46B7-B95B-340207189CBA}"/>
               </a:ext>
             </a:extLst>
           </p:cNvPr>
@@ -7288,181 +7043,7 @@
           <p:cNvPr id="2" name="Title 1">
             <a:extLst>
               <a:ext uri="{FF2B5EF4-FFF2-40B4-BE49-F238E27FC236}">
-                <a16:creationId xmlns:a16="http://schemas.microsoft.com/office/drawing/2014/main" xmlns="" id="{20762814-E21A-42C6-BAF3-F8CABFB00A57}"/>
-              </a:ext>
-            </a:extLst>
-          </p:cNvPr>
-          <p:cNvSpPr>
-            <a:spLocks noGrp="1"/>
-          </p:cNvSpPr>
-          <p:nvPr>
-            <p:ph type="title"/>
-          </p:nvPr>
-        </p:nvSpPr>
-        <p:spPr/>
-        <p:txBody>
-          <a:bodyPr/>
-          <a:lstStyle/>
-          <a:p>
-            <a:r>
-              <a:rPr lang="en-US" dirty="0" err="1"/>
-              <a:t>Isomap</a:t>
-            </a:r>
-            <a:endParaRPr lang="en-US" dirty="0"/>
-          </a:p>
-        </p:txBody>
-      </p:sp>
-      <p:sp>
-        <p:nvSpPr>
-          <p:cNvPr id="3" name="Content Placeholder 2">
-            <a:extLst>
-              <a:ext uri="{FF2B5EF4-FFF2-40B4-BE49-F238E27FC236}">
-                <a16:creationId xmlns:a16="http://schemas.microsoft.com/office/drawing/2014/main" xmlns="" id="{38A0C809-337D-4EF3-868D-1F87E5058E5F}"/>
-              </a:ext>
-            </a:extLst>
-          </p:cNvPr>
-          <p:cNvSpPr>
-            <a:spLocks noGrp="1"/>
-          </p:cNvSpPr>
-          <p:nvPr>
-            <p:ph sz="quarter" idx="13"/>
-          </p:nvPr>
-        </p:nvSpPr>
-        <p:spPr>
-          <a:xfrm>
-            <a:off x="913775" y="1883422"/>
-            <a:ext cx="10363826" cy="3424107"/>
-          </a:xfrm>
-        </p:spPr>
-        <p:txBody>
-          <a:bodyPr/>
-          <a:lstStyle/>
-          <a:p>
-            <a:r>
-              <a:rPr lang="en-US" dirty="0" smtClean="0"/>
-              <a:t>NON LINEARITY DIMENSION REDUCTION METHOD</a:t>
-            </a:r>
-          </a:p>
-          <a:p>
-            <a:pPr lvl="1"/>
-            <a:r>
-              <a:rPr lang="en-US" dirty="0"/>
-              <a:t> components of the low-dimensional vector are given by </a:t>
-            </a:r>
-            <a:r>
-              <a:rPr lang="en-US" dirty="0" smtClean="0"/>
-              <a:t>NON linear </a:t>
-            </a:r>
-            <a:r>
-              <a:rPr lang="en-US" dirty="0"/>
-              <a:t>functions of the components of the corresponding high-dimensional vector. </a:t>
-            </a:r>
-            <a:endParaRPr lang="en-US" dirty="0" smtClean="0"/>
-          </a:p>
-        </p:txBody>
-      </p:sp>
-      <p:pic>
-        <p:nvPicPr>
-          <p:cNvPr id="4" name="Picture 3"/>
-          <p:cNvPicPr>
-            <a:picLocks noChangeAspect="1"/>
-          </p:cNvPicPr>
-          <p:nvPr/>
-        </p:nvPicPr>
-        <p:blipFill>
-          <a:blip r:embed="rId2">
-            <a:extLst>
-              <a:ext uri="{28A0092B-C50C-407E-A947-70E740481C1C}">
-                <a14:useLocalDpi xmlns:a14="http://schemas.microsoft.com/office/drawing/2010/main" val="0"/>
-              </a:ext>
-            </a:extLst>
-          </a:blip>
-          <a:stretch>
-            <a:fillRect/>
-          </a:stretch>
-        </p:blipFill>
-        <p:spPr>
-          <a:xfrm>
-            <a:off x="2537974" y="3330566"/>
-            <a:ext cx="6324600" cy="3289300"/>
-          </a:xfrm>
-          <a:prstGeom prst="rect">
-            <a:avLst/>
-          </a:prstGeom>
-        </p:spPr>
-      </p:pic>
-      <p:sp>
-        <p:nvSpPr>
-          <p:cNvPr id="6" name="TextBox 5"/>
-          <p:cNvSpPr txBox="1"/>
-          <p:nvPr/>
-        </p:nvSpPr>
-        <p:spPr>
-          <a:xfrm>
-            <a:off x="593558" y="6534834"/>
-            <a:ext cx="11431003" cy="646331"/>
-          </a:xfrm>
-          <a:prstGeom prst="rect">
-            <a:avLst/>
-          </a:prstGeom>
-          <a:noFill/>
-        </p:spPr>
-        <p:txBody>
-          <a:bodyPr wrap="square" rtlCol="0">
-            <a:spAutoFit/>
-          </a:bodyPr>
-          <a:lstStyle/>
-          <a:p>
-            <a:pPr marL="0" lvl="1"/>
-            <a:r>
-              <a:rPr lang="en-US" dirty="0">
-                <a:hlinkClick r:id="rId3"/>
-              </a:rPr>
-              <a:t>https://stats.stackexchange.com/questions/124534/how-to-understand-nonlinear-as-in-nonlinear-dimensionality-reduction</a:t>
-            </a:r>
-            <a:endParaRPr lang="en-US" dirty="0"/>
-          </a:p>
-          <a:p>
-            <a:endParaRPr lang="en-US" dirty="0"/>
-          </a:p>
-        </p:txBody>
-      </p:sp>
-    </p:spTree>
-    <p:extLst>
-      <p:ext uri="{BB962C8B-B14F-4D97-AF65-F5344CB8AC3E}">
-        <p14:creationId xmlns:p14="http://schemas.microsoft.com/office/powerpoint/2010/main" val="1643075207"/>
-      </p:ext>
-    </p:extLst>
-  </p:cSld>
-  <p:clrMapOvr>
-    <a:masterClrMapping/>
-  </p:clrMapOvr>
-</p:sld>
-</file>
-
-<file path=ppt/slides/slide5.xml><?xml version="1.0" encoding="utf-8"?>
-<p:sld xmlns:a="http://schemas.openxmlformats.org/drawingml/2006/main" xmlns:r="http://schemas.openxmlformats.org/officeDocument/2006/relationships" xmlns:p="http://schemas.openxmlformats.org/presentationml/2006/main">
-  <p:cSld>
-    <p:spTree>
-      <p:nvGrpSpPr>
-        <p:cNvPr id="1" name=""/>
-        <p:cNvGrpSpPr/>
-        <p:nvPr/>
-      </p:nvGrpSpPr>
-      <p:grpSpPr>
-        <a:xfrm>
-          <a:off x="0" y="0"/>
-          <a:ext cx="0" cy="0"/>
-          <a:chOff x="0" y="0"/>
-          <a:chExt cx="0" cy="0"/>
-        </a:xfrm>
-      </p:grpSpPr>
-      <p:sp>
-        <p:nvSpPr>
-          <p:cNvPr id="2" name="Title 1">
-            <a:extLst>
-              <a:ext uri="{FF2B5EF4-FFF2-40B4-BE49-F238E27FC236}">
-                <a16:creationId xmlns:a16="http://schemas.microsoft.com/office/drawing/2014/main" xmlns="" id="{A6CDE3A3-770E-4285-B201-38CFC045C6AC}"/>
+                <a16:creationId xmlns:a16="http://schemas.microsoft.com/office/drawing/2014/main" id="{A6CDE3A3-770E-4285-B201-38CFC045C6AC}"/>
               </a:ext>
             </a:extLst>
           </p:cNvPr>
@@ -7495,7 +7076,7 @@
           <p:cNvPr id="3" name="Content Placeholder 2">
             <a:extLst>
               <a:ext uri="{FF2B5EF4-FFF2-40B4-BE49-F238E27FC236}">
-                <a16:creationId xmlns:a16="http://schemas.microsoft.com/office/drawing/2014/main" xmlns="" id="{6F144887-46C7-4AB4-8EED-8070490FCD59}"/>
+                <a16:creationId xmlns:a16="http://schemas.microsoft.com/office/drawing/2014/main" id="{6F144887-46C7-4AB4-8EED-8070490FCD59}"/>
               </a:ext>
             </a:extLst>
           </p:cNvPr>
@@ -7537,7 +7118,7 @@
           <p:cNvPr id="7" name="Picture 6" descr="A screenshot of a cell phone&#10;&#10;Description generated with very high confidence">
             <a:extLst>
               <a:ext uri="{FF2B5EF4-FFF2-40B4-BE49-F238E27FC236}">
-                <a16:creationId xmlns:a16="http://schemas.microsoft.com/office/drawing/2014/main" xmlns="" id="{6960B240-46F8-4028-8692-0FA50180EBC2}"/>
+                <a16:creationId xmlns:a16="http://schemas.microsoft.com/office/drawing/2014/main" id="{6960B240-46F8-4028-8692-0FA50180EBC2}"/>
               </a:ext>
             </a:extLst>
           </p:cNvPr>
@@ -7572,7 +7153,7 @@
           <p:cNvPr id="9" name="Picture 8" descr="A screenshot of a cell phone&#10;&#10;Description generated with high confidence">
             <a:extLst>
               <a:ext uri="{FF2B5EF4-FFF2-40B4-BE49-F238E27FC236}">
-                <a16:creationId xmlns:a16="http://schemas.microsoft.com/office/drawing/2014/main" xmlns="" id="{8871C8AC-8557-493F-A842-200F6F4CF31B}"/>
+                <a16:creationId xmlns:a16="http://schemas.microsoft.com/office/drawing/2014/main" id="{8871C8AC-8557-493F-A842-200F6F4CF31B}"/>
               </a:ext>
             </a:extLst>
           </p:cNvPr>
@@ -7615,6 +7196,131 @@
 </p:sld>
 </file>
 
+<file path=ppt/slides/slide5.xml><?xml version="1.0" encoding="utf-8"?>
+<p:sld xmlns:a="http://schemas.openxmlformats.org/drawingml/2006/main" xmlns:r="http://schemas.openxmlformats.org/officeDocument/2006/relationships" xmlns:p="http://schemas.openxmlformats.org/presentationml/2006/main">
+  <p:cSld>
+    <p:spTree>
+      <p:nvGrpSpPr>
+        <p:cNvPr id="1" name=""/>
+        <p:cNvGrpSpPr/>
+        <p:nvPr/>
+      </p:nvGrpSpPr>
+      <p:grpSpPr>
+        <a:xfrm>
+          <a:off x="0" y="0"/>
+          <a:ext cx="0" cy="0"/>
+          <a:chOff x="0" y="0"/>
+          <a:chExt cx="0" cy="0"/>
+        </a:xfrm>
+      </p:grpSpPr>
+      <p:sp>
+        <p:nvSpPr>
+          <p:cNvPr id="2" name="Title 1">
+            <a:extLst>
+              <a:ext uri="{FF2B5EF4-FFF2-40B4-BE49-F238E27FC236}">
+                <a16:creationId xmlns:a16="http://schemas.microsoft.com/office/drawing/2014/main" id="{274A305D-4D9E-4986-8F10-EDB5B3127A22}"/>
+              </a:ext>
+            </a:extLst>
+          </p:cNvPr>
+          <p:cNvSpPr>
+            <a:spLocks noGrp="1"/>
+          </p:cNvSpPr>
+          <p:nvPr>
+            <p:ph type="title"/>
+          </p:nvPr>
+        </p:nvSpPr>
+        <p:spPr>
+          <a:xfrm>
+            <a:off x="913774" y="562534"/>
+            <a:ext cx="10364451" cy="1596177"/>
+          </a:xfrm>
+        </p:spPr>
+        <p:txBody>
+          <a:bodyPr/>
+          <a:lstStyle/>
+          <a:p>
+            <a:r>
+              <a:rPr lang="en-US" dirty="0" err="1"/>
+              <a:t>KMeans</a:t>
+            </a:r>
+            <a:endParaRPr lang="en-US" dirty="0"/>
+          </a:p>
+        </p:txBody>
+      </p:sp>
+      <p:sp>
+        <p:nvSpPr>
+          <p:cNvPr id="3" name="Content Placeholder 2">
+            <a:extLst>
+              <a:ext uri="{FF2B5EF4-FFF2-40B4-BE49-F238E27FC236}">
+                <a16:creationId xmlns:a16="http://schemas.microsoft.com/office/drawing/2014/main" id="{07716CFF-3B18-4811-89AB-74BD3754B4E6}"/>
+              </a:ext>
+            </a:extLst>
+          </p:cNvPr>
+          <p:cNvSpPr>
+            <a:spLocks noGrp="1"/>
+          </p:cNvSpPr>
+          <p:nvPr>
+            <p:ph sz="quarter" idx="13"/>
+          </p:nvPr>
+        </p:nvSpPr>
+        <p:spPr/>
+        <p:txBody>
+          <a:bodyPr/>
+          <a:lstStyle/>
+          <a:p>
+            <a:r>
+              <a:rPr lang="en-US" dirty="0"/>
+              <a:t>Centroid based clustering</a:t>
+            </a:r>
+          </a:p>
+          <a:p>
+            <a:r>
+              <a:rPr lang="en-US" dirty="0"/>
+              <a:t>Uses Silhouette coefficient to identify correlation between clusters</a:t>
+            </a:r>
+          </a:p>
+          <a:p>
+            <a:pPr lvl="1"/>
+            <a:r>
+              <a:rPr lang="en-US" dirty="0"/>
+              <a:t>+1 : best cluster (Clusters are non overlapping)</a:t>
+            </a:r>
+          </a:p>
+          <a:p>
+            <a:pPr lvl="1"/>
+            <a:r>
+              <a:rPr lang="en-US" dirty="0"/>
+              <a:t>  0 : cluster are overlapping </a:t>
+            </a:r>
+          </a:p>
+          <a:p>
+            <a:pPr lvl="1"/>
+            <a:r>
+              <a:rPr lang="en-US" dirty="0"/>
+              <a:t>-1 : worst clusters (data points are assigned to wrong clusters)</a:t>
+            </a:r>
+          </a:p>
+          <a:p>
+            <a:endParaRPr lang="en-US" dirty="0"/>
+          </a:p>
+          <a:p>
+            <a:endParaRPr lang="en-US" dirty="0"/>
+          </a:p>
+        </p:txBody>
+      </p:sp>
+    </p:spTree>
+    <p:extLst>
+      <p:ext uri="{BB962C8B-B14F-4D97-AF65-F5344CB8AC3E}">
+        <p14:creationId xmlns:p14="http://schemas.microsoft.com/office/powerpoint/2010/main" val="3755679565"/>
+      </p:ext>
+    </p:extLst>
+  </p:cSld>
+  <p:clrMapOvr>
+    <a:masterClrMapping/>
+  </p:clrMapOvr>
+</p:sld>
+</file>
+
 <file path=ppt/slides/slide6.xml><?xml version="1.0" encoding="utf-8"?>
 <p:sld xmlns:a="http://schemas.openxmlformats.org/drawingml/2006/main" xmlns:r="http://schemas.openxmlformats.org/officeDocument/2006/relationships" xmlns:p="http://schemas.openxmlformats.org/presentationml/2006/main">
   <p:cSld>
@@ -7637,7 +7343,7 @@
           <p:cNvPr id="2" name="Title 1">
             <a:extLst>
               <a:ext uri="{FF2B5EF4-FFF2-40B4-BE49-F238E27FC236}">
-                <a16:creationId xmlns:a16="http://schemas.microsoft.com/office/drawing/2014/main" xmlns="" id="{274A305D-4D9E-4986-8F10-EDB5B3127A22}"/>
+                <a16:creationId xmlns:a16="http://schemas.microsoft.com/office/drawing/2014/main" id="{60B89E68-CDB7-4337-90F0-AC28E247D32A}"/>
               </a:ext>
             </a:extLst>
           </p:cNvPr>
@@ -7648,54 +7354,1305 @@
             <p:ph type="title"/>
           </p:nvPr>
         </p:nvSpPr>
-        <p:spPr/>
-        <p:txBody>
-          <a:bodyPr/>
+        <p:spPr>
+          <a:xfrm>
+            <a:off x="913775" y="618517"/>
+            <a:ext cx="10364451" cy="622454"/>
+          </a:xfrm>
+        </p:spPr>
+        <p:txBody>
+          <a:bodyPr>
+            <a:normAutofit/>
+          </a:bodyPr>
           <a:lstStyle/>
           <a:p>
             <a:r>
-              <a:rPr lang="en-US" dirty="0" err="1"/>
-              <a:t>KMeans</a:t>
-            </a:r>
-            <a:endParaRPr lang="en-US" dirty="0"/>
-          </a:p>
-        </p:txBody>
-      </p:sp>
-      <p:sp>
-        <p:nvSpPr>
-          <p:cNvPr id="3" name="Content Placeholder 2">
+              <a:rPr lang="en-US" sz="3200" dirty="0"/>
+              <a:t>Performance Measure</a:t>
+            </a:r>
+          </a:p>
+        </p:txBody>
+      </p:sp>
+      <p:graphicFrame>
+        <p:nvGraphicFramePr>
+          <p:cNvPr id="4" name="Content Placeholder 6">
             <a:extLst>
               <a:ext uri="{FF2B5EF4-FFF2-40B4-BE49-F238E27FC236}">
-                <a16:creationId xmlns:a16="http://schemas.microsoft.com/office/drawing/2014/main" xmlns="" id="{07716CFF-3B18-4811-89AB-74BD3754B4E6}"/>
+                <a16:creationId xmlns:a16="http://schemas.microsoft.com/office/drawing/2014/main" id="{3A140616-5BA7-4137-8673-20E7D6F3017D}"/>
               </a:ext>
             </a:extLst>
           </p:cNvPr>
-          <p:cNvSpPr>
-            <a:spLocks noGrp="1"/>
-          </p:cNvSpPr>
+          <p:cNvGraphicFramePr>
+            <a:graphicFrameLocks noGrp="1"/>
+          </p:cNvGraphicFramePr>
           <p:nvPr>
             <p:ph sz="quarter" idx="13"/>
-          </p:nvPr>
-        </p:nvSpPr>
-        <p:spPr/>
-        <p:txBody>
-          <a:bodyPr/>
-          <a:lstStyle/>
-          <a:p>
-            <a:r>
-              <a:rPr lang="en-US" dirty="0"/>
-              <a:t>Centroid based clustering</a:t>
-            </a:r>
-          </a:p>
-          <a:p>
-            <a:endParaRPr lang="en-US" dirty="0"/>
-          </a:p>
-        </p:txBody>
-      </p:sp>
+            <p:extLst>
+              <p:ext uri="{D42A27DB-BD31-4B8C-83A1-F6EECF244321}">
+                <p14:modId xmlns:p14="http://schemas.microsoft.com/office/powerpoint/2010/main" val="1916119823"/>
+              </p:ext>
+            </p:extLst>
+          </p:nvPr>
+        </p:nvGraphicFramePr>
+        <p:xfrm>
+          <a:off x="913775" y="1443770"/>
+          <a:ext cx="10530879" cy="5090160"/>
+        </p:xfrm>
+        <a:graphic>
+          <a:graphicData uri="http://schemas.openxmlformats.org/drawingml/2006/table">
+            <a:tbl>
+              <a:tblPr firstRow="1" bandRow="1">
+                <a:tableStyleId>{073A0DAA-6AF3-43AB-8588-CEC1D06C72B9}</a:tableStyleId>
+              </a:tblPr>
+              <a:tblGrid>
+                <a:gridCol w="1178794">
+                  <a:extLst>
+                    <a:ext uri="{9D8B030D-6E8A-4147-A177-3AD203B41FA5}">
+                      <a16:colId xmlns:a16="http://schemas.microsoft.com/office/drawing/2014/main" val="338602619"/>
+                    </a:ext>
+                  </a:extLst>
+                </a:gridCol>
+                <a:gridCol w="1995854">
+                  <a:extLst>
+                    <a:ext uri="{9D8B030D-6E8A-4147-A177-3AD203B41FA5}">
+                      <a16:colId xmlns:a16="http://schemas.microsoft.com/office/drawing/2014/main" val="1728608955"/>
+                    </a:ext>
+                  </a:extLst>
+                </a:gridCol>
+                <a:gridCol w="1694692">
+                  <a:extLst>
+                    <a:ext uri="{9D8B030D-6E8A-4147-A177-3AD203B41FA5}">
+                      <a16:colId xmlns:a16="http://schemas.microsoft.com/office/drawing/2014/main" val="611120877"/>
+                    </a:ext>
+                  </a:extLst>
+                </a:gridCol>
+                <a:gridCol w="1161494">
+                  <a:extLst>
+                    <a:ext uri="{9D8B030D-6E8A-4147-A177-3AD203B41FA5}">
+                      <a16:colId xmlns:a16="http://schemas.microsoft.com/office/drawing/2014/main" val="560338395"/>
+                    </a:ext>
+                  </a:extLst>
+                </a:gridCol>
+                <a:gridCol w="2144297">
+                  <a:extLst>
+                    <a:ext uri="{9D8B030D-6E8A-4147-A177-3AD203B41FA5}">
+                      <a16:colId xmlns:a16="http://schemas.microsoft.com/office/drawing/2014/main" val="4010531375"/>
+                    </a:ext>
+                  </a:extLst>
+                </a:gridCol>
+                <a:gridCol w="2355748">
+                  <a:extLst>
+                    <a:ext uri="{9D8B030D-6E8A-4147-A177-3AD203B41FA5}">
+                      <a16:colId xmlns:a16="http://schemas.microsoft.com/office/drawing/2014/main" val="3727696881"/>
+                    </a:ext>
+                  </a:extLst>
+                </a:gridCol>
+              </a:tblGrid>
+              <a:tr h="370840">
+                <a:tc>
+                  <a:txBody>
+                    <a:bodyPr/>
+                    <a:lstStyle/>
+                    <a:p>
+                      <a:pPr algn="ctr"/>
+                      <a:r>
+                        <a:rPr lang="en-US" dirty="0"/>
+                        <a:t>CLUSTERS</a:t>
+                      </a:r>
+                    </a:p>
+                  </a:txBody>
+                  <a:tcPr/>
+                </a:tc>
+                <a:tc>
+                  <a:txBody>
+                    <a:bodyPr/>
+                    <a:lstStyle/>
+                    <a:p>
+                      <a:pPr algn="ctr"/>
+                      <a:r>
+                        <a:rPr lang="en-US" dirty="0"/>
+                        <a:t>SIHOUETTE VALUE</a:t>
+                      </a:r>
+                    </a:p>
+                  </a:txBody>
+                  <a:tcPr/>
+                </a:tc>
+                <a:tc>
+                  <a:txBody>
+                    <a:bodyPr/>
+                    <a:lstStyle/>
+                    <a:p>
+                      <a:pPr algn="ctr"/>
+                      <a:r>
+                        <a:rPr lang="en-US" dirty="0"/>
+                        <a:t>TRAINING TIME</a:t>
+                      </a:r>
+                    </a:p>
+                    <a:p>
+                      <a:pPr algn="ctr"/>
+                      <a:r>
+                        <a:rPr lang="en-US" dirty="0"/>
+                        <a:t>(Sec)</a:t>
+                      </a:r>
+                    </a:p>
+                  </a:txBody>
+                  <a:tcPr/>
+                </a:tc>
+                <a:tc>
+                  <a:txBody>
+                    <a:bodyPr/>
+                    <a:lstStyle/>
+                    <a:p>
+                      <a:pPr algn="ctr"/>
+                      <a:r>
+                        <a:rPr lang="en-US" dirty="0"/>
+                        <a:t>CLUSTERS</a:t>
+                      </a:r>
+                    </a:p>
+                  </a:txBody>
+                  <a:tcPr/>
+                </a:tc>
+                <a:tc>
+                  <a:txBody>
+                    <a:bodyPr/>
+                    <a:lstStyle/>
+                    <a:p>
+                      <a:pPr algn="ctr"/>
+                      <a:r>
+                        <a:rPr lang="en-US" dirty="0"/>
+                        <a:t>SILHOUETTE VALUE</a:t>
+                      </a:r>
+                    </a:p>
+                  </a:txBody>
+                  <a:tcPr/>
+                </a:tc>
+                <a:tc>
+                  <a:txBody>
+                    <a:bodyPr/>
+                    <a:lstStyle/>
+                    <a:p>
+                      <a:pPr algn="ctr"/>
+                      <a:r>
+                        <a:rPr lang="en-US" dirty="0"/>
+                        <a:t>TRAINING TIME</a:t>
+                      </a:r>
+                    </a:p>
+                    <a:p>
+                      <a:pPr algn="ctr"/>
+                      <a:r>
+                        <a:rPr lang="en-US" dirty="0"/>
+                        <a:t>(Sec)</a:t>
+                      </a:r>
+                    </a:p>
+                  </a:txBody>
+                  <a:tcPr/>
+                </a:tc>
+                <a:extLst>
+                  <a:ext uri="{0D108BD9-81ED-4DB2-BD59-A6C34878D82A}">
+                    <a16:rowId xmlns:a16="http://schemas.microsoft.com/office/drawing/2014/main" val="79857652"/>
+                  </a:ext>
+                </a:extLst>
+              </a:tr>
+              <a:tr h="370840">
+                <a:tc>
+                  <a:txBody>
+                    <a:bodyPr/>
+                    <a:lstStyle/>
+                    <a:p>
+                      <a:pPr algn="ctr"/>
+                      <a:r>
+                        <a:rPr lang="en-US" dirty="0"/>
+                        <a:t>2</a:t>
+                      </a:r>
+                    </a:p>
+                  </a:txBody>
+                  <a:tcPr/>
+                </a:tc>
+                <a:tc>
+                  <a:txBody>
+                    <a:bodyPr/>
+                    <a:lstStyle/>
+                    <a:p>
+                      <a:pPr algn="ctr"/>
+                      <a:r>
+                        <a:rPr lang="en-US" dirty="0"/>
+                        <a:t>-0.006</a:t>
+                      </a:r>
+                    </a:p>
+                  </a:txBody>
+                  <a:tcPr/>
+                </a:tc>
+                <a:tc>
+                  <a:txBody>
+                    <a:bodyPr/>
+                    <a:lstStyle/>
+                    <a:p>
+                      <a:pPr algn="ctr"/>
+                      <a:r>
+                        <a:rPr lang="en-US" dirty="0"/>
+                        <a:t>26.17</a:t>
+                      </a:r>
+                    </a:p>
+                  </a:txBody>
+                  <a:tcPr/>
+                </a:tc>
+                <a:tc>
+                  <a:txBody>
+                    <a:bodyPr/>
+                    <a:lstStyle/>
+                    <a:p>
+                      <a:pPr algn="ctr"/>
+                      <a:r>
+                        <a:rPr lang="en-US" dirty="0"/>
+                        <a:t>14</a:t>
+                      </a:r>
+                    </a:p>
+                  </a:txBody>
+                  <a:tcPr/>
+                </a:tc>
+                <a:tc>
+                  <a:txBody>
+                    <a:bodyPr/>
+                    <a:lstStyle/>
+                    <a:p>
+                      <a:pPr algn="ctr"/>
+                      <a:r>
+                        <a:rPr lang="en-US" dirty="0"/>
+                        <a:t>0.017</a:t>
+                      </a:r>
+                    </a:p>
+                  </a:txBody>
+                  <a:tcPr/>
+                </a:tc>
+                <a:tc>
+                  <a:txBody>
+                    <a:bodyPr/>
+                    <a:lstStyle/>
+                    <a:p>
+                      <a:pPr algn="ctr"/>
+                      <a:r>
+                        <a:rPr lang="en-US" dirty="0"/>
+                        <a:t>51.75</a:t>
+                      </a:r>
+                    </a:p>
+                  </a:txBody>
+                  <a:tcPr/>
+                </a:tc>
+                <a:extLst>
+                  <a:ext uri="{0D108BD9-81ED-4DB2-BD59-A6C34878D82A}">
+                    <a16:rowId xmlns:a16="http://schemas.microsoft.com/office/drawing/2014/main" val="838917877"/>
+                  </a:ext>
+                </a:extLst>
+              </a:tr>
+              <a:tr h="370840">
+                <a:tc>
+                  <a:txBody>
+                    <a:bodyPr/>
+                    <a:lstStyle/>
+                    <a:p>
+                      <a:pPr algn="ctr"/>
+                      <a:r>
+                        <a:rPr lang="en-US" dirty="0"/>
+                        <a:t>3</a:t>
+                      </a:r>
+                    </a:p>
+                  </a:txBody>
+                  <a:tcPr/>
+                </a:tc>
+                <a:tc>
+                  <a:txBody>
+                    <a:bodyPr/>
+                    <a:lstStyle/>
+                    <a:p>
+                      <a:pPr algn="ctr"/>
+                      <a:r>
+                        <a:rPr lang="en-US" dirty="0"/>
+                        <a:t>-0.003</a:t>
+                      </a:r>
+                    </a:p>
+                  </a:txBody>
+                  <a:tcPr/>
+                </a:tc>
+                <a:tc>
+                  <a:txBody>
+                    <a:bodyPr/>
+                    <a:lstStyle/>
+                    <a:p>
+                      <a:pPr algn="ctr"/>
+                      <a:r>
+                        <a:rPr lang="en-US" dirty="0"/>
+                        <a:t>28.08</a:t>
+                      </a:r>
+                    </a:p>
+                  </a:txBody>
+                  <a:tcPr/>
+                </a:tc>
+                <a:tc>
+                  <a:txBody>
+                    <a:bodyPr/>
+                    <a:lstStyle/>
+                    <a:p>
+                      <a:pPr algn="ctr"/>
+                      <a:r>
+                        <a:rPr lang="en-US" dirty="0"/>
+                        <a:t>15</a:t>
+                      </a:r>
+                    </a:p>
+                  </a:txBody>
+                  <a:tcPr/>
+                </a:tc>
+                <a:tc>
+                  <a:txBody>
+                    <a:bodyPr/>
+                    <a:lstStyle/>
+                    <a:p>
+                      <a:pPr algn="ctr"/>
+                      <a:r>
+                        <a:rPr lang="en-US" dirty="0"/>
+                        <a:t>0.015</a:t>
+                      </a:r>
+                    </a:p>
+                  </a:txBody>
+                  <a:tcPr/>
+                </a:tc>
+                <a:tc>
+                  <a:txBody>
+                    <a:bodyPr/>
+                    <a:lstStyle/>
+                    <a:p>
+                      <a:pPr algn="ctr"/>
+                      <a:r>
+                        <a:rPr lang="en-US" dirty="0"/>
+                        <a:t>56.36</a:t>
+                      </a:r>
+                    </a:p>
+                  </a:txBody>
+                  <a:tcPr/>
+                </a:tc>
+                <a:extLst>
+                  <a:ext uri="{0D108BD9-81ED-4DB2-BD59-A6C34878D82A}">
+                    <a16:rowId xmlns:a16="http://schemas.microsoft.com/office/drawing/2014/main" val="1733509954"/>
+                  </a:ext>
+                </a:extLst>
+              </a:tr>
+              <a:tr h="370840">
+                <a:tc>
+                  <a:txBody>
+                    <a:bodyPr/>
+                    <a:lstStyle/>
+                    <a:p>
+                      <a:pPr algn="ctr"/>
+                      <a:r>
+                        <a:rPr lang="en-US" dirty="0"/>
+                        <a:t>4</a:t>
+                      </a:r>
+                    </a:p>
+                  </a:txBody>
+                  <a:tcPr/>
+                </a:tc>
+                <a:tc>
+                  <a:txBody>
+                    <a:bodyPr/>
+                    <a:lstStyle/>
+                    <a:p>
+                      <a:pPr algn="ctr"/>
+                      <a:r>
+                        <a:rPr lang="en-US" dirty="0"/>
+                        <a:t>-0.002</a:t>
+                      </a:r>
+                    </a:p>
+                  </a:txBody>
+                  <a:tcPr/>
+                </a:tc>
+                <a:tc>
+                  <a:txBody>
+                    <a:bodyPr/>
+                    <a:lstStyle/>
+                    <a:p>
+                      <a:pPr algn="ctr"/>
+                      <a:r>
+                        <a:rPr lang="en-US" dirty="0"/>
+                        <a:t>28.56</a:t>
+                      </a:r>
+                    </a:p>
+                  </a:txBody>
+                  <a:tcPr/>
+                </a:tc>
+                <a:tc>
+                  <a:txBody>
+                    <a:bodyPr/>
+                    <a:lstStyle/>
+                    <a:p>
+                      <a:pPr algn="ctr"/>
+                      <a:r>
+                        <a:rPr lang="en-US" dirty="0"/>
+                        <a:t>16</a:t>
+                      </a:r>
+                    </a:p>
+                  </a:txBody>
+                  <a:tcPr/>
+                </a:tc>
+                <a:tc>
+                  <a:txBody>
+                    <a:bodyPr/>
+                    <a:lstStyle/>
+                    <a:p>
+                      <a:pPr algn="ctr"/>
+                      <a:r>
+                        <a:rPr lang="en-US" dirty="0"/>
+                        <a:t>0.016</a:t>
+                      </a:r>
+                    </a:p>
+                  </a:txBody>
+                  <a:tcPr/>
+                </a:tc>
+                <a:tc>
+                  <a:txBody>
+                    <a:bodyPr/>
+                    <a:lstStyle/>
+                    <a:p>
+                      <a:pPr algn="ctr"/>
+                      <a:r>
+                        <a:rPr lang="en-US" dirty="0"/>
+                        <a:t>55.47</a:t>
+                      </a:r>
+                    </a:p>
+                  </a:txBody>
+                  <a:tcPr/>
+                </a:tc>
+                <a:extLst>
+                  <a:ext uri="{0D108BD9-81ED-4DB2-BD59-A6C34878D82A}">
+                    <a16:rowId xmlns:a16="http://schemas.microsoft.com/office/drawing/2014/main" val="3609673589"/>
+                  </a:ext>
+                </a:extLst>
+              </a:tr>
+              <a:tr h="370840">
+                <a:tc>
+                  <a:txBody>
+                    <a:bodyPr/>
+                    <a:lstStyle/>
+                    <a:p>
+                      <a:pPr algn="ctr"/>
+                      <a:r>
+                        <a:rPr lang="en-US" dirty="0"/>
+                        <a:t>5</a:t>
+                      </a:r>
+                    </a:p>
+                  </a:txBody>
+                  <a:tcPr/>
+                </a:tc>
+                <a:tc>
+                  <a:txBody>
+                    <a:bodyPr/>
+                    <a:lstStyle/>
+                    <a:p>
+                      <a:pPr algn="ctr"/>
+                      <a:r>
+                        <a:rPr lang="en-US" dirty="0"/>
+                        <a:t>0.002</a:t>
+                      </a:r>
+                    </a:p>
+                  </a:txBody>
+                  <a:tcPr/>
+                </a:tc>
+                <a:tc>
+                  <a:txBody>
+                    <a:bodyPr/>
+                    <a:lstStyle/>
+                    <a:p>
+                      <a:pPr algn="ctr"/>
+                      <a:r>
+                        <a:rPr lang="en-US" dirty="0"/>
+                        <a:t>31.67</a:t>
+                      </a:r>
+                    </a:p>
+                  </a:txBody>
+                  <a:tcPr/>
+                </a:tc>
+                <a:tc>
+                  <a:txBody>
+                    <a:bodyPr/>
+                    <a:lstStyle/>
+                    <a:p>
+                      <a:pPr algn="ctr"/>
+                      <a:r>
+                        <a:rPr lang="en-US" dirty="0"/>
+                        <a:t>17</a:t>
+                      </a:r>
+                    </a:p>
+                  </a:txBody>
+                  <a:tcPr/>
+                </a:tc>
+                <a:tc>
+                  <a:txBody>
+                    <a:bodyPr/>
+                    <a:lstStyle/>
+                    <a:p>
+                      <a:pPr algn="ctr"/>
+                      <a:r>
+                        <a:rPr lang="en-US" dirty="0"/>
+                        <a:t>0.019</a:t>
+                      </a:r>
+                    </a:p>
+                  </a:txBody>
+                  <a:tcPr/>
+                </a:tc>
+                <a:tc>
+                  <a:txBody>
+                    <a:bodyPr/>
+                    <a:lstStyle/>
+                    <a:p>
+                      <a:pPr algn="ctr"/>
+                      <a:r>
+                        <a:rPr lang="en-US" dirty="0"/>
+                        <a:t>65.68</a:t>
+                      </a:r>
+                    </a:p>
+                  </a:txBody>
+                  <a:tcPr/>
+                </a:tc>
+                <a:extLst>
+                  <a:ext uri="{0D108BD9-81ED-4DB2-BD59-A6C34878D82A}">
+                    <a16:rowId xmlns:a16="http://schemas.microsoft.com/office/drawing/2014/main" val="3695141167"/>
+                  </a:ext>
+                </a:extLst>
+              </a:tr>
+              <a:tr h="370840">
+                <a:tc>
+                  <a:txBody>
+                    <a:bodyPr/>
+                    <a:lstStyle/>
+                    <a:p>
+                      <a:pPr algn="ctr"/>
+                      <a:r>
+                        <a:rPr lang="en-US" dirty="0"/>
+                        <a:t>6</a:t>
+                      </a:r>
+                    </a:p>
+                  </a:txBody>
+                  <a:tcPr/>
+                </a:tc>
+                <a:tc>
+                  <a:txBody>
+                    <a:bodyPr/>
+                    <a:lstStyle/>
+                    <a:p>
+                      <a:pPr algn="ctr"/>
+                      <a:r>
+                        <a:rPr lang="en-US" dirty="0"/>
+                        <a:t>0.002</a:t>
+                      </a:r>
+                    </a:p>
+                  </a:txBody>
+                  <a:tcPr/>
+                </a:tc>
+                <a:tc>
+                  <a:txBody>
+                    <a:bodyPr/>
+                    <a:lstStyle/>
+                    <a:p>
+                      <a:pPr algn="ctr"/>
+                      <a:r>
+                        <a:rPr lang="en-US" dirty="0"/>
+                        <a:t>35.15</a:t>
+                      </a:r>
+                    </a:p>
+                  </a:txBody>
+                  <a:tcPr/>
+                </a:tc>
+                <a:tc>
+                  <a:txBody>
+                    <a:bodyPr/>
+                    <a:lstStyle/>
+                    <a:p>
+                      <a:pPr algn="ctr"/>
+                      <a:r>
+                        <a:rPr lang="en-US" dirty="0"/>
+                        <a:t>18</a:t>
+                      </a:r>
+                    </a:p>
+                  </a:txBody>
+                  <a:tcPr/>
+                </a:tc>
+                <a:tc>
+                  <a:txBody>
+                    <a:bodyPr/>
+                    <a:lstStyle/>
+                    <a:p>
+                      <a:pPr algn="ctr"/>
+                      <a:r>
+                        <a:rPr lang="en-US" dirty="0"/>
+                        <a:t>0.020</a:t>
+                      </a:r>
+                    </a:p>
+                  </a:txBody>
+                  <a:tcPr/>
+                </a:tc>
+                <a:tc>
+                  <a:txBody>
+                    <a:bodyPr/>
+                    <a:lstStyle/>
+                    <a:p>
+                      <a:pPr algn="ctr"/>
+                      <a:r>
+                        <a:rPr lang="en-US" dirty="0"/>
+                        <a:t>65.99</a:t>
+                      </a:r>
+                    </a:p>
+                  </a:txBody>
+                  <a:tcPr/>
+                </a:tc>
+                <a:extLst>
+                  <a:ext uri="{0D108BD9-81ED-4DB2-BD59-A6C34878D82A}">
+                    <a16:rowId xmlns:a16="http://schemas.microsoft.com/office/drawing/2014/main" val="3953743527"/>
+                  </a:ext>
+                </a:extLst>
+              </a:tr>
+              <a:tr h="370840">
+                <a:tc>
+                  <a:txBody>
+                    <a:bodyPr/>
+                    <a:lstStyle/>
+                    <a:p>
+                      <a:pPr algn="ctr"/>
+                      <a:r>
+                        <a:rPr lang="en-US" dirty="0"/>
+                        <a:t>7</a:t>
+                      </a:r>
+                    </a:p>
+                  </a:txBody>
+                  <a:tcPr/>
+                </a:tc>
+                <a:tc>
+                  <a:txBody>
+                    <a:bodyPr/>
+                    <a:lstStyle/>
+                    <a:p>
+                      <a:pPr algn="ctr"/>
+                      <a:r>
+                        <a:rPr lang="en-US" dirty="0"/>
+                        <a:t>0.004</a:t>
+                      </a:r>
+                    </a:p>
+                  </a:txBody>
+                  <a:tcPr/>
+                </a:tc>
+                <a:tc>
+                  <a:txBody>
+                    <a:bodyPr/>
+                    <a:lstStyle/>
+                    <a:p>
+                      <a:pPr algn="ctr"/>
+                      <a:r>
+                        <a:rPr lang="en-US" dirty="0"/>
+                        <a:t>36.53</a:t>
+                      </a:r>
+                    </a:p>
+                  </a:txBody>
+                  <a:tcPr/>
+                </a:tc>
+                <a:tc>
+                  <a:txBody>
+                    <a:bodyPr/>
+                    <a:lstStyle/>
+                    <a:p>
+                      <a:pPr algn="ctr"/>
+                      <a:r>
+                        <a:rPr lang="en-US" dirty="0"/>
+                        <a:t>19</a:t>
+                      </a:r>
+                    </a:p>
+                  </a:txBody>
+                  <a:tcPr/>
+                </a:tc>
+                <a:tc>
+                  <a:txBody>
+                    <a:bodyPr/>
+                    <a:lstStyle/>
+                    <a:p>
+                      <a:pPr algn="ctr"/>
+                      <a:r>
+                        <a:rPr lang="en-US" dirty="0"/>
+                        <a:t>0.021</a:t>
+                      </a:r>
+                    </a:p>
+                  </a:txBody>
+                  <a:tcPr/>
+                </a:tc>
+                <a:tc>
+                  <a:txBody>
+                    <a:bodyPr/>
+                    <a:lstStyle/>
+                    <a:p>
+                      <a:pPr algn="ctr"/>
+                      <a:r>
+                        <a:rPr lang="en-US" dirty="0"/>
+                        <a:t>66.00</a:t>
+                      </a:r>
+                    </a:p>
+                  </a:txBody>
+                  <a:tcPr/>
+                </a:tc>
+                <a:extLst>
+                  <a:ext uri="{0D108BD9-81ED-4DB2-BD59-A6C34878D82A}">
+                    <a16:rowId xmlns:a16="http://schemas.microsoft.com/office/drawing/2014/main" val="603067212"/>
+                  </a:ext>
+                </a:extLst>
+              </a:tr>
+              <a:tr h="370840">
+                <a:tc>
+                  <a:txBody>
+                    <a:bodyPr/>
+                    <a:lstStyle/>
+                    <a:p>
+                      <a:pPr algn="ctr"/>
+                      <a:r>
+                        <a:rPr lang="en-US" dirty="0"/>
+                        <a:t>8</a:t>
+                      </a:r>
+                    </a:p>
+                  </a:txBody>
+                  <a:tcPr/>
+                </a:tc>
+                <a:tc>
+                  <a:txBody>
+                    <a:bodyPr/>
+                    <a:lstStyle/>
+                    <a:p>
+                      <a:pPr algn="ctr"/>
+                      <a:r>
+                        <a:rPr lang="en-US" dirty="0"/>
+                        <a:t>0.006</a:t>
+                      </a:r>
+                    </a:p>
+                  </a:txBody>
+                  <a:tcPr/>
+                </a:tc>
+                <a:tc>
+                  <a:txBody>
+                    <a:bodyPr/>
+                    <a:lstStyle/>
+                    <a:p>
+                      <a:pPr algn="ctr"/>
+                      <a:r>
+                        <a:rPr lang="en-US" dirty="0"/>
+                        <a:t>37.03</a:t>
+                      </a:r>
+                    </a:p>
+                  </a:txBody>
+                  <a:tcPr/>
+                </a:tc>
+                <a:tc>
+                  <a:txBody>
+                    <a:bodyPr/>
+                    <a:lstStyle/>
+                    <a:p>
+                      <a:pPr algn="ctr"/>
+                      <a:r>
+                        <a:rPr lang="en-US" dirty="0"/>
+                        <a:t>20</a:t>
+                      </a:r>
+                    </a:p>
+                  </a:txBody>
+                  <a:tcPr/>
+                </a:tc>
+                <a:tc>
+                  <a:txBody>
+                    <a:bodyPr/>
+                    <a:lstStyle/>
+                    <a:p>
+                      <a:pPr algn="ctr"/>
+                      <a:r>
+                        <a:rPr lang="en-US" dirty="0"/>
+                        <a:t>0.022</a:t>
+                      </a:r>
+                    </a:p>
+                  </a:txBody>
+                  <a:tcPr/>
+                </a:tc>
+                <a:tc>
+                  <a:txBody>
+                    <a:bodyPr/>
+                    <a:lstStyle/>
+                    <a:p>
+                      <a:pPr algn="ctr"/>
+                      <a:r>
+                        <a:rPr lang="en-US" dirty="0"/>
+                        <a:t>66.40</a:t>
+                      </a:r>
+                    </a:p>
+                  </a:txBody>
+                  <a:tcPr/>
+                </a:tc>
+                <a:extLst>
+                  <a:ext uri="{0D108BD9-81ED-4DB2-BD59-A6C34878D82A}">
+                    <a16:rowId xmlns:a16="http://schemas.microsoft.com/office/drawing/2014/main" val="1583750956"/>
+                  </a:ext>
+                </a:extLst>
+              </a:tr>
+              <a:tr h="370840">
+                <a:tc>
+                  <a:txBody>
+                    <a:bodyPr/>
+                    <a:lstStyle/>
+                    <a:p>
+                      <a:pPr algn="ctr"/>
+                      <a:r>
+                        <a:rPr lang="en-US" dirty="0"/>
+                        <a:t>9</a:t>
+                      </a:r>
+                    </a:p>
+                  </a:txBody>
+                  <a:tcPr/>
+                </a:tc>
+                <a:tc>
+                  <a:txBody>
+                    <a:bodyPr/>
+                    <a:lstStyle/>
+                    <a:p>
+                      <a:pPr algn="ctr"/>
+                      <a:r>
+                        <a:rPr lang="en-US" dirty="0"/>
+                        <a:t>0.009</a:t>
+                      </a:r>
+                    </a:p>
+                  </a:txBody>
+                  <a:tcPr/>
+                </a:tc>
+                <a:tc>
+                  <a:txBody>
+                    <a:bodyPr/>
+                    <a:lstStyle/>
+                    <a:p>
+                      <a:pPr algn="ctr"/>
+                      <a:r>
+                        <a:rPr lang="en-US" dirty="0"/>
+                        <a:t>42.22</a:t>
+                      </a:r>
+                    </a:p>
+                  </a:txBody>
+                  <a:tcPr/>
+                </a:tc>
+                <a:tc>
+                  <a:txBody>
+                    <a:bodyPr/>
+                    <a:lstStyle/>
+                    <a:p>
+                      <a:pPr algn="ctr"/>
+                      <a:r>
+                        <a:rPr lang="en-US" dirty="0"/>
+                        <a:t>21</a:t>
+                      </a:r>
+                    </a:p>
+                  </a:txBody>
+                  <a:tcPr/>
+                </a:tc>
+                <a:tc>
+                  <a:txBody>
+                    <a:bodyPr/>
+                    <a:lstStyle/>
+                    <a:p>
+                      <a:pPr algn="ctr"/>
+                      <a:r>
+                        <a:rPr lang="en-US" dirty="0"/>
+                        <a:t>0.024</a:t>
+                      </a:r>
+                    </a:p>
+                  </a:txBody>
+                  <a:tcPr/>
+                </a:tc>
+                <a:tc>
+                  <a:txBody>
+                    <a:bodyPr/>
+                    <a:lstStyle/>
+                    <a:p>
+                      <a:pPr algn="ctr"/>
+                      <a:r>
+                        <a:rPr lang="en-US" dirty="0"/>
+                        <a:t>71.24</a:t>
+                      </a:r>
+                    </a:p>
+                  </a:txBody>
+                  <a:tcPr/>
+                </a:tc>
+                <a:extLst>
+                  <a:ext uri="{0D108BD9-81ED-4DB2-BD59-A6C34878D82A}">
+                    <a16:rowId xmlns:a16="http://schemas.microsoft.com/office/drawing/2014/main" val="234767695"/>
+                  </a:ext>
+                </a:extLst>
+              </a:tr>
+              <a:tr h="370840">
+                <a:tc>
+                  <a:txBody>
+                    <a:bodyPr/>
+                    <a:lstStyle/>
+                    <a:p>
+                      <a:pPr algn="ctr"/>
+                      <a:r>
+                        <a:rPr lang="en-US" dirty="0"/>
+                        <a:t>10</a:t>
+                      </a:r>
+                    </a:p>
+                  </a:txBody>
+                  <a:tcPr/>
+                </a:tc>
+                <a:tc>
+                  <a:txBody>
+                    <a:bodyPr/>
+                    <a:lstStyle/>
+                    <a:p>
+                      <a:pPr algn="ctr"/>
+                      <a:r>
+                        <a:rPr lang="en-US" dirty="0"/>
+                        <a:t>0.009</a:t>
+                      </a:r>
+                    </a:p>
+                  </a:txBody>
+                  <a:tcPr/>
+                </a:tc>
+                <a:tc>
+                  <a:txBody>
+                    <a:bodyPr/>
+                    <a:lstStyle/>
+                    <a:p>
+                      <a:pPr algn="ctr"/>
+                      <a:r>
+                        <a:rPr lang="en-US" dirty="0"/>
+                        <a:t>45.15</a:t>
+                      </a:r>
+                    </a:p>
+                  </a:txBody>
+                  <a:tcPr/>
+                </a:tc>
+                <a:tc>
+                  <a:txBody>
+                    <a:bodyPr/>
+                    <a:lstStyle/>
+                    <a:p>
+                      <a:pPr algn="ctr"/>
+                      <a:r>
+                        <a:rPr lang="en-US" dirty="0"/>
+                        <a:t>22</a:t>
+                      </a:r>
+                    </a:p>
+                  </a:txBody>
+                  <a:tcPr/>
+                </a:tc>
+                <a:tc>
+                  <a:txBody>
+                    <a:bodyPr/>
+                    <a:lstStyle/>
+                    <a:p>
+                      <a:pPr algn="ctr"/>
+                      <a:r>
+                        <a:rPr lang="en-US" dirty="0"/>
+                        <a:t>0.024</a:t>
+                      </a:r>
+                    </a:p>
+                  </a:txBody>
+                  <a:tcPr/>
+                </a:tc>
+                <a:tc>
+                  <a:txBody>
+                    <a:bodyPr/>
+                    <a:lstStyle/>
+                    <a:p>
+                      <a:pPr algn="ctr"/>
+                      <a:r>
+                        <a:rPr lang="en-US" dirty="0"/>
+                        <a:t>72.98</a:t>
+                      </a:r>
+                    </a:p>
+                  </a:txBody>
+                  <a:tcPr/>
+                </a:tc>
+                <a:extLst>
+                  <a:ext uri="{0D108BD9-81ED-4DB2-BD59-A6C34878D82A}">
+                    <a16:rowId xmlns:a16="http://schemas.microsoft.com/office/drawing/2014/main" val="3742627564"/>
+                  </a:ext>
+                </a:extLst>
+              </a:tr>
+              <a:tr h="370840">
+                <a:tc>
+                  <a:txBody>
+                    <a:bodyPr/>
+                    <a:lstStyle/>
+                    <a:p>
+                      <a:pPr algn="ctr"/>
+                      <a:r>
+                        <a:rPr lang="en-US" dirty="0"/>
+                        <a:t>11</a:t>
+                      </a:r>
+                    </a:p>
+                  </a:txBody>
+                  <a:tcPr/>
+                </a:tc>
+                <a:tc>
+                  <a:txBody>
+                    <a:bodyPr/>
+                    <a:lstStyle/>
+                    <a:p>
+                      <a:pPr algn="ctr"/>
+                      <a:r>
+                        <a:rPr lang="en-US" dirty="0"/>
+                        <a:t>0.01</a:t>
+                      </a:r>
+                    </a:p>
+                  </a:txBody>
+                  <a:tcPr/>
+                </a:tc>
+                <a:tc>
+                  <a:txBody>
+                    <a:bodyPr/>
+                    <a:lstStyle/>
+                    <a:p>
+                      <a:pPr algn="ctr"/>
+                      <a:r>
+                        <a:rPr lang="en-US" dirty="0"/>
+                        <a:t>42.73</a:t>
+                      </a:r>
+                    </a:p>
+                  </a:txBody>
+                  <a:tcPr/>
+                </a:tc>
+                <a:tc>
+                  <a:txBody>
+                    <a:bodyPr/>
+                    <a:lstStyle/>
+                    <a:p>
+                      <a:pPr algn="ctr"/>
+                      <a:r>
+                        <a:rPr lang="en-US" dirty="0"/>
+                        <a:t>23</a:t>
+                      </a:r>
+                    </a:p>
+                  </a:txBody>
+                  <a:tcPr/>
+                </a:tc>
+                <a:tc>
+                  <a:txBody>
+                    <a:bodyPr/>
+                    <a:lstStyle/>
+                    <a:p>
+                      <a:pPr algn="ctr"/>
+                      <a:r>
+                        <a:rPr lang="en-US" dirty="0"/>
+                        <a:t>0.029</a:t>
+                      </a:r>
+                    </a:p>
+                  </a:txBody>
+                  <a:tcPr/>
+                </a:tc>
+                <a:tc>
+                  <a:txBody>
+                    <a:bodyPr/>
+                    <a:lstStyle/>
+                    <a:p>
+                      <a:pPr algn="ctr"/>
+                      <a:r>
+                        <a:rPr lang="en-US" dirty="0"/>
+                        <a:t>73.82</a:t>
+                      </a:r>
+                    </a:p>
+                  </a:txBody>
+                  <a:tcPr/>
+                </a:tc>
+                <a:extLst>
+                  <a:ext uri="{0D108BD9-81ED-4DB2-BD59-A6C34878D82A}">
+                    <a16:rowId xmlns:a16="http://schemas.microsoft.com/office/drawing/2014/main" val="1851148357"/>
+                  </a:ext>
+                </a:extLst>
+              </a:tr>
+              <a:tr h="370840">
+                <a:tc>
+                  <a:txBody>
+                    <a:bodyPr/>
+                    <a:lstStyle/>
+                    <a:p>
+                      <a:pPr algn="ctr"/>
+                      <a:r>
+                        <a:rPr lang="en-US" dirty="0"/>
+                        <a:t>12</a:t>
+                      </a:r>
+                    </a:p>
+                  </a:txBody>
+                  <a:tcPr/>
+                </a:tc>
+                <a:tc>
+                  <a:txBody>
+                    <a:bodyPr/>
+                    <a:lstStyle/>
+                    <a:p>
+                      <a:pPr algn="ctr"/>
+                      <a:r>
+                        <a:rPr lang="en-US" dirty="0"/>
+                        <a:t>0.007</a:t>
+                      </a:r>
+                    </a:p>
+                  </a:txBody>
+                  <a:tcPr/>
+                </a:tc>
+                <a:tc>
+                  <a:txBody>
+                    <a:bodyPr/>
+                    <a:lstStyle/>
+                    <a:p>
+                      <a:pPr algn="ctr"/>
+                      <a:r>
+                        <a:rPr lang="en-US" dirty="0"/>
+                        <a:t>46.68</a:t>
+                      </a:r>
+                    </a:p>
+                  </a:txBody>
+                  <a:tcPr/>
+                </a:tc>
+                <a:tc>
+                  <a:txBody>
+                    <a:bodyPr/>
+                    <a:lstStyle/>
+                    <a:p>
+                      <a:pPr algn="ctr"/>
+                      <a:r>
+                        <a:rPr lang="en-US" dirty="0"/>
+                        <a:t>24</a:t>
+                      </a:r>
+                    </a:p>
+                  </a:txBody>
+                  <a:tcPr/>
+                </a:tc>
+                <a:tc>
+                  <a:txBody>
+                    <a:bodyPr/>
+                    <a:lstStyle/>
+                    <a:p>
+                      <a:pPr algn="ctr"/>
+                      <a:r>
+                        <a:rPr lang="en-US" dirty="0"/>
+                        <a:t>0.027</a:t>
+                      </a:r>
+                    </a:p>
+                  </a:txBody>
+                  <a:tcPr/>
+                </a:tc>
+                <a:tc>
+                  <a:txBody>
+                    <a:bodyPr/>
+                    <a:lstStyle/>
+                    <a:p>
+                      <a:pPr algn="ctr"/>
+                      <a:r>
+                        <a:rPr lang="en-US" dirty="0"/>
+                        <a:t>72.95</a:t>
+                      </a:r>
+                    </a:p>
+                  </a:txBody>
+                  <a:tcPr/>
+                </a:tc>
+                <a:extLst>
+                  <a:ext uri="{0D108BD9-81ED-4DB2-BD59-A6C34878D82A}">
+                    <a16:rowId xmlns:a16="http://schemas.microsoft.com/office/drawing/2014/main" val="2178244416"/>
+                  </a:ext>
+                </a:extLst>
+              </a:tr>
+              <a:tr h="370840">
+                <a:tc>
+                  <a:txBody>
+                    <a:bodyPr/>
+                    <a:lstStyle/>
+                    <a:p>
+                      <a:pPr algn="ctr"/>
+                      <a:r>
+                        <a:rPr lang="en-US" dirty="0"/>
+                        <a:t>13</a:t>
+                      </a:r>
+                    </a:p>
+                  </a:txBody>
+                  <a:tcPr/>
+                </a:tc>
+                <a:tc>
+                  <a:txBody>
+                    <a:bodyPr/>
+                    <a:lstStyle/>
+                    <a:p>
+                      <a:pPr algn="ctr"/>
+                      <a:r>
+                        <a:rPr lang="en-US" dirty="0"/>
+                        <a:t>0.016</a:t>
+                      </a:r>
+                    </a:p>
+                  </a:txBody>
+                  <a:tcPr/>
+                </a:tc>
+                <a:tc>
+                  <a:txBody>
+                    <a:bodyPr/>
+                    <a:lstStyle/>
+                    <a:p>
+                      <a:pPr algn="ctr"/>
+                      <a:r>
+                        <a:rPr lang="en-US" dirty="0"/>
+                        <a:t>50.25</a:t>
+                      </a:r>
+                    </a:p>
+                  </a:txBody>
+                  <a:tcPr/>
+                </a:tc>
+                <a:tc>
+                  <a:txBody>
+                    <a:bodyPr/>
+                    <a:lstStyle/>
+                    <a:p>
+                      <a:pPr algn="ctr"/>
+                      <a:r>
+                        <a:rPr lang="en-US" dirty="0"/>
+                        <a:t>25</a:t>
+                      </a:r>
+                    </a:p>
+                  </a:txBody>
+                  <a:tcPr/>
+                </a:tc>
+                <a:tc>
+                  <a:txBody>
+                    <a:bodyPr/>
+                    <a:lstStyle/>
+                    <a:p>
+                      <a:pPr algn="ctr"/>
+                      <a:r>
+                        <a:rPr lang="en-US" dirty="0"/>
+                        <a:t>0.031</a:t>
+                      </a:r>
+                    </a:p>
+                  </a:txBody>
+                  <a:tcPr/>
+                </a:tc>
+                <a:tc>
+                  <a:txBody>
+                    <a:bodyPr/>
+                    <a:lstStyle/>
+                    <a:p>
+                      <a:pPr algn="ctr"/>
+                      <a:r>
+                        <a:rPr lang="en-US" dirty="0"/>
+                        <a:t>74.10</a:t>
+                      </a:r>
+                    </a:p>
+                  </a:txBody>
+                  <a:tcPr/>
+                </a:tc>
+                <a:extLst>
+                  <a:ext uri="{0D108BD9-81ED-4DB2-BD59-A6C34878D82A}">
+                    <a16:rowId xmlns:a16="http://schemas.microsoft.com/office/drawing/2014/main" val="1913682942"/>
+                  </a:ext>
+                </a:extLst>
+              </a:tr>
+            </a:tbl>
+          </a:graphicData>
+        </a:graphic>
+      </p:graphicFrame>
     </p:spTree>
     <p:extLst>
       <p:ext uri="{BB962C8B-B14F-4D97-AF65-F5344CB8AC3E}">
-        <p14:creationId xmlns:p14="http://schemas.microsoft.com/office/powerpoint/2010/main" val="3755679565"/>
+        <p14:creationId xmlns:p14="http://schemas.microsoft.com/office/powerpoint/2010/main" val="266916297"/>
       </p:ext>
     </p:extLst>
   </p:cSld>
@@ -7727,7 +8684,7 @@
           <p:cNvPr id="2" name="Title 1">
             <a:extLst>
               <a:ext uri="{FF2B5EF4-FFF2-40B4-BE49-F238E27FC236}">
-                <a16:creationId xmlns:a16="http://schemas.microsoft.com/office/drawing/2014/main" xmlns="" id="{60B89E68-CDB7-4337-90F0-AC28E247D32A}"/>
+                <a16:creationId xmlns:a16="http://schemas.microsoft.com/office/drawing/2014/main" id="{ABCA0AA6-D6E5-4478-AD79-0718AD5AE0B5}"/>
               </a:ext>
             </a:extLst>
           </p:cNvPr>
@@ -7745,7 +8702,7 @@
           <a:p>
             <a:r>
               <a:rPr lang="en-US" dirty="0"/>
-              <a:t>Performance Measure</a:t>
+              <a:t>Agglomerative Hierarchical Clustering (AHC)</a:t>
             </a:r>
           </a:p>
         </p:txBody>
@@ -7755,7 +8712,7 @@
           <p:cNvPr id="3" name="Content Placeholder 2">
             <a:extLst>
               <a:ext uri="{FF2B5EF4-FFF2-40B4-BE49-F238E27FC236}">
-                <a16:creationId xmlns:a16="http://schemas.microsoft.com/office/drawing/2014/main" xmlns="" id="{B152A32C-A7A6-4DA0-84CB-82A17373CC7A}"/>
+                <a16:creationId xmlns:a16="http://schemas.microsoft.com/office/drawing/2014/main" id="{EFFFB179-98C2-4A14-B8D8-60BBCFA856E8}"/>
               </a:ext>
             </a:extLst>
           </p:cNvPr>
@@ -7766,15 +8723,86 @@
             <p:ph sz="quarter" idx="13"/>
           </p:nvPr>
         </p:nvSpPr>
-        <p:spPr/>
-        <p:txBody>
-          <a:bodyPr/>
+        <p:spPr>
+          <a:xfrm>
+            <a:off x="913774" y="2127380"/>
+            <a:ext cx="10363826" cy="4254759"/>
+          </a:xfrm>
+        </p:spPr>
+        <p:txBody>
+          <a:bodyPr>
+            <a:noAutofit/>
+          </a:bodyPr>
           <a:lstStyle/>
           <a:p>
             <a:r>
+              <a:rPr lang="en-US" sz="1800" dirty="0"/>
+              <a:t>WHY Hierarchical Clustering</a:t>
+            </a:r>
+          </a:p>
+          <a:p>
+            <a:pPr lvl="1"/>
+            <a:r>
               <a:rPr lang="en-US" dirty="0"/>
-              <a:t>Silhouette Coefficient</a:t>
-            </a:r>
+              <a:t>NUMBER OF CLUSTERS NOT KNOWN BEFOREHAND IN SEVERAL DATA ANALYSIS PROBLEM</a:t>
+            </a:r>
+          </a:p>
+          <a:p>
+            <a:r>
+              <a:rPr lang="en-US" sz="1800" dirty="0"/>
+              <a:t>TWO TYPES</a:t>
+            </a:r>
+          </a:p>
+          <a:p>
+            <a:pPr lvl="1"/>
+            <a:r>
+              <a:rPr lang="en-US" dirty="0"/>
+              <a:t>TOP DOWN : START WITH A ONE LARGE CLUSTER</a:t>
+            </a:r>
+          </a:p>
+          <a:p>
+            <a:pPr lvl="1"/>
+            <a:r>
+              <a:rPr lang="en-US" dirty="0"/>
+              <a:t>BOTTOM UP : INITALIZE EACH DATA POINTS AS ITS OWN CLUSTER AND RECURSIVELY MERGE THE CLUSTERS</a:t>
+            </a:r>
+          </a:p>
+          <a:p>
+            <a:r>
+              <a:rPr lang="en-US" sz="1800" dirty="0"/>
+              <a:t>CLUSTER DISTANCE</a:t>
+            </a:r>
+          </a:p>
+          <a:p>
+            <a:pPr lvl="1"/>
+            <a:r>
+              <a:rPr lang="en-US" dirty="0"/>
+              <a:t>SINGLE LINKAGE</a:t>
+            </a:r>
+          </a:p>
+          <a:p>
+            <a:pPr lvl="1"/>
+            <a:r>
+              <a:rPr lang="en-US" dirty="0"/>
+              <a:t>COMPLETE LINKAGE</a:t>
+            </a:r>
+          </a:p>
+          <a:p>
+            <a:pPr lvl="1"/>
+            <a:r>
+              <a:rPr lang="en-US" dirty="0"/>
+              <a:t>AVERAGE LINKAGE</a:t>
+            </a:r>
+          </a:p>
+          <a:p>
+            <a:pPr lvl="1"/>
+            <a:r>
+              <a:rPr lang="en-US" dirty="0"/>
+              <a:t>WARD LINKAGE : minimizes the total within-cluster variance</a:t>
+            </a:r>
+          </a:p>
+          <a:p>
+            <a:pPr lvl="1"/>
             <a:endParaRPr lang="en-US" dirty="0"/>
           </a:p>
         </p:txBody>
@@ -7782,7 +8810,7 @@
     </p:spTree>
     <p:extLst>
       <p:ext uri="{BB962C8B-B14F-4D97-AF65-F5344CB8AC3E}">
-        <p14:creationId xmlns:p14="http://schemas.microsoft.com/office/powerpoint/2010/main" val="266916297"/>
+        <p14:creationId xmlns:p14="http://schemas.microsoft.com/office/powerpoint/2010/main" val="2558133082"/>
       </p:ext>
     </p:extLst>
   </p:cSld>
@@ -7814,7 +8842,7 @@
           <p:cNvPr id="2" name="Title 1">
             <a:extLst>
               <a:ext uri="{FF2B5EF4-FFF2-40B4-BE49-F238E27FC236}">
-                <a16:creationId xmlns:a16="http://schemas.microsoft.com/office/drawing/2014/main" xmlns="" id="{ABCA0AA6-D6E5-4478-AD79-0718AD5AE0B5}"/>
+                <a16:creationId xmlns:a16="http://schemas.microsoft.com/office/drawing/2014/main" id="{2C4462EA-787F-402E-80AC-A3061CC0B576}"/>
               </a:ext>
             </a:extLst>
           </p:cNvPr>
@@ -7832,13 +8860,8 @@
           <a:p>
             <a:r>
               <a:rPr lang="en-US" dirty="0"/>
-              <a:t>Agglomerative Hierarchical </a:t>
-            </a:r>
-            <a:r>
-              <a:rPr lang="en-US" dirty="0" smtClean="0"/>
-              <a:t>Clustering (AHC)</a:t>
-            </a:r>
-            <a:endParaRPr lang="en-US" dirty="0"/>
+              <a:t>RESULTS</a:t>
+            </a:r>
           </a:p>
         </p:txBody>
       </p:sp>
@@ -7847,7 +8870,7 @@
           <p:cNvPr id="3" name="Content Placeholder 2">
             <a:extLst>
               <a:ext uri="{FF2B5EF4-FFF2-40B4-BE49-F238E27FC236}">
-                <a16:creationId xmlns:a16="http://schemas.microsoft.com/office/drawing/2014/main" xmlns="" id="{EFFFB179-98C2-4A14-B8D8-60BBCFA856E8}"/>
+                <a16:creationId xmlns:a16="http://schemas.microsoft.com/office/drawing/2014/main" id="{B50468E1-FFE7-42FD-8CB7-9803FF0C88F0}"/>
               </a:ext>
             </a:extLst>
           </p:cNvPr>
@@ -7858,100 +8881,57 @@
             <p:ph sz="quarter" idx="13"/>
           </p:nvPr>
         </p:nvSpPr>
-        <p:spPr/>
-        <p:txBody>
-          <a:bodyPr>
-            <a:normAutofit fontScale="85000" lnSpcReduction="10000"/>
-          </a:bodyPr>
+        <p:spPr>
+          <a:xfrm>
+            <a:off x="913774" y="1965876"/>
+            <a:ext cx="10363826" cy="3424107"/>
+          </a:xfrm>
+        </p:spPr>
+        <p:txBody>
+          <a:bodyPr/>
           <a:lstStyle/>
           <a:p>
             <a:r>
               <a:rPr lang="en-US" dirty="0"/>
-              <a:t>WHY Hierarchical Clustering</a:t>
-            </a:r>
-            <a:endParaRPr lang="en-US" dirty="0" smtClean="0"/>
-          </a:p>
-          <a:p>
-            <a:pPr lvl="1"/>
-            <a:r>
-              <a:rPr lang="en-US" dirty="0" smtClean="0"/>
-              <a:t>NUMBER OF CLUSTERS NOT KNOWN BEFOREHAND IN SEVERAL DATA ANALYSIS PROBLEM</a:t>
-            </a:r>
-            <a:endParaRPr lang="en-US" dirty="0"/>
-          </a:p>
-          <a:p>
-            <a:r>
-              <a:rPr lang="en-US" dirty="0" smtClean="0"/>
-              <a:t>TWO TYPES</a:t>
-            </a:r>
-          </a:p>
-          <a:p>
-            <a:pPr lvl="1"/>
-            <a:r>
-              <a:rPr lang="en-US" dirty="0" smtClean="0"/>
-              <a:t>TOP DOWN : START WITH A ONE LARGE CLUSTER</a:t>
-            </a:r>
-          </a:p>
-          <a:p>
-            <a:pPr lvl="1"/>
-            <a:r>
-              <a:rPr lang="en-US" dirty="0" smtClean="0"/>
-              <a:t>BOTTOM UP : INITALIZE EACH DATA POINTS AS ITS OWN CLUSTER AND RECURSIVELY MERGE THE CLUSTERS</a:t>
-            </a:r>
-          </a:p>
-          <a:p>
-            <a:r>
-              <a:rPr lang="en-US" dirty="0"/>
-              <a:t>CLUSTER DISTANCE</a:t>
-            </a:r>
-          </a:p>
-          <a:p>
-            <a:pPr lvl="1"/>
-            <a:r>
-              <a:rPr lang="en-US" dirty="0"/>
-              <a:t>SINGLE LINKAGE</a:t>
-            </a:r>
-          </a:p>
-          <a:p>
-            <a:pPr lvl="1"/>
-            <a:r>
-              <a:rPr lang="en-US" dirty="0"/>
-              <a:t>COMPLETE LINKAGE</a:t>
-            </a:r>
-          </a:p>
-          <a:p>
-            <a:pPr lvl="1"/>
-            <a:r>
-              <a:rPr lang="en-US" dirty="0"/>
-              <a:t>AVERAGE LINKAGE</a:t>
-            </a:r>
-          </a:p>
-          <a:p>
-            <a:pPr lvl="1"/>
-            <a:r>
-              <a:rPr lang="en-US" dirty="0"/>
-              <a:t>WARD </a:t>
-            </a:r>
-            <a:r>
-              <a:rPr lang="en-US" dirty="0" smtClean="0"/>
-              <a:t>LINKAGE : </a:t>
-            </a:r>
-            <a:r>
-              <a:rPr lang="en-US" dirty="0"/>
-              <a:t>minimizes the total within-cluster variance</a:t>
-            </a:r>
-            <a:endParaRPr lang="en-US" dirty="0" smtClean="0"/>
-          </a:p>
-          <a:p>
-            <a:pPr lvl="1"/>
-            <a:endParaRPr lang="en-US" dirty="0" smtClean="0"/>
-          </a:p>
-        </p:txBody>
-      </p:sp>
+              <a:t>AHC</a:t>
+            </a:r>
+          </a:p>
+        </p:txBody>
+      </p:sp>
+      <p:pic>
+        <p:nvPicPr>
+          <p:cNvPr id="5" name="Picture 4"/>
+          <p:cNvPicPr>
+            <a:picLocks noChangeAspect="1"/>
+          </p:cNvPicPr>
+          <p:nvPr/>
+        </p:nvPicPr>
+        <p:blipFill>
+          <a:blip r:embed="rId2">
+            <a:extLst>
+              <a:ext uri="{28A0092B-C50C-407E-A947-70E740481C1C}">
+                <a14:useLocalDpi xmlns:a14="http://schemas.microsoft.com/office/drawing/2010/main" val="0"/>
+              </a:ext>
+            </a:extLst>
+          </a:blip>
+          <a:stretch>
+            <a:fillRect/>
+          </a:stretch>
+        </p:blipFill>
+        <p:spPr>
+          <a:xfrm>
+            <a:off x="1292039" y="2530669"/>
+            <a:ext cx="9607296" cy="3979164"/>
+          </a:xfrm>
+          <a:prstGeom prst="rect">
+            <a:avLst/>
+          </a:prstGeom>
+        </p:spPr>
+      </p:pic>
     </p:spTree>
     <p:extLst>
       <p:ext uri="{BB962C8B-B14F-4D97-AF65-F5344CB8AC3E}">
-        <p14:creationId xmlns:p14="http://schemas.microsoft.com/office/powerpoint/2010/main" val="2558133082"/>
+        <p14:creationId xmlns:p14="http://schemas.microsoft.com/office/powerpoint/2010/main" val="3897255410"/>
       </p:ext>
     </p:extLst>
   </p:cSld>
@@ -7980,96 +8960,411 @@
       </p:grpSpPr>
       <p:sp>
         <p:nvSpPr>
-          <p:cNvPr id="2" name="Title 1">
+          <p:cNvPr id="2" name="Title 1"/>
+          <p:cNvSpPr>
+            <a:spLocks noGrp="1"/>
+          </p:cNvSpPr>
+          <p:nvPr>
+            <p:ph type="title"/>
+          </p:nvPr>
+        </p:nvSpPr>
+        <p:spPr>
+          <a:xfrm>
+            <a:off x="997125" y="3604939"/>
+            <a:ext cx="10364451" cy="647651"/>
+          </a:xfrm>
+        </p:spPr>
+        <p:txBody>
+          <a:bodyPr/>
+          <a:lstStyle/>
+          <a:p>
+            <a:r>
+              <a:rPr lang="en-US" dirty="0"/>
+              <a:t>REFERENCES</a:t>
+            </a:r>
+          </a:p>
+        </p:txBody>
+      </p:sp>
+      <p:sp>
+        <p:nvSpPr>
+          <p:cNvPr id="3" name="Content Placeholder 2"/>
+          <p:cNvSpPr>
+            <a:spLocks noGrp="1"/>
+          </p:cNvSpPr>
+          <p:nvPr>
+            <p:ph sz="quarter" idx="13"/>
+          </p:nvPr>
+        </p:nvSpPr>
+        <p:spPr>
+          <a:xfrm>
+            <a:off x="912525" y="4373173"/>
+            <a:ext cx="10363826" cy="2209025"/>
+          </a:xfrm>
+        </p:spPr>
+        <p:txBody>
+          <a:bodyPr>
+            <a:normAutofit/>
+          </a:bodyPr>
+          <a:lstStyle/>
+          <a:p>
+            <a:r>
+              <a:rPr lang="en-US" sz="1800" dirty="0"/>
+              <a:t>LECTURES SLIDES BY DR. CHINMAY HEGDE FOR EE 525X SPRING 2018, ISU</a:t>
+            </a:r>
+          </a:p>
+          <a:p>
+            <a:r>
+              <a:rPr lang="en-US" sz="1800" dirty="0"/>
+              <a:t>https://en.wikipedia.org/wiki/Isomap</a:t>
+            </a:r>
+          </a:p>
+          <a:p>
+            <a:pPr marL="228600" lvl="1">
+              <a:spcBef>
+                <a:spcPts val="1000"/>
+              </a:spcBef>
+            </a:pPr>
+            <a:r>
+              <a:rPr lang="en-US" sz="1600" dirty="0"/>
+              <a:t>https://stats.stackexchange.com/questions/124534/how-to-understand-nonlinear-as-in-nonlinear-dimensionality-reduction</a:t>
+            </a:r>
+          </a:p>
+          <a:p>
+            <a:pPr marL="228600" lvl="1">
+              <a:spcBef>
+                <a:spcPts val="1000"/>
+              </a:spcBef>
+            </a:pPr>
+            <a:r>
+              <a:rPr lang="en-US" sz="1600" dirty="0"/>
+              <a:t>https://en.wikipedia.org/wiki/Hierarchical_clustering</a:t>
+            </a:r>
+          </a:p>
+          <a:p>
+            <a:endParaRPr lang="en-US" sz="1800" dirty="0"/>
+          </a:p>
+        </p:txBody>
+      </p:sp>
+      <p:sp>
+        <p:nvSpPr>
+          <p:cNvPr id="4" name="Title 1">
             <a:extLst>
               <a:ext uri="{FF2B5EF4-FFF2-40B4-BE49-F238E27FC236}">
-                <a16:creationId xmlns:a16="http://schemas.microsoft.com/office/drawing/2014/main" xmlns="" id="{2C4462EA-787F-402E-80AC-A3061CC0B576}"/>
+                <a16:creationId xmlns:a16="http://schemas.microsoft.com/office/drawing/2014/main" id="{596B46F0-0445-4416-8890-1C82388EF8EF}"/>
               </a:ext>
             </a:extLst>
           </p:cNvPr>
-          <p:cNvSpPr>
-            <a:spLocks noGrp="1"/>
-          </p:cNvSpPr>
-          <p:nvPr>
-            <p:ph type="title"/>
-          </p:nvPr>
-        </p:nvSpPr>
-        <p:spPr/>
-        <p:txBody>
-          <a:bodyPr/>
-          <a:lstStyle/>
-          <a:p>
-            <a:r>
-              <a:rPr lang="en-US" dirty="0" smtClean="0"/>
-              <a:t>RESULTS</a:t>
-            </a:r>
-            <a:endParaRPr lang="en-US" dirty="0"/>
-          </a:p>
-        </p:txBody>
-      </p:sp>
-      <p:sp>
-        <p:nvSpPr>
-          <p:cNvPr id="3" name="Content Placeholder 2">
-            <a:extLst>
-              <a:ext uri="{FF2B5EF4-FFF2-40B4-BE49-F238E27FC236}">
-                <a16:creationId xmlns:a16="http://schemas.microsoft.com/office/drawing/2014/main" xmlns="" id="{B50468E1-FFE7-42FD-8CB7-9803FF0C88F0}"/>
-              </a:ext>
-            </a:extLst>
-          </p:cNvPr>
-          <p:cNvSpPr>
-            <a:spLocks noGrp="1"/>
-          </p:cNvSpPr>
-          <p:nvPr>
-            <p:ph sz="quarter" idx="13"/>
-          </p:nvPr>
-        </p:nvSpPr>
-        <p:spPr/>
-        <p:txBody>
-          <a:bodyPr/>
-          <a:lstStyle/>
-          <a:p>
-            <a:r>
-              <a:rPr lang="en-US" dirty="0" smtClean="0"/>
-              <a:t>AHC</a:t>
-            </a:r>
-            <a:endParaRPr lang="en-US" dirty="0"/>
-          </a:p>
-        </p:txBody>
-      </p:sp>
-      <p:pic>
-        <p:nvPicPr>
-          <p:cNvPr id="4" name="Picture 3"/>
-          <p:cNvPicPr>
-            <a:picLocks noChangeAspect="1"/>
-          </p:cNvPicPr>
+          <p:cNvSpPr txBox="1">
+            <a:spLocks/>
+          </p:cNvSpPr>
           <p:nvPr/>
-        </p:nvPicPr>
-        <p:blipFill>
-          <a:blip r:embed="rId2">
-            <a:extLst>
-              <a:ext uri="{28A0092B-C50C-407E-A947-70E740481C1C}">
-                <a14:useLocalDpi xmlns:a14="http://schemas.microsoft.com/office/drawing/2010/main" val="0"/>
-              </a:ext>
-            </a:extLst>
-          </a:blip>
-          <a:stretch>
-            <a:fillRect/>
-          </a:stretch>
-        </p:blipFill>
+        </p:nvSpPr>
         <p:spPr>
           <a:xfrm>
-            <a:off x="753310" y="2878836"/>
-            <a:ext cx="9607296" cy="3979164"/>
+            <a:off x="911900" y="828843"/>
+            <a:ext cx="10364451" cy="557140"/>
           </a:xfrm>
           <a:prstGeom prst="rect">
             <a:avLst/>
           </a:prstGeom>
         </p:spPr>
-      </p:pic>
+        <p:txBody>
+          <a:bodyPr vert="horz" lIns="91440" tIns="45720" rIns="91440" bIns="45720" rtlCol="0" anchor="ctr">
+            <a:normAutofit fontScale="97500" lnSpcReduction="10000"/>
+          </a:bodyPr>
+          <a:lstStyle>
+            <a:lvl1pPr algn="ctr" defTabSz="914400" rtl="0" eaLnBrk="1" latinLnBrk="0" hangingPunct="1">
+              <a:lnSpc>
+                <a:spcPct val="90000"/>
+              </a:lnSpc>
+              <a:spcBef>
+                <a:spcPct val="0"/>
+              </a:spcBef>
+              <a:buNone/>
+              <a:defRPr sz="3600" kern="1200" cap="all" baseline="0">
+                <a:solidFill>
+                  <a:schemeClr val="tx1"/>
+                </a:solidFill>
+                <a:effectLst/>
+                <a:latin typeface="+mj-lt"/>
+                <a:ea typeface="+mj-ea"/>
+                <a:cs typeface="+mj-cs"/>
+              </a:defRPr>
+            </a:lvl1pPr>
+          </a:lstStyle>
+          <a:p>
+            <a:r>
+              <a:rPr lang="en-US" dirty="0"/>
+              <a:t>CONCLUSION</a:t>
+            </a:r>
+          </a:p>
+        </p:txBody>
+      </p:sp>
+      <p:sp>
+        <p:nvSpPr>
+          <p:cNvPr id="5" name="Content Placeholder 2">
+            <a:extLst>
+              <a:ext uri="{FF2B5EF4-FFF2-40B4-BE49-F238E27FC236}">
+                <a16:creationId xmlns:a16="http://schemas.microsoft.com/office/drawing/2014/main" id="{B000EAFA-CD14-4C24-8D19-105C29797065}"/>
+              </a:ext>
+            </a:extLst>
+          </p:cNvPr>
+          <p:cNvSpPr txBox="1">
+            <a:spLocks/>
+          </p:cNvSpPr>
+          <p:nvPr/>
+        </p:nvSpPr>
+        <p:spPr>
+          <a:xfrm>
+            <a:off x="912525" y="1605646"/>
+            <a:ext cx="10363826" cy="1779630"/>
+          </a:xfrm>
+          <a:prstGeom prst="rect">
+            <a:avLst/>
+          </a:prstGeom>
+        </p:spPr>
+        <p:txBody>
+          <a:bodyPr vert="horz" lIns="91440" tIns="45720" rIns="91440" bIns="45720" rtlCol="0">
+            <a:normAutofit/>
+          </a:bodyPr>
+          <a:lstStyle>
+            <a:lvl1pPr marL="228600" indent="-228600" algn="l" defTabSz="914400" rtl="0" eaLnBrk="1" latinLnBrk="0" hangingPunct="1">
+              <a:lnSpc>
+                <a:spcPct val="120000"/>
+              </a:lnSpc>
+              <a:spcBef>
+                <a:spcPts val="1000"/>
+              </a:spcBef>
+              <a:buClr>
+                <a:schemeClr val="tx1"/>
+              </a:buClr>
+              <a:buFont typeface="Arial" panose="020B0604020202020204" pitchFamily="34" charset="0"/>
+              <a:buChar char="•"/>
+              <a:defRPr sz="2000" kern="1200" cap="all" baseline="0">
+                <a:solidFill>
+                  <a:schemeClr val="tx1"/>
+                </a:solidFill>
+                <a:effectLst/>
+                <a:latin typeface="+mn-lt"/>
+                <a:ea typeface="+mn-ea"/>
+                <a:cs typeface="+mn-cs"/>
+              </a:defRPr>
+            </a:lvl1pPr>
+            <a:lvl2pPr marL="685800" indent="-228600" algn="l" defTabSz="914400" rtl="0" eaLnBrk="1" latinLnBrk="0" hangingPunct="1">
+              <a:lnSpc>
+                <a:spcPct val="120000"/>
+              </a:lnSpc>
+              <a:spcBef>
+                <a:spcPts val="500"/>
+              </a:spcBef>
+              <a:buClr>
+                <a:schemeClr val="tx1"/>
+              </a:buClr>
+              <a:buFont typeface="Arial" panose="020B0604020202020204" pitchFamily="34" charset="0"/>
+              <a:buChar char="•"/>
+              <a:defRPr sz="1800" kern="1200" cap="all" baseline="0">
+                <a:solidFill>
+                  <a:schemeClr val="tx1"/>
+                </a:solidFill>
+                <a:effectLst/>
+                <a:latin typeface="+mn-lt"/>
+                <a:ea typeface="+mn-ea"/>
+                <a:cs typeface="+mn-cs"/>
+              </a:defRPr>
+            </a:lvl2pPr>
+            <a:lvl3pPr marL="1143000" indent="-228600" algn="l" defTabSz="914400" rtl="0" eaLnBrk="1" latinLnBrk="0" hangingPunct="1">
+              <a:lnSpc>
+                <a:spcPct val="120000"/>
+              </a:lnSpc>
+              <a:spcBef>
+                <a:spcPts val="500"/>
+              </a:spcBef>
+              <a:buClr>
+                <a:schemeClr val="tx1"/>
+              </a:buClr>
+              <a:buFont typeface="Arial" panose="020B0604020202020204" pitchFamily="34" charset="0"/>
+              <a:buChar char="•"/>
+              <a:defRPr sz="1600" kern="1200" cap="all" baseline="0">
+                <a:solidFill>
+                  <a:schemeClr val="tx1"/>
+                </a:solidFill>
+                <a:effectLst/>
+                <a:latin typeface="+mn-lt"/>
+                <a:ea typeface="+mn-ea"/>
+                <a:cs typeface="+mn-cs"/>
+              </a:defRPr>
+            </a:lvl3pPr>
+            <a:lvl4pPr marL="1600200" indent="-228600" algn="l" defTabSz="914400" rtl="0" eaLnBrk="1" latinLnBrk="0" hangingPunct="1">
+              <a:lnSpc>
+                <a:spcPct val="120000"/>
+              </a:lnSpc>
+              <a:spcBef>
+                <a:spcPts val="500"/>
+              </a:spcBef>
+              <a:buClr>
+                <a:schemeClr val="tx1"/>
+              </a:buClr>
+              <a:buFont typeface="Arial" panose="020B0604020202020204" pitchFamily="34" charset="0"/>
+              <a:buChar char="•"/>
+              <a:defRPr sz="1400" kern="1200" cap="all" baseline="0">
+                <a:solidFill>
+                  <a:schemeClr val="tx1"/>
+                </a:solidFill>
+                <a:effectLst/>
+                <a:latin typeface="+mn-lt"/>
+                <a:ea typeface="+mn-ea"/>
+                <a:cs typeface="+mn-cs"/>
+              </a:defRPr>
+            </a:lvl4pPr>
+            <a:lvl5pPr marL="2057400" indent="-228600" algn="l" defTabSz="914400" rtl="0" eaLnBrk="1" latinLnBrk="0" hangingPunct="1">
+              <a:lnSpc>
+                <a:spcPct val="120000"/>
+              </a:lnSpc>
+              <a:spcBef>
+                <a:spcPts val="500"/>
+              </a:spcBef>
+              <a:buClr>
+                <a:schemeClr val="tx1"/>
+              </a:buClr>
+              <a:buFont typeface="Arial" panose="020B0604020202020204" pitchFamily="34" charset="0"/>
+              <a:buChar char="•"/>
+              <a:defRPr sz="1400" kern="1200" cap="all" baseline="0">
+                <a:solidFill>
+                  <a:schemeClr val="tx1"/>
+                </a:solidFill>
+                <a:effectLst/>
+                <a:latin typeface="+mn-lt"/>
+                <a:ea typeface="+mn-ea"/>
+                <a:cs typeface="+mn-cs"/>
+              </a:defRPr>
+            </a:lvl5pPr>
+            <a:lvl6pPr marL="2514600" indent="-228600" algn="l" defTabSz="914400" rtl="0" eaLnBrk="1" latinLnBrk="0" hangingPunct="1">
+              <a:lnSpc>
+                <a:spcPct val="120000"/>
+              </a:lnSpc>
+              <a:spcBef>
+                <a:spcPts val="500"/>
+              </a:spcBef>
+              <a:buClr>
+                <a:schemeClr val="tx1"/>
+              </a:buClr>
+              <a:buFont typeface="Arial" panose="020B0604020202020204" pitchFamily="34" charset="0"/>
+              <a:buChar char="•"/>
+              <a:defRPr sz="1400" kern="1200" cap="all" baseline="0">
+                <a:solidFill>
+                  <a:schemeClr val="tx1"/>
+                </a:solidFill>
+                <a:effectLst/>
+                <a:latin typeface="+mn-lt"/>
+                <a:ea typeface="+mn-ea"/>
+                <a:cs typeface="+mn-cs"/>
+              </a:defRPr>
+            </a:lvl6pPr>
+            <a:lvl7pPr marL="2971800" indent="-228600" algn="l" defTabSz="914400" rtl="0" eaLnBrk="1" latinLnBrk="0" hangingPunct="1">
+              <a:lnSpc>
+                <a:spcPct val="120000"/>
+              </a:lnSpc>
+              <a:spcBef>
+                <a:spcPts val="500"/>
+              </a:spcBef>
+              <a:buClr>
+                <a:schemeClr val="tx1"/>
+              </a:buClr>
+              <a:buFont typeface="Arial" panose="020B0604020202020204" pitchFamily="34" charset="0"/>
+              <a:buChar char="•"/>
+              <a:defRPr sz="1400" kern="1200" cap="all" baseline="0">
+                <a:solidFill>
+                  <a:schemeClr val="tx1"/>
+                </a:solidFill>
+                <a:effectLst/>
+                <a:latin typeface="+mn-lt"/>
+                <a:ea typeface="+mn-ea"/>
+                <a:cs typeface="+mn-cs"/>
+              </a:defRPr>
+            </a:lvl7pPr>
+            <a:lvl8pPr marL="3429000" indent="-228600" algn="l" defTabSz="914400" rtl="0" eaLnBrk="1" latinLnBrk="0" hangingPunct="1">
+              <a:lnSpc>
+                <a:spcPct val="120000"/>
+              </a:lnSpc>
+              <a:spcBef>
+                <a:spcPts val="500"/>
+              </a:spcBef>
+              <a:buClr>
+                <a:schemeClr val="tx1"/>
+              </a:buClr>
+              <a:buFont typeface="Arial" panose="020B0604020202020204" pitchFamily="34" charset="0"/>
+              <a:buChar char="•"/>
+              <a:defRPr sz="1400" kern="1200" cap="all" baseline="0">
+                <a:solidFill>
+                  <a:schemeClr val="tx1"/>
+                </a:solidFill>
+                <a:effectLst/>
+                <a:latin typeface="+mn-lt"/>
+                <a:ea typeface="+mn-ea"/>
+                <a:cs typeface="+mn-cs"/>
+              </a:defRPr>
+            </a:lvl8pPr>
+            <a:lvl9pPr marL="3886200" indent="-228600" algn="l" defTabSz="914400" rtl="0" eaLnBrk="1" latinLnBrk="0" hangingPunct="1">
+              <a:lnSpc>
+                <a:spcPct val="120000"/>
+              </a:lnSpc>
+              <a:spcBef>
+                <a:spcPts val="500"/>
+              </a:spcBef>
+              <a:buClr>
+                <a:schemeClr val="tx1"/>
+              </a:buClr>
+              <a:buFont typeface="Arial" panose="020B0604020202020204" pitchFamily="34" charset="0"/>
+              <a:buChar char="•"/>
+              <a:defRPr sz="1400" kern="1200" cap="all" baseline="0">
+                <a:solidFill>
+                  <a:schemeClr val="tx1"/>
+                </a:solidFill>
+                <a:effectLst/>
+                <a:latin typeface="+mn-lt"/>
+                <a:ea typeface="+mn-ea"/>
+                <a:cs typeface="+mn-cs"/>
+              </a:defRPr>
+            </a:lvl9pPr>
+          </a:lstStyle>
+          <a:p>
+            <a:r>
+              <a:rPr lang="en-US" dirty="0"/>
+              <a:t>Agglomerative Hierarchical Clustering</a:t>
+            </a:r>
+          </a:p>
+          <a:p>
+            <a:pPr lvl="1"/>
+            <a:r>
+              <a:rPr lang="en-US" dirty="0"/>
+              <a:t>Clusters: 20, linkage : ward, Silhouette Coefficient: 0.026, Training time: 0.65 s</a:t>
+            </a:r>
+          </a:p>
+          <a:p>
+            <a:r>
+              <a:rPr lang="en-US" dirty="0"/>
+              <a:t>KMEANS clustering</a:t>
+            </a:r>
+          </a:p>
+          <a:p>
+            <a:pPr lvl="1"/>
+            <a:r>
+              <a:rPr lang="en-US" dirty="0"/>
+              <a:t>Clusters: 20, N_ITER : 20, Silhouette Coefficient: 0.022, Training time: 66.40 s</a:t>
+            </a:r>
+          </a:p>
+          <a:p>
+            <a:endParaRPr lang="en-US" dirty="0"/>
+          </a:p>
+          <a:p>
+            <a:endParaRPr lang="en-US" dirty="0"/>
+          </a:p>
+        </p:txBody>
+      </p:sp>
     </p:spTree>
     <p:extLst>
       <p:ext uri="{BB962C8B-B14F-4D97-AF65-F5344CB8AC3E}">
-        <p14:creationId xmlns:p14="http://schemas.microsoft.com/office/powerpoint/2010/main" val="3897255410"/>
+        <p14:creationId xmlns:p14="http://schemas.microsoft.com/office/powerpoint/2010/main" val="1093250247"/>
       </p:ext>
     </p:extLst>
   </p:cSld>

</xml_diff>